<commit_message>
made better train test spölit after speaker in paperimplementation
</commit_message>
<xml_diff>
--- a/Interim report 2.pptx
+++ b/Interim report 2.pptx
@@ -5,25 +5,28 @@
     <p:sldMasterId id="2147483648" r:id="rId1"/>
   </p:sldMasterIdLst>
   <p:notesMasterIdLst>
-    <p:notesMasterId r:id="rId18"/>
+    <p:notesMasterId r:id="rId21"/>
   </p:notesMasterIdLst>
   <p:sldIdLst>
     <p:sldId id="256" r:id="rId2"/>
-    <p:sldId id="258" r:id="rId3"/>
-    <p:sldId id="257" r:id="rId4"/>
-    <p:sldId id="259" r:id="rId5"/>
-    <p:sldId id="262" r:id="rId6"/>
-    <p:sldId id="265" r:id="rId7"/>
-    <p:sldId id="261" r:id="rId8"/>
-    <p:sldId id="266" r:id="rId9"/>
-    <p:sldId id="263" r:id="rId10"/>
-    <p:sldId id="267" r:id="rId11"/>
-    <p:sldId id="260" r:id="rId12"/>
-    <p:sldId id="268" r:id="rId13"/>
-    <p:sldId id="270" r:id="rId14"/>
-    <p:sldId id="269" r:id="rId15"/>
-    <p:sldId id="271" r:id="rId16"/>
-    <p:sldId id="273" r:id="rId17"/>
+    <p:sldId id="276" r:id="rId3"/>
+    <p:sldId id="258" r:id="rId4"/>
+    <p:sldId id="257" r:id="rId5"/>
+    <p:sldId id="259" r:id="rId6"/>
+    <p:sldId id="262" r:id="rId7"/>
+    <p:sldId id="265" r:id="rId8"/>
+    <p:sldId id="261" r:id="rId9"/>
+    <p:sldId id="266" r:id="rId10"/>
+    <p:sldId id="263" r:id="rId11"/>
+    <p:sldId id="267" r:id="rId12"/>
+    <p:sldId id="260" r:id="rId13"/>
+    <p:sldId id="268" r:id="rId14"/>
+    <p:sldId id="270" r:id="rId15"/>
+    <p:sldId id="269" r:id="rId16"/>
+    <p:sldId id="271" r:id="rId17"/>
+    <p:sldId id="273" r:id="rId18"/>
+    <p:sldId id="274" r:id="rId19"/>
+    <p:sldId id="275" r:id="rId20"/>
   </p:sldIdLst>
   <p:sldSz cx="12192000" cy="6858000"/>
   <p:notesSz cx="6858000" cy="9144000"/>
@@ -122,13 +125,18 @@
       </a:defRPr>
     </a:lvl9pPr>
   </p:defaultTextStyle>
+  <p:extLst>
+    <p:ext uri="{EFAFB233-063F-42B5-8137-9DF3F51BA10A}">
+      <p15:sldGuideLst xmlns:p15="http://schemas.microsoft.com/office/powerpoint/2012/main"/>
+    </p:ext>
+  </p:extLst>
 </p:presentation>
 </file>
 
 <file path=ppt/revisionInfo.xml><?xml version="1.0" encoding="utf-8"?>
 <p1510:revInfo xmlns:a="http://schemas.openxmlformats.org/drawingml/2006/main" xmlns:r="http://schemas.openxmlformats.org/officeDocument/2006/relationships" xmlns:p1510="http://schemas.microsoft.com/office/powerpoint/2015/10/main">
   <p1510:revLst>
-    <p1510:client id="{0CFA2A2E-46D0-42F7-A6D8-B16498946566}" v="8" dt="2025-01-16T14:43:16.224"/>
+    <p1510:client id="{0CFA2A2E-46D0-42F7-A6D8-B16498946566}" v="13" dt="2025-01-16T16:16:33.186"/>
   </p1510:revLst>
 </p1510:revInfo>
 </file>
@@ -138,7 +146,7 @@
   <pc:docChgLst>
     <pc:chgData name="Florian Gritsch" userId="6461bc0e-c9be-4bd0-a028-abdbd39772c1" providerId="ADAL" clId="{0CFA2A2E-46D0-42F7-A6D8-B16498946566}"/>
     <pc:docChg chg="undo custSel addSld delSld modSld sldOrd">
-      <pc:chgData name="Florian Gritsch" userId="6461bc0e-c9be-4bd0-a028-abdbd39772c1" providerId="ADAL" clId="{0CFA2A2E-46D0-42F7-A6D8-B16498946566}" dt="2025-01-16T14:45:20.575" v="1635" actId="1076"/>
+      <pc:chgData name="Florian Gritsch" userId="6461bc0e-c9be-4bd0-a028-abdbd39772c1" providerId="ADAL" clId="{0CFA2A2E-46D0-42F7-A6D8-B16498946566}" dt="2025-01-16T16:26:53.981" v="2498" actId="20577"/>
       <pc:docMkLst>
         <pc:docMk/>
       </pc:docMkLst>
@@ -205,7 +213,7 @@
         </pc:picChg>
       </pc:sldChg>
       <pc:sldChg chg="addSp delSp modSp new mod">
-        <pc:chgData name="Florian Gritsch" userId="6461bc0e-c9be-4bd0-a028-abdbd39772c1" providerId="ADAL" clId="{0CFA2A2E-46D0-42F7-A6D8-B16498946566}" dt="2025-01-16T09:11:13.851" v="32"/>
+        <pc:chgData name="Florian Gritsch" userId="6461bc0e-c9be-4bd0-a028-abdbd39772c1" providerId="ADAL" clId="{0CFA2A2E-46D0-42F7-A6D8-B16498946566}" dt="2025-01-16T16:13:31.703" v="2348"/>
         <pc:sldMkLst>
           <pc:docMk/>
           <pc:sldMk cId="978471892" sldId="258"/>
@@ -218,6 +226,14 @@
             <ac:spMk id="2" creationId="{D29DF040-3D09-60E5-E057-C423B588D0A7}"/>
           </ac:spMkLst>
         </pc:spChg>
+        <pc:spChg chg="add mod">
+          <ac:chgData name="Florian Gritsch" userId="6461bc0e-c9be-4bd0-a028-abdbd39772c1" providerId="ADAL" clId="{0CFA2A2E-46D0-42F7-A6D8-B16498946566}" dt="2025-01-16T16:13:31.703" v="2348"/>
+          <ac:spMkLst>
+            <pc:docMk/>
+            <pc:sldMk cId="978471892" sldId="258"/>
+            <ac:spMk id="3" creationId="{28D978D2-C776-AE7D-445F-3291AEEBC9AA}"/>
+          </ac:spMkLst>
+        </pc:spChg>
         <pc:spChg chg="del">
           <ac:chgData name="Florian Gritsch" userId="6461bc0e-c9be-4bd0-a028-abdbd39772c1" providerId="ADAL" clId="{0CFA2A2E-46D0-42F7-A6D8-B16498946566}" dt="2025-01-16T09:11:13.851" v="32"/>
           <ac:spMkLst>
@@ -227,7 +243,7 @@
           </ac:spMkLst>
         </pc:spChg>
         <pc:graphicFrameChg chg="add mod">
-          <ac:chgData name="Florian Gritsch" userId="6461bc0e-c9be-4bd0-a028-abdbd39772c1" providerId="ADAL" clId="{0CFA2A2E-46D0-42F7-A6D8-B16498946566}" dt="2025-01-16T09:11:13.851" v="32"/>
+          <ac:chgData name="Florian Gritsch" userId="6461bc0e-c9be-4bd0-a028-abdbd39772c1" providerId="ADAL" clId="{0CFA2A2E-46D0-42F7-A6D8-B16498946566}" dt="2025-01-16T16:11:02.449" v="2346"/>
           <ac:graphicFrameMkLst>
             <pc:docMk/>
             <pc:sldMk cId="978471892" sldId="258"/>
@@ -267,7 +283,7 @@
         </pc:picChg>
       </pc:sldChg>
       <pc:sldChg chg="modSp new mod">
-        <pc:chgData name="Florian Gritsch" userId="6461bc0e-c9be-4bd0-a028-abdbd39772c1" providerId="ADAL" clId="{0CFA2A2E-46D0-42F7-A6D8-B16498946566}" dt="2025-01-16T13:47:12.598" v="1398" actId="20577"/>
+        <pc:chgData name="Florian Gritsch" userId="6461bc0e-c9be-4bd0-a028-abdbd39772c1" providerId="ADAL" clId="{0CFA2A2E-46D0-42F7-A6D8-B16498946566}" dt="2025-01-16T16:18:43.167" v="2381" actId="403"/>
         <pc:sldMkLst>
           <pc:docMk/>
           <pc:sldMk cId="3153103898" sldId="260"/>
@@ -281,7 +297,7 @@
           </ac:spMkLst>
         </pc:spChg>
         <pc:spChg chg="mod">
-          <ac:chgData name="Florian Gritsch" userId="6461bc0e-c9be-4bd0-a028-abdbd39772c1" providerId="ADAL" clId="{0CFA2A2E-46D0-42F7-A6D8-B16498946566}" dt="2025-01-16T13:47:12.598" v="1398" actId="20577"/>
+          <ac:chgData name="Florian Gritsch" userId="6461bc0e-c9be-4bd0-a028-abdbd39772c1" providerId="ADAL" clId="{0CFA2A2E-46D0-42F7-A6D8-B16498946566}" dt="2025-01-16T16:18:43.167" v="2381" actId="403"/>
           <ac:spMkLst>
             <pc:docMk/>
             <pc:sldMk cId="3153103898" sldId="260"/>
@@ -289,8 +305,8 @@
           </ac:spMkLst>
         </pc:spChg>
       </pc:sldChg>
-      <pc:sldChg chg="addSp delSp modSp new mod ord">
-        <pc:chgData name="Florian Gritsch" userId="6461bc0e-c9be-4bd0-a028-abdbd39772c1" providerId="ADAL" clId="{0CFA2A2E-46D0-42F7-A6D8-B16498946566}" dt="2025-01-16T13:33:49.530" v="1166" actId="404"/>
+      <pc:sldChg chg="addSp delSp modSp new mod ord modNotesTx">
+        <pc:chgData name="Florian Gritsch" userId="6461bc0e-c9be-4bd0-a028-abdbd39772c1" providerId="ADAL" clId="{0CFA2A2E-46D0-42F7-A6D8-B16498946566}" dt="2025-01-16T16:16:25.002" v="2372" actId="5793"/>
         <pc:sldMkLst>
           <pc:docMk/>
           <pc:sldMk cId="3325533800" sldId="261"/>
@@ -304,7 +320,7 @@
           </ac:spMkLst>
         </pc:spChg>
         <pc:spChg chg="mod">
-          <ac:chgData name="Florian Gritsch" userId="6461bc0e-c9be-4bd0-a028-abdbd39772c1" providerId="ADAL" clId="{0CFA2A2E-46D0-42F7-A6D8-B16498946566}" dt="2025-01-16T13:33:49.530" v="1166" actId="404"/>
+          <ac:chgData name="Florian Gritsch" userId="6461bc0e-c9be-4bd0-a028-abdbd39772c1" providerId="ADAL" clId="{0CFA2A2E-46D0-42F7-A6D8-B16498946566}" dt="2025-01-16T16:16:25.002" v="2372" actId="5793"/>
           <ac:spMkLst>
             <pc:docMk/>
             <pc:sldMk cId="3325533800" sldId="261"/>
@@ -337,7 +353,7 @@
         </pc:picChg>
       </pc:sldChg>
       <pc:sldChg chg="modSp new mod modNotesTx">
-        <pc:chgData name="Florian Gritsch" userId="6461bc0e-c9be-4bd0-a028-abdbd39772c1" providerId="ADAL" clId="{0CFA2A2E-46D0-42F7-A6D8-B16498946566}" dt="2025-01-16T11:27:07.945" v="895" actId="20577"/>
+        <pc:chgData name="Florian Gritsch" userId="6461bc0e-c9be-4bd0-a028-abdbd39772c1" providerId="ADAL" clId="{0CFA2A2E-46D0-42F7-A6D8-B16498946566}" dt="2025-01-16T16:14:31.283" v="2367" actId="20577"/>
         <pc:sldMkLst>
           <pc:docMk/>
           <pc:sldMk cId="4264515581" sldId="262"/>
@@ -351,7 +367,7 @@
           </ac:spMkLst>
         </pc:spChg>
         <pc:spChg chg="mod">
-          <ac:chgData name="Florian Gritsch" userId="6461bc0e-c9be-4bd0-a028-abdbd39772c1" providerId="ADAL" clId="{0CFA2A2E-46D0-42F7-A6D8-B16498946566}" dt="2025-01-16T11:27:07.945" v="895" actId="20577"/>
+          <ac:chgData name="Florian Gritsch" userId="6461bc0e-c9be-4bd0-a028-abdbd39772c1" providerId="ADAL" clId="{0CFA2A2E-46D0-42F7-A6D8-B16498946566}" dt="2025-01-16T16:14:31.283" v="2367" actId="20577"/>
           <ac:spMkLst>
             <pc:docMk/>
             <pc:sldMk cId="4264515581" sldId="262"/>
@@ -360,7 +376,7 @@
         </pc:spChg>
       </pc:sldChg>
       <pc:sldChg chg="addSp delSp modSp new mod ord">
-        <pc:chgData name="Florian Gritsch" userId="6461bc0e-c9be-4bd0-a028-abdbd39772c1" providerId="ADAL" clId="{0CFA2A2E-46D0-42F7-A6D8-B16498946566}" dt="2025-01-16T13:37:52.774" v="1203"/>
+        <pc:chgData name="Florian Gritsch" userId="6461bc0e-c9be-4bd0-a028-abdbd39772c1" providerId="ADAL" clId="{0CFA2A2E-46D0-42F7-A6D8-B16498946566}" dt="2025-01-16T16:16:48.756" v="2377" actId="20577"/>
         <pc:sldMkLst>
           <pc:docMk/>
           <pc:sldMk cId="475159716" sldId="263"/>
@@ -374,7 +390,7 @@
           </ac:spMkLst>
         </pc:spChg>
         <pc:spChg chg="mod">
-          <ac:chgData name="Florian Gritsch" userId="6461bc0e-c9be-4bd0-a028-abdbd39772c1" providerId="ADAL" clId="{0CFA2A2E-46D0-42F7-A6D8-B16498946566}" dt="2025-01-16T13:27:11.391" v="1051" actId="20577"/>
+          <ac:chgData name="Florian Gritsch" userId="6461bc0e-c9be-4bd0-a028-abdbd39772c1" providerId="ADAL" clId="{0CFA2A2E-46D0-42F7-A6D8-B16498946566}" dt="2025-01-16T16:16:48.756" v="2377" actId="20577"/>
           <ac:spMkLst>
             <pc:docMk/>
             <pc:sldMk cId="475159716" sldId="263"/>
@@ -429,7 +445,7 @@
         </pc:picChg>
       </pc:sldChg>
       <pc:sldChg chg="addSp modSp new mod">
-        <pc:chgData name="Florian Gritsch" userId="6461bc0e-c9be-4bd0-a028-abdbd39772c1" providerId="ADAL" clId="{0CFA2A2E-46D0-42F7-A6D8-B16498946566}" dt="2025-01-16T13:38:49.217" v="1242" actId="20577"/>
+        <pc:chgData name="Florian Gritsch" userId="6461bc0e-c9be-4bd0-a028-abdbd39772c1" providerId="ADAL" clId="{0CFA2A2E-46D0-42F7-A6D8-B16498946566}" dt="2025-01-16T16:16:35.234" v="2375" actId="14100"/>
         <pc:sldMkLst>
           <pc:docMk/>
           <pc:sldMk cId="586486474" sldId="265"/>
@@ -440,6 +456,14 @@
             <pc:docMk/>
             <pc:sldMk cId="586486474" sldId="265"/>
             <ac:spMk id="2" creationId="{D89D6EEB-0CE6-EE07-DB8A-7DBB54C79639}"/>
+          </ac:spMkLst>
+        </pc:spChg>
+        <pc:spChg chg="add mod">
+          <ac:chgData name="Florian Gritsch" userId="6461bc0e-c9be-4bd0-a028-abdbd39772c1" providerId="ADAL" clId="{0CFA2A2E-46D0-42F7-A6D8-B16498946566}" dt="2025-01-16T16:16:35.234" v="2375" actId="14100"/>
+          <ac:spMkLst>
+            <pc:docMk/>
+            <pc:sldMk cId="586486474" sldId="265"/>
+            <ac:spMk id="4" creationId="{8804A342-CF9F-91B6-BB72-5077F2E48953}"/>
           </ac:spMkLst>
         </pc:spChg>
         <pc:picChg chg="add mod">
@@ -459,7 +483,7 @@
         </pc:sldMkLst>
       </pc:sldChg>
       <pc:sldChg chg="addSp modSp new mod ord setBg">
-        <pc:chgData name="Florian Gritsch" userId="6461bc0e-c9be-4bd0-a028-abdbd39772c1" providerId="ADAL" clId="{0CFA2A2E-46D0-42F7-A6D8-B16498946566}" dt="2025-01-16T13:35:35.301" v="1190" actId="26606"/>
+        <pc:chgData name="Florian Gritsch" userId="6461bc0e-c9be-4bd0-a028-abdbd39772c1" providerId="ADAL" clId="{0CFA2A2E-46D0-42F7-A6D8-B16498946566}" dt="2025-01-16T16:16:43.716" v="2376" actId="20577"/>
         <pc:sldMkLst>
           <pc:docMk/>
           <pc:sldMk cId="1754625087" sldId="266"/>
@@ -473,7 +497,7 @@
           </ac:spMkLst>
         </pc:spChg>
         <pc:spChg chg="add mod">
-          <ac:chgData name="Florian Gritsch" userId="6461bc0e-c9be-4bd0-a028-abdbd39772c1" providerId="ADAL" clId="{0CFA2A2E-46D0-42F7-A6D8-B16498946566}" dt="2025-01-16T13:35:35.301" v="1190" actId="26606"/>
+          <ac:chgData name="Florian Gritsch" userId="6461bc0e-c9be-4bd0-a028-abdbd39772c1" providerId="ADAL" clId="{0CFA2A2E-46D0-42F7-A6D8-B16498946566}" dt="2025-01-16T16:16:43.716" v="2376" actId="20577"/>
           <ac:spMkLst>
             <pc:docMk/>
             <pc:sldMk cId="1754625087" sldId="266"/>
@@ -506,13 +530,13 @@
         </pc:picChg>
       </pc:sldChg>
       <pc:sldChg chg="addSp delSp modSp add mod setBg delDesignElem">
-        <pc:chgData name="Florian Gritsch" userId="6461bc0e-c9be-4bd0-a028-abdbd39772c1" providerId="ADAL" clId="{0CFA2A2E-46D0-42F7-A6D8-B16498946566}" dt="2025-01-16T13:36:54.627" v="1201" actId="26606"/>
+        <pc:chgData name="Florian Gritsch" userId="6461bc0e-c9be-4bd0-a028-abdbd39772c1" providerId="ADAL" clId="{0CFA2A2E-46D0-42F7-A6D8-B16498946566}" dt="2025-01-16T16:16:52.156" v="2378" actId="20577"/>
         <pc:sldMkLst>
           <pc:docMk/>
           <pc:sldMk cId="275728200" sldId="267"/>
         </pc:sldMkLst>
         <pc:spChg chg="mod">
-          <ac:chgData name="Florian Gritsch" userId="6461bc0e-c9be-4bd0-a028-abdbd39772c1" providerId="ADAL" clId="{0CFA2A2E-46D0-42F7-A6D8-B16498946566}" dt="2025-01-16T13:36:54.627" v="1201" actId="26606"/>
+          <ac:chgData name="Florian Gritsch" userId="6461bc0e-c9be-4bd0-a028-abdbd39772c1" providerId="ADAL" clId="{0CFA2A2E-46D0-42F7-A6D8-B16498946566}" dt="2025-01-16T16:16:52.156" v="2378" actId="20577"/>
           <ac:spMkLst>
             <pc:docMk/>
             <pc:sldMk cId="275728200" sldId="267"/>
@@ -676,13 +700,13 @@
         </pc:sldMkLst>
       </pc:sldChg>
       <pc:sldChg chg="modSp new mod">
-        <pc:chgData name="Florian Gritsch" userId="6461bc0e-c9be-4bd0-a028-abdbd39772c1" providerId="ADAL" clId="{0CFA2A2E-46D0-42F7-A6D8-B16498946566}" dt="2025-01-16T14:08:05.798" v="1605" actId="20577"/>
+        <pc:chgData name="Florian Gritsch" userId="6461bc0e-c9be-4bd0-a028-abdbd39772c1" providerId="ADAL" clId="{0CFA2A2E-46D0-42F7-A6D8-B16498946566}" dt="2025-01-16T16:19:27.825" v="2383" actId="20577"/>
         <pc:sldMkLst>
           <pc:docMk/>
           <pc:sldMk cId="1372572693" sldId="270"/>
         </pc:sldMkLst>
         <pc:spChg chg="mod">
-          <ac:chgData name="Florian Gritsch" userId="6461bc0e-c9be-4bd0-a028-abdbd39772c1" providerId="ADAL" clId="{0CFA2A2E-46D0-42F7-A6D8-B16498946566}" dt="2025-01-16T13:52:38.323" v="1422" actId="20577"/>
+          <ac:chgData name="Florian Gritsch" userId="6461bc0e-c9be-4bd0-a028-abdbd39772c1" providerId="ADAL" clId="{0CFA2A2E-46D0-42F7-A6D8-B16498946566}" dt="2025-01-16T16:19:27.825" v="2383" actId="20577"/>
           <ac:spMkLst>
             <pc:docMk/>
             <pc:sldMk cId="1372572693" sldId="270"/>
@@ -852,6 +876,130 @@
             <pc:docMk/>
             <pc:sldMk cId="1253735066" sldId="273"/>
             <ac:picMk id="5" creationId="{6CB910BB-6EF0-D4B8-EBEF-4637B5F68F09}"/>
+          </ac:picMkLst>
+        </pc:picChg>
+      </pc:sldChg>
+      <pc:sldChg chg="addSp delSp modSp new mod">
+        <pc:chgData name="Florian Gritsch" userId="6461bc0e-c9be-4bd0-a028-abdbd39772c1" providerId="ADAL" clId="{0CFA2A2E-46D0-42F7-A6D8-B16498946566}" dt="2025-01-16T15:26:24.656" v="1734" actId="20577"/>
+        <pc:sldMkLst>
+          <pc:docMk/>
+          <pc:sldMk cId="2228676399" sldId="274"/>
+        </pc:sldMkLst>
+        <pc:spChg chg="mod">
+          <ac:chgData name="Florian Gritsch" userId="6461bc0e-c9be-4bd0-a028-abdbd39772c1" providerId="ADAL" clId="{0CFA2A2E-46D0-42F7-A6D8-B16498946566}" dt="2025-01-16T15:24:29.130" v="1686" actId="20577"/>
+          <ac:spMkLst>
+            <pc:docMk/>
+            <pc:sldMk cId="2228676399" sldId="274"/>
+            <ac:spMk id="2" creationId="{A41905CD-1B88-4006-462A-F2FD03E19A84}"/>
+          </ac:spMkLst>
+        </pc:spChg>
+        <pc:spChg chg="del">
+          <ac:chgData name="Florian Gritsch" userId="6461bc0e-c9be-4bd0-a028-abdbd39772c1" providerId="ADAL" clId="{0CFA2A2E-46D0-42F7-A6D8-B16498946566}" dt="2025-01-16T15:24:15.353" v="1657" actId="478"/>
+          <ac:spMkLst>
+            <pc:docMk/>
+            <pc:sldMk cId="2228676399" sldId="274"/>
+            <ac:spMk id="3" creationId="{BAB90D56-30B1-6B39-C1D8-E026481CF27B}"/>
+          </ac:spMkLst>
+        </pc:spChg>
+        <pc:spChg chg="add mod">
+          <ac:chgData name="Florian Gritsch" userId="6461bc0e-c9be-4bd0-a028-abdbd39772c1" providerId="ADAL" clId="{0CFA2A2E-46D0-42F7-A6D8-B16498946566}" dt="2025-01-16T15:25:14.145" v="1718" actId="20577"/>
+          <ac:spMkLst>
+            <pc:docMk/>
+            <pc:sldMk cId="2228676399" sldId="274"/>
+            <ac:spMk id="6" creationId="{007BCBC7-7845-E1E7-0DE9-AD2F9EF45B9C}"/>
+          </ac:spMkLst>
+        </pc:spChg>
+        <pc:spChg chg="add mod">
+          <ac:chgData name="Florian Gritsch" userId="6461bc0e-c9be-4bd0-a028-abdbd39772c1" providerId="ADAL" clId="{0CFA2A2E-46D0-42F7-A6D8-B16498946566}" dt="2025-01-16T15:26:24.656" v="1734" actId="20577"/>
+          <ac:spMkLst>
+            <pc:docMk/>
+            <pc:sldMk cId="2228676399" sldId="274"/>
+            <ac:spMk id="9" creationId="{7647EE26-9FC4-3032-CC3A-E677C2B15FA6}"/>
+          </ac:spMkLst>
+        </pc:spChg>
+        <pc:picChg chg="add mod">
+          <ac:chgData name="Florian Gritsch" userId="6461bc0e-c9be-4bd0-a028-abdbd39772c1" providerId="ADAL" clId="{0CFA2A2E-46D0-42F7-A6D8-B16498946566}" dt="2025-01-16T15:26:09.194" v="1722" actId="14100"/>
+          <ac:picMkLst>
+            <pc:docMk/>
+            <pc:sldMk cId="2228676399" sldId="274"/>
+            <ac:picMk id="5" creationId="{EDDB1130-2F82-B074-348F-9F668D0CC8FC}"/>
+          </ac:picMkLst>
+        </pc:picChg>
+        <pc:picChg chg="add mod">
+          <ac:chgData name="Florian Gritsch" userId="6461bc0e-c9be-4bd0-a028-abdbd39772c1" providerId="ADAL" clId="{0CFA2A2E-46D0-42F7-A6D8-B16498946566}" dt="2025-01-16T15:26:05.919" v="1721" actId="14100"/>
+          <ac:picMkLst>
+            <pc:docMk/>
+            <pc:sldMk cId="2228676399" sldId="274"/>
+            <ac:picMk id="8" creationId="{A165DBBC-EF9C-5E0C-4F5F-65B698E74396}"/>
+          </ac:picMkLst>
+        </pc:picChg>
+      </pc:sldChg>
+      <pc:sldChg chg="new del">
+        <pc:chgData name="Florian Gritsch" userId="6461bc0e-c9be-4bd0-a028-abdbd39772c1" providerId="ADAL" clId="{0CFA2A2E-46D0-42F7-A6D8-B16498946566}" dt="2025-01-16T15:01:07.549" v="1637" actId="47"/>
+        <pc:sldMkLst>
+          <pc:docMk/>
+          <pc:sldMk cId="3510837357" sldId="274"/>
+        </pc:sldMkLst>
+      </pc:sldChg>
+      <pc:sldChg chg="modSp new mod modNotesTx">
+        <pc:chgData name="Florian Gritsch" userId="6461bc0e-c9be-4bd0-a028-abdbd39772c1" providerId="ADAL" clId="{0CFA2A2E-46D0-42F7-A6D8-B16498946566}" dt="2025-01-16T16:26:53.981" v="2498" actId="20577"/>
+        <pc:sldMkLst>
+          <pc:docMk/>
+          <pc:sldMk cId="4228036351" sldId="275"/>
+        </pc:sldMkLst>
+        <pc:spChg chg="mod">
+          <ac:chgData name="Florian Gritsch" userId="6461bc0e-c9be-4bd0-a028-abdbd39772c1" providerId="ADAL" clId="{0CFA2A2E-46D0-42F7-A6D8-B16498946566}" dt="2025-01-16T15:28:46.895" v="1746" actId="20577"/>
+          <ac:spMkLst>
+            <pc:docMk/>
+            <pc:sldMk cId="4228036351" sldId="275"/>
+            <ac:spMk id="2" creationId="{7FEC82B8-B93A-6B4F-B1EB-4D7842484FCB}"/>
+          </ac:spMkLst>
+        </pc:spChg>
+        <pc:spChg chg="mod">
+          <ac:chgData name="Florian Gritsch" userId="6461bc0e-c9be-4bd0-a028-abdbd39772c1" providerId="ADAL" clId="{0CFA2A2E-46D0-42F7-A6D8-B16498946566}" dt="2025-01-16T16:26:53.981" v="2498" actId="20577"/>
+          <ac:spMkLst>
+            <pc:docMk/>
+            <pc:sldMk cId="4228036351" sldId="275"/>
+            <ac:spMk id="3" creationId="{39B0E42A-F805-D081-9CBE-F8C3B1C3CA97}"/>
+          </ac:spMkLst>
+        </pc:spChg>
+      </pc:sldChg>
+      <pc:sldChg chg="addSp modSp new mod">
+        <pc:chgData name="Florian Gritsch" userId="6461bc0e-c9be-4bd0-a028-abdbd39772c1" providerId="ADAL" clId="{0CFA2A2E-46D0-42F7-A6D8-B16498946566}" dt="2025-01-16T16:10:30.244" v="2344" actId="20577"/>
+        <pc:sldMkLst>
+          <pc:docMk/>
+          <pc:sldMk cId="515502319" sldId="276"/>
+        </pc:sldMkLst>
+        <pc:spChg chg="mod">
+          <ac:chgData name="Florian Gritsch" userId="6461bc0e-c9be-4bd0-a028-abdbd39772c1" providerId="ADAL" clId="{0CFA2A2E-46D0-42F7-A6D8-B16498946566}" dt="2025-01-16T15:34:15.853" v="2241" actId="20577"/>
+          <ac:spMkLst>
+            <pc:docMk/>
+            <pc:sldMk cId="515502319" sldId="276"/>
+            <ac:spMk id="2" creationId="{D87EA94F-E9AF-BDFF-E5B5-10D77518CFCA}"/>
+          </ac:spMkLst>
+        </pc:spChg>
+        <pc:spChg chg="mod">
+          <ac:chgData name="Florian Gritsch" userId="6461bc0e-c9be-4bd0-a028-abdbd39772c1" providerId="ADAL" clId="{0CFA2A2E-46D0-42F7-A6D8-B16498946566}" dt="2025-01-16T16:10:30.244" v="2344" actId="20577"/>
+          <ac:spMkLst>
+            <pc:docMk/>
+            <pc:sldMk cId="515502319" sldId="276"/>
+            <ac:spMk id="3" creationId="{3752942B-D0C1-B1F1-F209-A10DAE98FE84}"/>
+          </ac:spMkLst>
+        </pc:spChg>
+        <pc:picChg chg="add mod">
+          <ac:chgData name="Florian Gritsch" userId="6461bc0e-c9be-4bd0-a028-abdbd39772c1" providerId="ADAL" clId="{0CFA2A2E-46D0-42F7-A6D8-B16498946566}" dt="2025-01-16T16:07:52.502" v="2286" actId="14100"/>
+          <ac:picMkLst>
+            <pc:docMk/>
+            <pc:sldMk cId="515502319" sldId="276"/>
+            <ac:picMk id="5" creationId="{CDF00677-E3EB-779A-BDAF-DFB01C82830D}"/>
+          </ac:picMkLst>
+        </pc:picChg>
+        <pc:picChg chg="add mod">
+          <ac:chgData name="Florian Gritsch" userId="6461bc0e-c9be-4bd0-a028-abdbd39772c1" providerId="ADAL" clId="{0CFA2A2E-46D0-42F7-A6D8-B16498946566}" dt="2025-01-16T16:07:49.248" v="2285" actId="14100"/>
+          <ac:picMkLst>
+            <pc:docMk/>
+            <pc:sldMk cId="515502319" sldId="276"/>
+            <ac:picMk id="7" creationId="{37310A8F-286E-1C26-EFF9-A83BE72A27C1}"/>
           </ac:picMkLst>
         </pc:picChg>
       </pc:sldChg>
@@ -1884,7 +2032,7 @@
       <dgm:spPr/>
     </dgm:pt>
     <dgm:pt modelId="{41E32F26-0794-4195-B8AD-42856536FFD8}" type="pres">
-      <dgm:prSet presAssocID="{2B08F4F4-9DCE-41AD-8B09-B702F83C89E5}" presName="rootText1" presStyleLbl="node0" presStyleIdx="0" presStyleCnt="1">
+      <dgm:prSet presAssocID="{2B08F4F4-9DCE-41AD-8B09-B702F83C89E5}" presName="rootText1" presStyleLbl="node0" presStyleIdx="0" presStyleCnt="1" custLinFactNeighborY="-96064">
         <dgm:presLayoutVars>
           <dgm:chPref val="3"/>
         </dgm:presLayoutVars>
@@ -2176,8 +2324,8 @@
       </dsp:nvSpPr>
       <dsp:spPr>
         <a:xfrm>
-          <a:off x="5257800" y="653156"/>
-          <a:ext cx="787282" cy="273271"/>
+          <a:off x="5257800" y="650646"/>
+          <a:ext cx="787282" cy="275781"/>
         </a:xfrm>
         <a:custGeom>
           <a:avLst/>
@@ -2191,13 +2339,13 @@
                 <a:pt x="0" y="0"/>
               </a:moveTo>
               <a:lnTo>
-                <a:pt x="0" y="136635"/>
+                <a:pt x="0" y="139145"/>
               </a:lnTo>
               <a:lnTo>
-                <a:pt x="787282" y="136635"/>
+                <a:pt x="787282" y="139145"/>
               </a:lnTo>
               <a:lnTo>
-                <a:pt x="787282" y="273271"/>
+                <a:pt x="787282" y="275781"/>
               </a:lnTo>
             </a:path>
           </a:pathLst>
@@ -2412,8 +2560,8 @@
       </dsp:nvSpPr>
       <dsp:spPr>
         <a:xfrm>
-          <a:off x="4470517" y="653156"/>
-          <a:ext cx="787282" cy="273271"/>
+          <a:off x="4470517" y="650646"/>
+          <a:ext cx="787282" cy="275781"/>
         </a:xfrm>
         <a:custGeom>
           <a:avLst/>
@@ -2427,13 +2575,13 @@
                 <a:pt x="787282" y="0"/>
               </a:moveTo>
               <a:lnTo>
-                <a:pt x="787282" y="136635"/>
+                <a:pt x="787282" y="139145"/>
               </a:lnTo>
               <a:lnTo>
-                <a:pt x="0" y="136635"/>
+                <a:pt x="0" y="139145"/>
               </a:lnTo>
               <a:lnTo>
-                <a:pt x="0" y="273271"/>
+                <a:pt x="0" y="275781"/>
               </a:lnTo>
             </a:path>
           </a:pathLst>
@@ -2474,7 +2622,7 @@
       </dsp:nvSpPr>
       <dsp:spPr>
         <a:xfrm>
-          <a:off x="4607153" y="2510"/>
+          <a:off x="4607153" y="0"/>
           <a:ext cx="1301292" cy="650646"/>
         </a:xfrm>
         <a:prstGeom prst="rect">
@@ -2542,7 +2690,7 @@
         </a:p>
       </dsp:txBody>
       <dsp:txXfrm>
-        <a:off x="4607153" y="2510"/>
+        <a:off x="4607153" y="0"/>
         <a:ext cx="1301292" cy="650646"/>
       </dsp:txXfrm>
     </dsp:sp>
@@ -5601,7 +5749,7 @@
           <a:p>
             <a:fld id="{F2F9830F-C021-42C9-B27C-D682D2072031}" type="slidenum">
               <a:rPr lang="en-US" smtClean="0"/>
-              <a:t>4</a:t>
+              <a:t>5</a:t>
             </a:fld>
             <a:endParaRPr lang="en-US"/>
           </a:p>
@@ -5737,7 +5885,7 @@
           <a:p>
             <a:fld id="{F2F9830F-C021-42C9-B27C-D682D2072031}" type="slidenum">
               <a:rPr lang="en-US" smtClean="0"/>
-              <a:t>5</a:t>
+              <a:t>6</a:t>
             </a:fld>
             <a:endParaRPr lang="en-US"/>
           </a:p>
@@ -5747,6 +5895,252 @@
     <p:extLst>
       <p:ext uri="{BB962C8B-B14F-4D97-AF65-F5344CB8AC3E}">
         <p14:creationId xmlns:p14="http://schemas.microsoft.com/office/powerpoint/2010/main" val="2650527040"/>
+      </p:ext>
+    </p:extLst>
+  </p:cSld>
+  <p:clrMapOvr>
+    <a:masterClrMapping/>
+  </p:clrMapOvr>
+</p:notes>
+</file>
+
+<file path=ppt/notesSlides/notesSlide3.xml><?xml version="1.0" encoding="utf-8"?>
+<p:notes xmlns:a="http://schemas.openxmlformats.org/drawingml/2006/main" xmlns:r="http://schemas.openxmlformats.org/officeDocument/2006/relationships" xmlns:p="http://schemas.openxmlformats.org/presentationml/2006/main">
+  <p:cSld>
+    <p:spTree>
+      <p:nvGrpSpPr>
+        <p:cNvPr id="1" name=""/>
+        <p:cNvGrpSpPr/>
+        <p:nvPr/>
+      </p:nvGrpSpPr>
+      <p:grpSpPr>
+        <a:xfrm>
+          <a:off x="0" y="0"/>
+          <a:ext cx="0" cy="0"/>
+          <a:chOff x="0" y="0"/>
+          <a:chExt cx="0" cy="0"/>
+        </a:xfrm>
+      </p:grpSpPr>
+      <p:sp>
+        <p:nvSpPr>
+          <p:cNvPr id="2" name="Folienbildplatzhalter 1"/>
+          <p:cNvSpPr>
+            <a:spLocks noGrp="1" noRot="1" noChangeAspect="1"/>
+          </p:cNvSpPr>
+          <p:nvPr>
+            <p:ph type="sldImg"/>
+          </p:nvPr>
+        </p:nvSpPr>
+        <p:spPr/>
+      </p:sp>
+      <p:sp>
+        <p:nvSpPr>
+          <p:cNvPr id="3" name="Notizenplatzhalter 2"/>
+          <p:cNvSpPr>
+            <a:spLocks noGrp="1"/>
+          </p:cNvSpPr>
+          <p:nvPr>
+            <p:ph type="body" idx="1"/>
+          </p:nvPr>
+        </p:nvSpPr>
+        <p:spPr/>
+        <p:txBody>
+          <a:bodyPr/>
+          <a:lstStyle/>
+          <a:p>
+            <a:r>
+              <a:rPr lang="en-US" dirty="0"/>
+              <a:t>the </a:t>
+            </a:r>
+            <a:r>
+              <a:rPr lang="en-US" b="1" dirty="0"/>
+              <a:t>trendline quefrency range</a:t>
+            </a:r>
+            <a:r>
+              <a:rPr lang="en-US" dirty="0"/>
+              <a:t> is the range of the </a:t>
+            </a:r>
+            <a:r>
+              <a:rPr lang="en-US" i="1" dirty="0" err="1"/>
+              <a:t>cepstrum</a:t>
+            </a:r>
+            <a:r>
+              <a:rPr lang="en-US" dirty="0"/>
+              <a:t> over which you fit a </a:t>
+            </a:r>
+            <a:r>
+              <a:rPr lang="en-US" b="1" dirty="0"/>
+              <a:t>linear regression</a:t>
+            </a:r>
+            <a:r>
+              <a:rPr lang="en-US" dirty="0"/>
+              <a:t> (or trend line) to model the </a:t>
+            </a:r>
+            <a:r>
+              <a:rPr lang="en-US" b="1" dirty="0"/>
+              <a:t>overall slope</a:t>
+            </a:r>
+            <a:r>
+              <a:rPr lang="en-US" dirty="0"/>
+              <a:t> of the </a:t>
+            </a:r>
+            <a:r>
+              <a:rPr lang="en-US" dirty="0" err="1"/>
+              <a:t>cepstrum</a:t>
+            </a:r>
+            <a:r>
+              <a:rPr lang="en-US" dirty="0"/>
+              <a:t>.</a:t>
+            </a:r>
+          </a:p>
+        </p:txBody>
+      </p:sp>
+      <p:sp>
+        <p:nvSpPr>
+          <p:cNvPr id="4" name="Foliennummernplatzhalter 3"/>
+          <p:cNvSpPr>
+            <a:spLocks noGrp="1"/>
+          </p:cNvSpPr>
+          <p:nvPr>
+            <p:ph type="sldNum" sz="quarter" idx="5"/>
+          </p:nvPr>
+        </p:nvSpPr>
+        <p:spPr/>
+        <p:txBody>
+          <a:bodyPr/>
+          <a:lstStyle/>
+          <a:p>
+            <a:fld id="{F2F9830F-C021-42C9-B27C-D682D2072031}" type="slidenum">
+              <a:rPr lang="en-US" smtClean="0"/>
+              <a:t>8</a:t>
+            </a:fld>
+            <a:endParaRPr lang="en-US"/>
+          </a:p>
+        </p:txBody>
+      </p:sp>
+    </p:spTree>
+    <p:extLst>
+      <p:ext uri="{BB962C8B-B14F-4D97-AF65-F5344CB8AC3E}">
+        <p14:creationId xmlns:p14="http://schemas.microsoft.com/office/powerpoint/2010/main" val="3337141057"/>
+      </p:ext>
+    </p:extLst>
+  </p:cSld>
+  <p:clrMapOvr>
+    <a:masterClrMapping/>
+  </p:clrMapOvr>
+</p:notes>
+</file>
+
+<file path=ppt/notesSlides/notesSlide4.xml><?xml version="1.0" encoding="utf-8"?>
+<p:notes xmlns:a="http://schemas.openxmlformats.org/drawingml/2006/main" xmlns:r="http://schemas.openxmlformats.org/officeDocument/2006/relationships" xmlns:p="http://schemas.openxmlformats.org/presentationml/2006/main">
+  <p:cSld>
+    <p:spTree>
+      <p:nvGrpSpPr>
+        <p:cNvPr id="1" name=""/>
+        <p:cNvGrpSpPr/>
+        <p:nvPr/>
+      </p:nvGrpSpPr>
+      <p:grpSpPr>
+        <a:xfrm>
+          <a:off x="0" y="0"/>
+          <a:ext cx="0" cy="0"/>
+          <a:chOff x="0" y="0"/>
+          <a:chExt cx="0" cy="0"/>
+        </a:xfrm>
+      </p:grpSpPr>
+      <p:sp>
+        <p:nvSpPr>
+          <p:cNvPr id="2" name="Folienbildplatzhalter 1"/>
+          <p:cNvSpPr>
+            <a:spLocks noGrp="1" noRot="1" noChangeAspect="1"/>
+          </p:cNvSpPr>
+          <p:nvPr>
+            <p:ph type="sldImg"/>
+          </p:nvPr>
+        </p:nvSpPr>
+        <p:spPr/>
+      </p:sp>
+      <p:sp>
+        <p:nvSpPr>
+          <p:cNvPr id="3" name="Notizenplatzhalter 2"/>
+          <p:cNvSpPr>
+            <a:spLocks noGrp="1"/>
+          </p:cNvSpPr>
+          <p:nvPr>
+            <p:ph type="body" idx="1"/>
+          </p:nvPr>
+        </p:nvSpPr>
+        <p:spPr/>
+        <p:txBody>
+          <a:bodyPr/>
+          <a:lstStyle/>
+          <a:p>
+            <a:r>
+              <a:rPr lang="de-DE" dirty="0"/>
+              <a:t>Noise</a:t>
+            </a:r>
+          </a:p>
+          <a:p>
+            <a:r>
+              <a:rPr lang="de-DE" dirty="0"/>
+              <a:t>Time </a:t>
+            </a:r>
+            <a:r>
+              <a:rPr lang="de-DE" dirty="0" err="1"/>
+              <a:t>strecht</a:t>
+            </a:r>
+            <a:endParaRPr lang="de-DE" dirty="0"/>
+          </a:p>
+          <a:p>
+            <a:r>
+              <a:rPr lang="de-DE" dirty="0"/>
+              <a:t>Pitch shifting</a:t>
+            </a:r>
+          </a:p>
+          <a:p>
+            <a:r>
+              <a:rPr lang="de-DE" dirty="0" err="1"/>
+              <a:t>Crop</a:t>
+            </a:r>
+            <a:r>
+              <a:rPr lang="de-DE" dirty="0"/>
+              <a:t> /</a:t>
+            </a:r>
+            <a:r>
+              <a:rPr lang="de-DE" dirty="0" err="1"/>
+              <a:t>pad</a:t>
+            </a:r>
+            <a:endParaRPr lang="en-US" dirty="0"/>
+          </a:p>
+        </p:txBody>
+      </p:sp>
+      <p:sp>
+        <p:nvSpPr>
+          <p:cNvPr id="4" name="Foliennummernplatzhalter 3"/>
+          <p:cNvSpPr>
+            <a:spLocks noGrp="1"/>
+          </p:cNvSpPr>
+          <p:nvPr>
+            <p:ph type="sldNum" sz="quarter" idx="5"/>
+          </p:nvPr>
+        </p:nvSpPr>
+        <p:spPr/>
+        <p:txBody>
+          <a:bodyPr/>
+          <a:lstStyle/>
+          <a:p>
+            <a:fld id="{F2F9830F-C021-42C9-B27C-D682D2072031}" type="slidenum">
+              <a:rPr lang="en-US" smtClean="0"/>
+              <a:t>19</a:t>
+            </a:fld>
+            <a:endParaRPr lang="en-US"/>
+          </a:p>
+        </p:txBody>
+      </p:sp>
+    </p:spTree>
+    <p:extLst>
+      <p:ext uri="{BB962C8B-B14F-4D97-AF65-F5344CB8AC3E}">
+        <p14:creationId xmlns:p14="http://schemas.microsoft.com/office/powerpoint/2010/main" val="2432816158"/>
       </p:ext>
     </p:extLst>
   </p:cSld>
@@ -9061,6 +9455,142 @@
 <file path=ppt/slides/slide10.xml><?xml version="1.0" encoding="utf-8"?>
 <p:sld xmlns:a="http://schemas.openxmlformats.org/drawingml/2006/main" xmlns:r="http://schemas.openxmlformats.org/officeDocument/2006/relationships" xmlns:p="http://schemas.openxmlformats.org/presentationml/2006/main">
   <p:cSld>
+    <p:spTree>
+      <p:nvGrpSpPr>
+        <p:cNvPr id="1" name=""/>
+        <p:cNvGrpSpPr/>
+        <p:nvPr/>
+      </p:nvGrpSpPr>
+      <p:grpSpPr>
+        <a:xfrm>
+          <a:off x="0" y="0"/>
+          <a:ext cx="0" cy="0"/>
+          <a:chOff x="0" y="0"/>
+          <a:chExt cx="0" cy="0"/>
+        </a:xfrm>
+      </p:grpSpPr>
+      <p:sp>
+        <p:nvSpPr>
+          <p:cNvPr id="3" name="Inhaltsplatzhalter 2">
+            <a:extLst>
+              <a:ext uri="{FF2B5EF4-FFF2-40B4-BE49-F238E27FC236}">
+                <a16:creationId xmlns:a16="http://schemas.microsoft.com/office/drawing/2014/main" id="{65B49D78-A9A4-F7D2-9E68-44EA4F9100AF}"/>
+              </a:ext>
+            </a:extLst>
+          </p:cNvPr>
+          <p:cNvSpPr>
+            <a:spLocks noGrp="1"/>
+          </p:cNvSpPr>
+          <p:nvPr>
+            <p:ph idx="1"/>
+          </p:nvPr>
+        </p:nvSpPr>
+        <p:spPr>
+          <a:xfrm>
+            <a:off x="114300" y="168275"/>
+            <a:ext cx="10515600" cy="4351338"/>
+          </a:xfrm>
+        </p:spPr>
+        <p:txBody>
+          <a:bodyPr/>
+          <a:lstStyle/>
+          <a:p>
+            <a:r>
+              <a:rPr lang="en-US" sz="2800" b="0" dirty="0" err="1">
+                <a:effectLst/>
+                <a:latin typeface="Consolas" panose="020B0609020204030204" pitchFamily="49" charset="0"/>
+              </a:rPr>
+              <a:t>pitch_range</a:t>
+            </a:r>
+            <a:r>
+              <a:rPr lang="en-US" sz="2800" b="0" dirty="0">
+                <a:effectLst/>
+                <a:latin typeface="Consolas" panose="020B0609020204030204" pitchFamily="49" charset="0"/>
+              </a:rPr>
+              <a:t>=[60, 8000], </a:t>
+            </a:r>
+          </a:p>
+          <a:p>
+            <a:endParaRPr lang="en-US" dirty="0"/>
+          </a:p>
+        </p:txBody>
+      </p:sp>
+      <p:pic>
+        <p:nvPicPr>
+          <p:cNvPr id="7" name="Grafik 6">
+            <a:extLst>
+              <a:ext uri="{FF2B5EF4-FFF2-40B4-BE49-F238E27FC236}">
+                <a16:creationId xmlns:a16="http://schemas.microsoft.com/office/drawing/2014/main" id="{07730CBB-3232-E115-B493-4476230BAC8E}"/>
+              </a:ext>
+            </a:extLst>
+          </p:cNvPr>
+          <p:cNvPicPr>
+            <a:picLocks noChangeAspect="1"/>
+          </p:cNvPicPr>
+          <p:nvPr/>
+        </p:nvPicPr>
+        <p:blipFill>
+          <a:blip r:embed="rId2"/>
+          <a:stretch>
+            <a:fillRect/>
+          </a:stretch>
+        </p:blipFill>
+        <p:spPr>
+          <a:xfrm>
+            <a:off x="52387" y="1779669"/>
+            <a:ext cx="5447378" cy="4190869"/>
+          </a:xfrm>
+          <a:prstGeom prst="rect">
+            <a:avLst/>
+          </a:prstGeom>
+        </p:spPr>
+      </p:pic>
+      <p:pic>
+        <p:nvPicPr>
+          <p:cNvPr id="9" name="Grafik 8">
+            <a:extLst>
+              <a:ext uri="{FF2B5EF4-FFF2-40B4-BE49-F238E27FC236}">
+                <a16:creationId xmlns:a16="http://schemas.microsoft.com/office/drawing/2014/main" id="{04A4734F-00F8-83B2-6DDF-1806F6C6779C}"/>
+              </a:ext>
+            </a:extLst>
+          </p:cNvPr>
+          <p:cNvPicPr>
+            <a:picLocks noChangeAspect="1"/>
+          </p:cNvPicPr>
+          <p:nvPr/>
+        </p:nvPicPr>
+        <p:blipFill>
+          <a:blip r:embed="rId3"/>
+          <a:stretch>
+            <a:fillRect/>
+          </a:stretch>
+        </p:blipFill>
+        <p:spPr>
+          <a:xfrm>
+            <a:off x="5437852" y="1184308"/>
+            <a:ext cx="6532823" cy="5381592"/>
+          </a:xfrm>
+          <a:prstGeom prst="rect">
+            <a:avLst/>
+          </a:prstGeom>
+        </p:spPr>
+      </p:pic>
+    </p:spTree>
+    <p:extLst>
+      <p:ext uri="{BB962C8B-B14F-4D97-AF65-F5344CB8AC3E}">
+        <p14:creationId xmlns:p14="http://schemas.microsoft.com/office/powerpoint/2010/main" val="475159716"/>
+      </p:ext>
+    </p:extLst>
+  </p:cSld>
+  <p:clrMapOvr>
+    <a:masterClrMapping/>
+  </p:clrMapOvr>
+</p:sld>
+</file>
+
+<file path=ppt/slides/slide11.xml><?xml version="1.0" encoding="utf-8"?>
+<p:sld xmlns:a="http://schemas.openxmlformats.org/drawingml/2006/main" xmlns:r="http://schemas.openxmlformats.org/officeDocument/2006/relationships" xmlns:p="http://schemas.openxmlformats.org/presentationml/2006/main">
+  <p:cSld>
     <p:bg>
       <p:bgPr>
         <a:solidFill>
@@ -9377,22 +9907,12 @@
           </a:lstStyle>
           <a:p>
             <a:r>
-              <a:rPr lang="en-US" sz="2000"/>
+              <a:rPr lang="en-US" sz="2000" dirty="0" err="1"/>
               <a:t>pitch_range</a:t>
             </a:r>
             <a:r>
               <a:rPr lang="en-US" sz="2000" dirty="0"/>
               <a:t>=[60, 8000], </a:t>
-            </a:r>
-          </a:p>
-          <a:p>
-            <a:r>
-              <a:rPr lang="en-US" sz="2000"/>
-              <a:t>trendline_quefrency_range</a:t>
-            </a:r>
-            <a:r>
-              <a:rPr lang="en-US" sz="2000" dirty="0"/>
-              <a:t>=[0.001, 0.05]</a:t>
             </a:r>
           </a:p>
           <a:p>
@@ -9473,7 +9993,7 @@
 </p:sld>
 </file>
 
-<file path=ppt/slides/slide11.xml><?xml version="1.0" encoding="utf-8"?>
+<file path=ppt/slides/slide12.xml><?xml version="1.0" encoding="utf-8"?>
 <p:sld xmlns:a="http://schemas.openxmlformats.org/drawingml/2006/main" xmlns:r="http://schemas.openxmlformats.org/officeDocument/2006/relationships" xmlns:p="http://schemas.openxmlformats.org/presentationml/2006/main">
   <p:cSld>
     <p:spTree>
@@ -9546,22 +10066,6 @@
             </a:r>
             <a:r>
               <a:rPr lang="de-DE" dirty="0" err="1"/>
-              <a:t>from</a:t>
-            </a:r>
-            <a:r>
-              <a:rPr lang="de-DE" dirty="0"/>
-              <a:t> </a:t>
-            </a:r>
-            <a:r>
-              <a:rPr lang="de-DE" dirty="0" err="1"/>
-              <a:t>the</a:t>
-            </a:r>
-            <a:r>
-              <a:rPr lang="de-DE" dirty="0"/>
-              <a:t> </a:t>
-            </a:r>
-            <a:r>
-              <a:rPr lang="de-DE" dirty="0" err="1"/>
               <a:t>model</a:t>
             </a:r>
             <a:r>
@@ -9700,7 +10204,7 @@
               </a:lnSpc>
             </a:pPr>
             <a:r>
-              <a:rPr lang="en-US" sz="800" b="0" dirty="0">
+              <a:rPr lang="en-US" sz="1000" b="0" dirty="0">
                 <a:effectLst/>
                 <a:latin typeface="Consolas" panose="020B0609020204030204" pitchFamily="49" charset="0"/>
               </a:rPr>
@@ -9714,7 +10218,7 @@
               </a:lnSpc>
             </a:pPr>
             <a:r>
-              <a:rPr lang="en-US" sz="800" b="0" dirty="0">
+              <a:rPr lang="en-US" sz="1000" b="0" dirty="0">
                 <a:effectLst/>
                 <a:latin typeface="Consolas" panose="020B0609020204030204" pitchFamily="49" charset="0"/>
               </a:rPr>
@@ -9750,7 +10254,7 @@
 </p:sld>
 </file>
 
-<file path=ppt/slides/slide12.xml><?xml version="1.0" encoding="utf-8"?>
+<file path=ppt/slides/slide13.xml><?xml version="1.0" encoding="utf-8"?>
 <p:sld xmlns:a="http://schemas.openxmlformats.org/drawingml/2006/main" xmlns:r="http://schemas.openxmlformats.org/officeDocument/2006/relationships" xmlns:p="http://schemas.openxmlformats.org/presentationml/2006/main">
   <p:cSld>
     <p:bg>
@@ -9848,7 +10352,7 @@
 </p:sld>
 </file>
 
-<file path=ppt/slides/slide13.xml><?xml version="1.0" encoding="utf-8"?>
+<file path=ppt/slides/slide14.xml><?xml version="1.0" encoding="utf-8"?>
 <p:sld xmlns:a="http://schemas.openxmlformats.org/drawingml/2006/main" xmlns:r="http://schemas.openxmlformats.org/officeDocument/2006/relationships" xmlns:p="http://schemas.openxmlformats.org/presentationml/2006/main">
   <p:cSld>
     <p:spTree>
@@ -9892,7 +10396,7 @@
             </a:r>
             <a:r>
               <a:rPr lang="de-DE" dirty="0" err="1"/>
-              <a:t>nodel</a:t>
+              <a:t>model</a:t>
             </a:r>
             <a:endParaRPr lang="en-US" dirty="0"/>
           </a:p>
@@ -10077,7 +10581,7 @@
 </p:sld>
 </file>
 
-<file path=ppt/slides/slide14.xml><?xml version="1.0" encoding="utf-8"?>
+<file path=ppt/slides/slide15.xml><?xml version="1.0" encoding="utf-8"?>
 <p:sld xmlns:a="http://schemas.openxmlformats.org/drawingml/2006/main" xmlns:r="http://schemas.openxmlformats.org/officeDocument/2006/relationships" xmlns:p="http://schemas.openxmlformats.org/presentationml/2006/main">
   <p:cSld>
     <p:spTree>
@@ -10227,7 +10731,7 @@
 </p:sld>
 </file>
 
-<file path=ppt/slides/slide15.xml><?xml version="1.0" encoding="utf-8"?>
+<file path=ppt/slides/slide16.xml><?xml version="1.0" encoding="utf-8"?>
 <p:sld xmlns:a="http://schemas.openxmlformats.org/drawingml/2006/main" xmlns:r="http://schemas.openxmlformats.org/officeDocument/2006/relationships" xmlns:p="http://schemas.openxmlformats.org/presentationml/2006/main">
   <p:cSld>
     <p:spTree>
@@ -10383,7 +10887,7 @@
 </p:sld>
 </file>
 
-<file path=ppt/slides/slide16.xml><?xml version="1.0" encoding="utf-8"?>
+<file path=ppt/slides/slide17.xml><?xml version="1.0" encoding="utf-8"?>
 <p:sld xmlns:a="http://schemas.openxmlformats.org/drawingml/2006/main" xmlns:r="http://schemas.openxmlformats.org/officeDocument/2006/relationships" xmlns:p="http://schemas.openxmlformats.org/presentationml/2006/main">
   <p:cSld>
     <p:spTree>
@@ -10503,7 +11007,905 @@
 </p:sld>
 </file>
 
+<file path=ppt/slides/slide18.xml><?xml version="1.0" encoding="utf-8"?>
+<p:sld xmlns:a="http://schemas.openxmlformats.org/drawingml/2006/main" xmlns:r="http://schemas.openxmlformats.org/officeDocument/2006/relationships" xmlns:p="http://schemas.openxmlformats.org/presentationml/2006/main">
+  <p:cSld>
+    <p:spTree>
+      <p:nvGrpSpPr>
+        <p:cNvPr id="1" name=""/>
+        <p:cNvGrpSpPr/>
+        <p:nvPr/>
+      </p:nvGrpSpPr>
+      <p:grpSpPr>
+        <a:xfrm>
+          <a:off x="0" y="0"/>
+          <a:ext cx="0" cy="0"/>
+          <a:chOff x="0" y="0"/>
+          <a:chExt cx="0" cy="0"/>
+        </a:xfrm>
+      </p:grpSpPr>
+      <p:sp>
+        <p:nvSpPr>
+          <p:cNvPr id="2" name="Titel 1">
+            <a:extLst>
+              <a:ext uri="{FF2B5EF4-FFF2-40B4-BE49-F238E27FC236}">
+                <a16:creationId xmlns:a16="http://schemas.microsoft.com/office/drawing/2014/main" id="{A41905CD-1B88-4006-462A-F2FD03E19A84}"/>
+              </a:ext>
+            </a:extLst>
+          </p:cNvPr>
+          <p:cNvSpPr>
+            <a:spLocks noGrp="1"/>
+          </p:cNvSpPr>
+          <p:nvPr>
+            <p:ph type="title"/>
+          </p:nvPr>
+        </p:nvSpPr>
+        <p:spPr/>
+        <p:txBody>
+          <a:bodyPr/>
+          <a:lstStyle/>
+          <a:p>
+            <a:r>
+              <a:rPr lang="de-DE" dirty="0"/>
+              <a:t>Valentini Paper – On </a:t>
+            </a:r>
+            <a:r>
+              <a:rPr lang="de-DE" dirty="0" err="1"/>
+              <a:t>the</a:t>
+            </a:r>
+            <a:r>
+              <a:rPr lang="de-DE" dirty="0"/>
+              <a:t> </a:t>
+            </a:r>
+            <a:r>
+              <a:rPr lang="de-DE" dirty="0" err="1"/>
+              <a:t>big</a:t>
+            </a:r>
+            <a:r>
+              <a:rPr lang="de-DE" dirty="0"/>
+              <a:t> </a:t>
+            </a:r>
+            <a:r>
+              <a:rPr lang="de-DE" dirty="0" err="1"/>
+              <a:t>dataset</a:t>
+            </a:r>
+            <a:endParaRPr lang="en-US" dirty="0"/>
+          </a:p>
+        </p:txBody>
+      </p:sp>
+      <p:pic>
+        <p:nvPicPr>
+          <p:cNvPr id="5" name="Grafik 4">
+            <a:extLst>
+              <a:ext uri="{FF2B5EF4-FFF2-40B4-BE49-F238E27FC236}">
+                <a16:creationId xmlns:a16="http://schemas.microsoft.com/office/drawing/2014/main" id="{EDDB1130-2F82-B074-348F-9F668D0CC8FC}"/>
+              </a:ext>
+            </a:extLst>
+          </p:cNvPr>
+          <p:cNvPicPr>
+            <a:picLocks noChangeAspect="1"/>
+          </p:cNvPicPr>
+          <p:nvPr/>
+        </p:nvPicPr>
+        <p:blipFill>
+          <a:blip r:embed="rId2"/>
+          <a:stretch>
+            <a:fillRect/>
+          </a:stretch>
+        </p:blipFill>
+        <p:spPr>
+          <a:xfrm>
+            <a:off x="423779" y="3118867"/>
+            <a:ext cx="5495294" cy="1325563"/>
+          </a:xfrm>
+          <a:prstGeom prst="rect">
+            <a:avLst/>
+          </a:prstGeom>
+        </p:spPr>
+      </p:pic>
+      <p:sp>
+        <p:nvSpPr>
+          <p:cNvPr id="6" name="Textfeld 5">
+            <a:extLst>
+              <a:ext uri="{FF2B5EF4-FFF2-40B4-BE49-F238E27FC236}">
+                <a16:creationId xmlns:a16="http://schemas.microsoft.com/office/drawing/2014/main" id="{007BCBC7-7845-E1E7-0DE9-AD2F9EF45B9C}"/>
+              </a:ext>
+            </a:extLst>
+          </p:cNvPr>
+          <p:cNvSpPr txBox="1"/>
+          <p:nvPr/>
+        </p:nvSpPr>
+        <p:spPr>
+          <a:xfrm>
+            <a:off x="423779" y="2675823"/>
+            <a:ext cx="4562107" cy="369332"/>
+          </a:xfrm>
+          <a:prstGeom prst="rect">
+            <a:avLst/>
+          </a:prstGeom>
+          <a:noFill/>
+        </p:spPr>
+        <p:txBody>
+          <a:bodyPr wrap="square" rtlCol="0">
+            <a:spAutoFit/>
+          </a:bodyPr>
+          <a:lstStyle/>
+          <a:p>
+            <a:r>
+              <a:rPr lang="de-DE" dirty="0"/>
+              <a:t>SVM </a:t>
+            </a:r>
+            <a:r>
+              <a:rPr lang="de-DE" dirty="0" err="1"/>
+              <a:t>used</a:t>
+            </a:r>
+            <a:r>
+              <a:rPr lang="de-DE" dirty="0"/>
+              <a:t> </a:t>
+            </a:r>
+            <a:r>
+              <a:rPr lang="de-DE" dirty="0" err="1"/>
+              <a:t>for</a:t>
+            </a:r>
+            <a:r>
+              <a:rPr lang="de-DE" dirty="0"/>
+              <a:t> </a:t>
+            </a:r>
+            <a:r>
+              <a:rPr lang="de-DE" dirty="0" err="1"/>
+              <a:t>calssification</a:t>
+            </a:r>
+            <a:endParaRPr lang="en-US" dirty="0"/>
+          </a:p>
+        </p:txBody>
+      </p:sp>
+      <p:pic>
+        <p:nvPicPr>
+          <p:cNvPr id="8" name="Grafik 7">
+            <a:extLst>
+              <a:ext uri="{FF2B5EF4-FFF2-40B4-BE49-F238E27FC236}">
+                <a16:creationId xmlns:a16="http://schemas.microsoft.com/office/drawing/2014/main" id="{A165DBBC-EF9C-5E0C-4F5F-65B698E74396}"/>
+              </a:ext>
+            </a:extLst>
+          </p:cNvPr>
+          <p:cNvPicPr>
+            <a:picLocks noChangeAspect="1"/>
+          </p:cNvPicPr>
+          <p:nvPr/>
+        </p:nvPicPr>
+        <p:blipFill>
+          <a:blip r:embed="rId3"/>
+          <a:stretch>
+            <a:fillRect/>
+          </a:stretch>
+        </p:blipFill>
+        <p:spPr>
+          <a:xfrm>
+            <a:off x="5921471" y="3045154"/>
+            <a:ext cx="5946477" cy="1438663"/>
+          </a:xfrm>
+          <a:prstGeom prst="rect">
+            <a:avLst/>
+          </a:prstGeom>
+        </p:spPr>
+      </p:pic>
+      <p:sp>
+        <p:nvSpPr>
+          <p:cNvPr id="9" name="Textfeld 8">
+            <a:extLst>
+              <a:ext uri="{FF2B5EF4-FFF2-40B4-BE49-F238E27FC236}">
+                <a16:creationId xmlns:a16="http://schemas.microsoft.com/office/drawing/2014/main" id="{7647EE26-9FC4-3032-CC3A-E677C2B15FA6}"/>
+              </a:ext>
+            </a:extLst>
+          </p:cNvPr>
+          <p:cNvSpPr txBox="1"/>
+          <p:nvPr/>
+        </p:nvSpPr>
+        <p:spPr>
+          <a:xfrm>
+            <a:off x="6096000" y="2675823"/>
+            <a:ext cx="4562107" cy="369332"/>
+          </a:xfrm>
+          <a:prstGeom prst="rect">
+            <a:avLst/>
+          </a:prstGeom>
+          <a:noFill/>
+        </p:spPr>
+        <p:txBody>
+          <a:bodyPr wrap="square" rtlCol="0">
+            <a:spAutoFit/>
+          </a:bodyPr>
+          <a:lstStyle/>
+          <a:p>
+            <a:r>
+              <a:rPr lang="de-DE" dirty="0" err="1"/>
+              <a:t>AdaBoost</a:t>
+            </a:r>
+            <a:r>
+              <a:rPr lang="de-DE" dirty="0"/>
+              <a:t> </a:t>
+            </a:r>
+            <a:r>
+              <a:rPr lang="de-DE" dirty="0" err="1"/>
+              <a:t>used</a:t>
+            </a:r>
+            <a:r>
+              <a:rPr lang="de-DE" dirty="0"/>
+              <a:t> </a:t>
+            </a:r>
+            <a:r>
+              <a:rPr lang="de-DE" dirty="0" err="1"/>
+              <a:t>for</a:t>
+            </a:r>
+            <a:r>
+              <a:rPr lang="de-DE" dirty="0"/>
+              <a:t> </a:t>
+            </a:r>
+            <a:r>
+              <a:rPr lang="de-DE" dirty="0" err="1"/>
+              <a:t>calssification</a:t>
+            </a:r>
+            <a:endParaRPr lang="en-US" dirty="0"/>
+          </a:p>
+        </p:txBody>
+      </p:sp>
+    </p:spTree>
+    <p:extLst>
+      <p:ext uri="{BB962C8B-B14F-4D97-AF65-F5344CB8AC3E}">
+        <p14:creationId xmlns:p14="http://schemas.microsoft.com/office/powerpoint/2010/main" val="2228676399"/>
+      </p:ext>
+    </p:extLst>
+  </p:cSld>
+  <p:clrMapOvr>
+    <a:masterClrMapping/>
+  </p:clrMapOvr>
+</p:sld>
+</file>
+
+<file path=ppt/slides/slide19.xml><?xml version="1.0" encoding="utf-8"?>
+<p:sld xmlns:a="http://schemas.openxmlformats.org/drawingml/2006/main" xmlns:r="http://schemas.openxmlformats.org/officeDocument/2006/relationships" xmlns:p="http://schemas.openxmlformats.org/presentationml/2006/main">
+  <p:cSld>
+    <p:spTree>
+      <p:nvGrpSpPr>
+        <p:cNvPr id="1" name=""/>
+        <p:cNvGrpSpPr/>
+        <p:nvPr/>
+      </p:nvGrpSpPr>
+      <p:grpSpPr>
+        <a:xfrm>
+          <a:off x="0" y="0"/>
+          <a:ext cx="0" cy="0"/>
+          <a:chOff x="0" y="0"/>
+          <a:chExt cx="0" cy="0"/>
+        </a:xfrm>
+      </p:grpSpPr>
+      <p:sp>
+        <p:nvSpPr>
+          <p:cNvPr id="2" name="Titel 1">
+            <a:extLst>
+              <a:ext uri="{FF2B5EF4-FFF2-40B4-BE49-F238E27FC236}">
+                <a16:creationId xmlns:a16="http://schemas.microsoft.com/office/drawing/2014/main" id="{7FEC82B8-B93A-6B4F-B1EB-4D7842484FCB}"/>
+              </a:ext>
+            </a:extLst>
+          </p:cNvPr>
+          <p:cNvSpPr>
+            <a:spLocks noGrp="1"/>
+          </p:cNvSpPr>
+          <p:nvPr>
+            <p:ph type="title"/>
+          </p:nvPr>
+        </p:nvSpPr>
+        <p:spPr/>
+        <p:txBody>
+          <a:bodyPr/>
+          <a:lstStyle/>
+          <a:p>
+            <a:r>
+              <a:rPr lang="de-DE" dirty="0"/>
+              <a:t>Next </a:t>
+            </a:r>
+            <a:r>
+              <a:rPr lang="de-DE" dirty="0" err="1"/>
+              <a:t>Steps</a:t>
+            </a:r>
+            <a:r>
+              <a:rPr lang="de-DE" dirty="0"/>
+              <a:t>:</a:t>
+            </a:r>
+            <a:endParaRPr lang="en-US" dirty="0"/>
+          </a:p>
+        </p:txBody>
+      </p:sp>
+      <p:sp>
+        <p:nvSpPr>
+          <p:cNvPr id="3" name="Inhaltsplatzhalter 2">
+            <a:extLst>
+              <a:ext uri="{FF2B5EF4-FFF2-40B4-BE49-F238E27FC236}">
+                <a16:creationId xmlns:a16="http://schemas.microsoft.com/office/drawing/2014/main" id="{39B0E42A-F805-D081-9CBE-F8C3B1C3CA97}"/>
+              </a:ext>
+            </a:extLst>
+          </p:cNvPr>
+          <p:cNvSpPr>
+            <a:spLocks noGrp="1"/>
+          </p:cNvSpPr>
+          <p:nvPr>
+            <p:ph idx="1"/>
+          </p:nvPr>
+        </p:nvSpPr>
+        <p:spPr/>
+        <p:txBody>
+          <a:bodyPr>
+            <a:normAutofit lnSpcReduction="10000"/>
+          </a:bodyPr>
+          <a:lstStyle/>
+          <a:p>
+            <a:r>
+              <a:rPr lang="de-DE" dirty="0" err="1"/>
+              <a:t>Hyperparamtuning</a:t>
+            </a:r>
+            <a:r>
+              <a:rPr lang="de-DE" dirty="0"/>
+              <a:t> </a:t>
+            </a:r>
+            <a:r>
+              <a:rPr lang="de-DE" dirty="0" err="1"/>
+              <a:t>for</a:t>
+            </a:r>
+            <a:r>
+              <a:rPr lang="de-DE" dirty="0"/>
+              <a:t> MFCC, Mel-</a:t>
+            </a:r>
+            <a:r>
+              <a:rPr lang="de-DE" dirty="0" err="1"/>
+              <a:t>Specto</a:t>
+            </a:r>
+            <a:r>
+              <a:rPr lang="de-DE" dirty="0"/>
+              <a:t>, Attention 1 &amp;2</a:t>
+            </a:r>
+          </a:p>
+          <a:p>
+            <a:pPr lvl="1"/>
+            <a:r>
+              <a:rPr lang="de-DE" dirty="0" err="1"/>
+              <a:t>How</a:t>
+            </a:r>
+            <a:r>
+              <a:rPr lang="de-DE" dirty="0"/>
+              <a:t> </a:t>
+            </a:r>
+            <a:r>
+              <a:rPr lang="de-DE" dirty="0" err="1"/>
+              <a:t>to</a:t>
+            </a:r>
+            <a:r>
+              <a:rPr lang="de-DE" dirty="0"/>
+              <a:t> </a:t>
+            </a:r>
+            <a:r>
+              <a:rPr lang="de-DE" dirty="0" err="1"/>
+              <a:t>make</a:t>
+            </a:r>
+            <a:r>
+              <a:rPr lang="de-DE" dirty="0"/>
+              <a:t> </a:t>
+            </a:r>
+            <a:r>
+              <a:rPr lang="de-DE" dirty="0" err="1"/>
+              <a:t>fixed</a:t>
+            </a:r>
+            <a:r>
+              <a:rPr lang="de-DE" dirty="0"/>
+              <a:t> </a:t>
+            </a:r>
+            <a:r>
+              <a:rPr lang="de-DE" dirty="0" err="1"/>
+              <a:t>lists</a:t>
+            </a:r>
+            <a:r>
+              <a:rPr lang="de-DE" dirty="0"/>
+              <a:t>? </a:t>
+            </a:r>
+            <a:r>
+              <a:rPr lang="de-DE" dirty="0" err="1"/>
+              <a:t>How</a:t>
+            </a:r>
+            <a:r>
+              <a:rPr lang="de-DE" dirty="0"/>
+              <a:t> </a:t>
+            </a:r>
+            <a:r>
+              <a:rPr lang="de-DE" dirty="0" err="1"/>
+              <a:t>often</a:t>
+            </a:r>
+            <a:r>
+              <a:rPr lang="de-DE" dirty="0"/>
+              <a:t> </a:t>
+            </a:r>
+            <a:r>
+              <a:rPr lang="de-DE" dirty="0" err="1"/>
+              <a:t>what</a:t>
+            </a:r>
+            <a:r>
+              <a:rPr lang="de-DE" dirty="0"/>
+              <a:t> and </a:t>
+            </a:r>
+            <a:r>
+              <a:rPr lang="de-DE" dirty="0" err="1"/>
+              <a:t>how</a:t>
+            </a:r>
+            <a:r>
+              <a:rPr lang="de-DE" dirty="0"/>
+              <a:t> </a:t>
+            </a:r>
+            <a:r>
+              <a:rPr lang="de-DE" dirty="0" err="1"/>
+              <a:t>many</a:t>
+            </a:r>
+            <a:r>
+              <a:rPr lang="de-DE" dirty="0"/>
+              <a:t> </a:t>
+            </a:r>
+            <a:r>
+              <a:rPr lang="de-DE" dirty="0" err="1"/>
+              <a:t>times</a:t>
+            </a:r>
+            <a:r>
+              <a:rPr lang="de-DE" dirty="0"/>
+              <a:t> </a:t>
+            </a:r>
+            <a:r>
+              <a:rPr lang="de-DE" dirty="0" err="1"/>
+              <a:t>augmented</a:t>
+            </a:r>
+            <a:r>
+              <a:rPr lang="de-DE" dirty="0"/>
+              <a:t>?</a:t>
+            </a:r>
+          </a:p>
+          <a:p>
+            <a:pPr lvl="1"/>
+            <a:r>
+              <a:rPr lang="de-DE" dirty="0" err="1"/>
+              <a:t>Should</a:t>
+            </a:r>
+            <a:r>
+              <a:rPr lang="de-DE" dirty="0"/>
+              <a:t> i do </a:t>
+            </a:r>
+            <a:r>
+              <a:rPr lang="de-DE" dirty="0" err="1"/>
+              <a:t>random</a:t>
+            </a:r>
+            <a:r>
+              <a:rPr lang="de-DE" dirty="0"/>
+              <a:t> </a:t>
+            </a:r>
+            <a:r>
+              <a:rPr lang="de-DE" dirty="0" err="1"/>
+              <a:t>Crop</a:t>
+            </a:r>
+            <a:r>
+              <a:rPr lang="de-DE" dirty="0"/>
+              <a:t>/</a:t>
+            </a:r>
+            <a:r>
+              <a:rPr lang="de-DE" dirty="0" err="1"/>
+              <a:t>pad</a:t>
+            </a:r>
+            <a:r>
+              <a:rPr lang="de-DE" dirty="0"/>
+              <a:t> on </a:t>
+            </a:r>
+            <a:r>
+              <a:rPr lang="de-DE" dirty="0" err="1"/>
+              <a:t>audio</a:t>
+            </a:r>
+            <a:r>
+              <a:rPr lang="de-DE" dirty="0"/>
+              <a:t>?</a:t>
+            </a:r>
+          </a:p>
+          <a:p>
+            <a:pPr lvl="1"/>
+            <a:r>
+              <a:rPr lang="de-DE" dirty="0" err="1"/>
+              <a:t>Should</a:t>
+            </a:r>
+            <a:r>
+              <a:rPr lang="de-DE" dirty="0"/>
+              <a:t> i do </a:t>
+            </a:r>
+            <a:r>
+              <a:rPr lang="de-DE" dirty="0" err="1"/>
+              <a:t>any</a:t>
+            </a:r>
+            <a:r>
+              <a:rPr lang="de-DE" dirty="0"/>
+              <a:t> </a:t>
+            </a:r>
+            <a:r>
+              <a:rPr lang="de-DE" dirty="0" err="1"/>
+              <a:t>augmentations</a:t>
+            </a:r>
+            <a:r>
+              <a:rPr lang="de-DE" dirty="0"/>
+              <a:t> on </a:t>
+            </a:r>
+            <a:r>
+              <a:rPr lang="de-DE" dirty="0" err="1"/>
+              <a:t>the</a:t>
+            </a:r>
+            <a:r>
+              <a:rPr lang="de-DE" dirty="0"/>
+              <a:t> </a:t>
+            </a:r>
+            <a:r>
+              <a:rPr lang="de-DE" dirty="0" err="1"/>
+              <a:t>images</a:t>
+            </a:r>
+            <a:r>
+              <a:rPr lang="de-DE" dirty="0"/>
+              <a:t>?</a:t>
+            </a:r>
+          </a:p>
+          <a:p>
+            <a:r>
+              <a:rPr lang="de-DE" dirty="0" err="1"/>
+              <a:t>Hyperparam</a:t>
+            </a:r>
+            <a:r>
+              <a:rPr lang="de-DE" dirty="0"/>
+              <a:t> </a:t>
+            </a:r>
+            <a:r>
+              <a:rPr lang="de-DE" dirty="0" err="1"/>
+              <a:t>training</a:t>
+            </a:r>
+            <a:r>
+              <a:rPr lang="de-DE" dirty="0"/>
+              <a:t> </a:t>
+            </a:r>
+            <a:r>
+              <a:rPr lang="de-DE" dirty="0" err="1"/>
+              <a:t>for</a:t>
+            </a:r>
+            <a:r>
+              <a:rPr lang="de-DE" dirty="0"/>
+              <a:t> STT </a:t>
+            </a:r>
+            <a:r>
+              <a:rPr lang="de-DE" dirty="0" err="1"/>
+              <a:t>approach</a:t>
+            </a:r>
+            <a:r>
+              <a:rPr lang="de-DE" dirty="0"/>
+              <a:t>.</a:t>
+            </a:r>
+          </a:p>
+          <a:p>
+            <a:pPr lvl="1"/>
+            <a:r>
+              <a:rPr lang="de-DE" dirty="0" err="1"/>
+              <a:t>Only</a:t>
+            </a:r>
+            <a:r>
+              <a:rPr lang="de-DE" dirty="0"/>
+              <a:t> </a:t>
+            </a:r>
+            <a:r>
+              <a:rPr lang="de-DE" dirty="0" err="1"/>
+              <a:t>take</a:t>
+            </a:r>
+            <a:r>
+              <a:rPr lang="de-DE" dirty="0"/>
+              <a:t> </a:t>
+            </a:r>
+            <a:r>
+              <a:rPr lang="de-DE" dirty="0" err="1"/>
+              <a:t>rows</a:t>
+            </a:r>
+            <a:r>
+              <a:rPr lang="de-DE" dirty="0"/>
+              <a:t> </a:t>
+            </a:r>
+            <a:r>
+              <a:rPr lang="de-DE" dirty="0" err="1"/>
+              <a:t>of</a:t>
+            </a:r>
+            <a:r>
+              <a:rPr lang="de-DE" dirty="0"/>
+              <a:t> </a:t>
+            </a:r>
+            <a:r>
+              <a:rPr lang="de-DE" dirty="0" err="1"/>
+              <a:t>s,x,z</a:t>
+            </a:r>
+            <a:r>
+              <a:rPr lang="de-DE" dirty="0"/>
+              <a:t>? -&gt; </a:t>
+            </a:r>
+            <a:r>
+              <a:rPr lang="de-DE" dirty="0" err="1"/>
+              <a:t>small</a:t>
+            </a:r>
+            <a:r>
+              <a:rPr lang="de-DE" dirty="0"/>
+              <a:t> </a:t>
+            </a:r>
+            <a:r>
+              <a:rPr lang="de-DE" dirty="0" err="1"/>
+              <a:t>input</a:t>
+            </a:r>
+            <a:r>
+              <a:rPr lang="de-DE" dirty="0"/>
+              <a:t>?</a:t>
+            </a:r>
+          </a:p>
+          <a:p>
+            <a:pPr lvl="1"/>
+            <a:r>
+              <a:rPr lang="en-US"/>
+              <a:t>Any augmentations?</a:t>
+            </a:r>
+            <a:endParaRPr lang="en-US" dirty="0"/>
+          </a:p>
+          <a:p>
+            <a:r>
+              <a:rPr lang="en-US" dirty="0"/>
+              <a:t>How to resize?</a:t>
+            </a:r>
+          </a:p>
+          <a:p>
+            <a:pPr lvl="1"/>
+            <a:r>
+              <a:rPr lang="en-US" dirty="0"/>
+              <a:t>First pad till longest word in time axis. Then interpolate in both axis.</a:t>
+            </a:r>
+          </a:p>
+          <a:p>
+            <a:pPr lvl="2"/>
+            <a:r>
+              <a:rPr lang="en-US" dirty="0"/>
+              <a:t>Do that for STT, MFCC, Mel </a:t>
+            </a:r>
+            <a:r>
+              <a:rPr lang="en-US" dirty="0" err="1"/>
+              <a:t>Specto</a:t>
+            </a:r>
+            <a:r>
+              <a:rPr lang="en-US" dirty="0"/>
+              <a:t>?</a:t>
+            </a:r>
+            <a:endParaRPr lang="de-DE" dirty="0"/>
+          </a:p>
+        </p:txBody>
+      </p:sp>
+    </p:spTree>
+    <p:extLst>
+      <p:ext uri="{BB962C8B-B14F-4D97-AF65-F5344CB8AC3E}">
+        <p14:creationId xmlns:p14="http://schemas.microsoft.com/office/powerpoint/2010/main" val="4228036351"/>
+      </p:ext>
+    </p:extLst>
+  </p:cSld>
+  <p:clrMapOvr>
+    <a:masterClrMapping/>
+  </p:clrMapOvr>
+</p:sld>
+</file>
+
 <file path=ppt/slides/slide2.xml><?xml version="1.0" encoding="utf-8"?>
+<p:sld xmlns:a="http://schemas.openxmlformats.org/drawingml/2006/main" xmlns:r="http://schemas.openxmlformats.org/officeDocument/2006/relationships" xmlns:p="http://schemas.openxmlformats.org/presentationml/2006/main">
+  <p:cSld>
+    <p:spTree>
+      <p:nvGrpSpPr>
+        <p:cNvPr id="1" name=""/>
+        <p:cNvGrpSpPr/>
+        <p:nvPr/>
+      </p:nvGrpSpPr>
+      <p:grpSpPr>
+        <a:xfrm>
+          <a:off x="0" y="0"/>
+          <a:ext cx="0" cy="0"/>
+          <a:chOff x="0" y="0"/>
+          <a:chExt cx="0" cy="0"/>
+        </a:xfrm>
+      </p:grpSpPr>
+      <p:sp>
+        <p:nvSpPr>
+          <p:cNvPr id="2" name="Titel 1">
+            <a:extLst>
+              <a:ext uri="{FF2B5EF4-FFF2-40B4-BE49-F238E27FC236}">
+                <a16:creationId xmlns:a16="http://schemas.microsoft.com/office/drawing/2014/main" id="{D87EA94F-E9AF-BDFF-E5B5-10D77518CFCA}"/>
+              </a:ext>
+            </a:extLst>
+          </p:cNvPr>
+          <p:cNvSpPr>
+            <a:spLocks noGrp="1"/>
+          </p:cNvSpPr>
+          <p:nvPr>
+            <p:ph type="title"/>
+          </p:nvPr>
+        </p:nvSpPr>
+        <p:spPr/>
+        <p:txBody>
+          <a:bodyPr/>
+          <a:lstStyle/>
+          <a:p>
+            <a:r>
+              <a:rPr lang="de-DE" dirty="0"/>
+              <a:t>Human Baseline</a:t>
+            </a:r>
+            <a:endParaRPr lang="en-US" dirty="0"/>
+          </a:p>
+        </p:txBody>
+      </p:sp>
+      <p:sp>
+        <p:nvSpPr>
+          <p:cNvPr id="3" name="Inhaltsplatzhalter 2">
+            <a:extLst>
+              <a:ext uri="{FF2B5EF4-FFF2-40B4-BE49-F238E27FC236}">
+                <a16:creationId xmlns:a16="http://schemas.microsoft.com/office/drawing/2014/main" id="{3752942B-D0C1-B1F1-F209-A10DAE98FE84}"/>
+              </a:ext>
+            </a:extLst>
+          </p:cNvPr>
+          <p:cNvSpPr>
+            <a:spLocks noGrp="1"/>
+          </p:cNvSpPr>
+          <p:nvPr>
+            <p:ph idx="1"/>
+          </p:nvPr>
+        </p:nvSpPr>
+        <p:spPr/>
+        <p:txBody>
+          <a:bodyPr/>
+          <a:lstStyle/>
+          <a:p>
+            <a:r>
+              <a:rPr lang="de-DE" dirty="0"/>
+              <a:t>468 </a:t>
+            </a:r>
+            <a:r>
+              <a:rPr lang="de-DE" dirty="0" err="1"/>
+              <a:t>words</a:t>
+            </a:r>
+            <a:endParaRPr lang="de-DE" dirty="0"/>
+          </a:p>
+          <a:p>
+            <a:r>
+              <a:rPr lang="de-DE" dirty="0"/>
+              <a:t>All </a:t>
+            </a:r>
+            <a:r>
+              <a:rPr lang="de-DE" dirty="0" err="1"/>
+              <a:t>data</a:t>
+            </a:r>
+            <a:r>
+              <a:rPr lang="de-DE" dirty="0"/>
+              <a:t> </a:t>
+            </a:r>
+            <a:r>
+              <a:rPr lang="de-DE" dirty="0" err="1"/>
+              <a:t>is</a:t>
+            </a:r>
+            <a:r>
+              <a:rPr lang="de-DE" dirty="0"/>
+              <a:t> </a:t>
+            </a:r>
+            <a:r>
+              <a:rPr lang="de-DE" dirty="0" err="1"/>
+              <a:t>saved</a:t>
+            </a:r>
+            <a:r>
+              <a:rPr lang="de-DE" dirty="0"/>
+              <a:t> in a </a:t>
+            </a:r>
+            <a:r>
+              <a:rPr lang="de-DE" dirty="0" err="1"/>
+              <a:t>csv</a:t>
+            </a:r>
+            <a:r>
+              <a:rPr lang="de-DE" dirty="0"/>
+              <a:t> </a:t>
+            </a:r>
+            <a:r>
+              <a:rPr lang="de-DE" dirty="0" err="1"/>
+              <a:t>for</a:t>
+            </a:r>
+            <a:r>
+              <a:rPr lang="de-DE" dirty="0"/>
+              <a:t> </a:t>
+            </a:r>
+            <a:r>
+              <a:rPr lang="de-DE" dirty="0" err="1"/>
+              <a:t>later</a:t>
+            </a:r>
+            <a:r>
+              <a:rPr lang="de-DE" dirty="0"/>
+              <a:t>  </a:t>
+            </a:r>
+            <a:r>
+              <a:rPr lang="de-DE" dirty="0" err="1"/>
+              <a:t>analysis</a:t>
+            </a:r>
+            <a:endParaRPr lang="de-DE" dirty="0"/>
+          </a:p>
+        </p:txBody>
+      </p:sp>
+      <p:pic>
+        <p:nvPicPr>
+          <p:cNvPr id="5" name="Grafik 4">
+            <a:extLst>
+              <a:ext uri="{FF2B5EF4-FFF2-40B4-BE49-F238E27FC236}">
+                <a16:creationId xmlns:a16="http://schemas.microsoft.com/office/drawing/2014/main" id="{CDF00677-E3EB-779A-BDAF-DFB01C82830D}"/>
+              </a:ext>
+            </a:extLst>
+          </p:cNvPr>
+          <p:cNvPicPr>
+            <a:picLocks noChangeAspect="1"/>
+          </p:cNvPicPr>
+          <p:nvPr/>
+        </p:nvPicPr>
+        <p:blipFill>
+          <a:blip r:embed="rId2"/>
+          <a:stretch>
+            <a:fillRect/>
+          </a:stretch>
+        </p:blipFill>
+        <p:spPr>
+          <a:xfrm>
+            <a:off x="838200" y="3690342"/>
+            <a:ext cx="3830053" cy="1881033"/>
+          </a:xfrm>
+          <a:prstGeom prst="rect">
+            <a:avLst/>
+          </a:prstGeom>
+        </p:spPr>
+      </p:pic>
+      <p:pic>
+        <p:nvPicPr>
+          <p:cNvPr id="7" name="Grafik 6">
+            <a:extLst>
+              <a:ext uri="{FF2B5EF4-FFF2-40B4-BE49-F238E27FC236}">
+                <a16:creationId xmlns:a16="http://schemas.microsoft.com/office/drawing/2014/main" id="{37310A8F-286E-1C26-EFF9-A83BE72A27C1}"/>
+              </a:ext>
+            </a:extLst>
+          </p:cNvPr>
+          <p:cNvPicPr>
+            <a:picLocks noChangeAspect="1"/>
+          </p:cNvPicPr>
+          <p:nvPr/>
+        </p:nvPicPr>
+        <p:blipFill>
+          <a:blip r:embed="rId3"/>
+          <a:stretch>
+            <a:fillRect/>
+          </a:stretch>
+        </p:blipFill>
+        <p:spPr>
+          <a:xfrm>
+            <a:off x="5674138" y="3686476"/>
+            <a:ext cx="5679662" cy="1884899"/>
+          </a:xfrm>
+          <a:prstGeom prst="rect">
+            <a:avLst/>
+          </a:prstGeom>
+        </p:spPr>
+      </p:pic>
+    </p:spTree>
+    <p:extLst>
+      <p:ext uri="{BB962C8B-B14F-4D97-AF65-F5344CB8AC3E}">
+        <p14:creationId xmlns:p14="http://schemas.microsoft.com/office/powerpoint/2010/main" val="515502319"/>
+      </p:ext>
+    </p:extLst>
+  </p:cSld>
+  <p:clrMapOvr>
+    <a:masterClrMapping/>
+  </p:clrMapOvr>
+</p:sld>
+</file>
+
+<file path=ppt/slides/slide3.xml><?xml version="1.0" encoding="utf-8"?>
 <p:sld xmlns:a="http://schemas.openxmlformats.org/drawingml/2006/main" xmlns:r="http://schemas.openxmlformats.org/officeDocument/2006/relationships" xmlns:p="http://schemas.openxmlformats.org/presentationml/2006/main">
   <p:cSld>
     <p:spTree>
@@ -10565,13 +11967,13 @@
             <p:ph idx="1"/>
             <p:extLst>
               <p:ext uri="{D42A27DB-BD31-4B8C-83A1-F6EECF244321}">
-                <p14:modId xmlns:p14="http://schemas.microsoft.com/office/powerpoint/2010/main" val="3511410680"/>
+                <p14:modId xmlns:p14="http://schemas.microsoft.com/office/powerpoint/2010/main" val="611889553"/>
               </p:ext>
             </p:extLst>
           </p:nvPr>
         </p:nvGraphicFramePr>
         <p:xfrm>
-          <a:off x="838200" y="1825625"/>
+          <a:off x="1396465" y="1325112"/>
           <a:ext cx="10515600" cy="4351338"/>
         </p:xfrm>
         <a:graphic>
@@ -10580,6 +11982,49 @@
           </a:graphicData>
         </a:graphic>
       </p:graphicFrame>
+      <p:sp>
+        <p:nvSpPr>
+          <p:cNvPr id="3" name="Textfeld 2">
+            <a:extLst>
+              <a:ext uri="{FF2B5EF4-FFF2-40B4-BE49-F238E27FC236}">
+                <a16:creationId xmlns:a16="http://schemas.microsoft.com/office/drawing/2014/main" id="{28D978D2-C776-AE7D-445F-3291AEEBC9AA}"/>
+              </a:ext>
+            </a:extLst>
+          </p:cNvPr>
+          <p:cNvSpPr txBox="1"/>
+          <p:nvPr/>
+        </p:nvSpPr>
+        <p:spPr>
+          <a:xfrm>
+            <a:off x="1602658" y="5456903"/>
+            <a:ext cx="7924800" cy="369332"/>
+          </a:xfrm>
+          <a:prstGeom prst="rect">
+            <a:avLst/>
+          </a:prstGeom>
+          <a:noFill/>
+        </p:spPr>
+        <p:txBody>
+          <a:bodyPr wrap="square" rtlCol="0">
+            <a:spAutoFit/>
+          </a:bodyPr>
+          <a:lstStyle/>
+          <a:p>
+            <a:r>
+              <a:rPr lang="en-US" dirty="0"/>
+              <a:t>Number of speakers in train: 48, </a:t>
+            </a:r>
+            <a:r>
+              <a:rPr lang="en-US" dirty="0" err="1"/>
+              <a:t>val</a:t>
+            </a:r>
+            <a:r>
+              <a:rPr lang="en-US" dirty="0"/>
+              <a:t>: 9 test: 4</a:t>
+            </a:r>
+          </a:p>
+        </p:txBody>
+      </p:sp>
     </p:spTree>
     <p:extLst>
       <p:ext uri="{BB962C8B-B14F-4D97-AF65-F5344CB8AC3E}">
@@ -10593,7 +12038,7 @@
 </p:sld>
 </file>
 
-<file path=ppt/slides/slide3.xml><?xml version="1.0" encoding="utf-8"?>
+<file path=ppt/slides/slide4.xml><?xml version="1.0" encoding="utf-8"?>
 <p:sld xmlns:a="http://schemas.openxmlformats.org/drawingml/2006/main" xmlns:r="http://schemas.openxmlformats.org/officeDocument/2006/relationships" xmlns:p="http://schemas.openxmlformats.org/presentationml/2006/main">
   <p:cSld>
     <p:spTree>
@@ -10830,7 +12275,7 @@
 </p:sld>
 </file>
 
-<file path=ppt/slides/slide4.xml><?xml version="1.0" encoding="utf-8"?>
+<file path=ppt/slides/slide5.xml><?xml version="1.0" encoding="utf-8"?>
 <p:sld xmlns:a="http://schemas.openxmlformats.org/drawingml/2006/main" xmlns:r="http://schemas.openxmlformats.org/officeDocument/2006/relationships" xmlns:p="http://schemas.openxmlformats.org/presentationml/2006/main">
   <p:cSld>
     <p:spTree>
@@ -10938,7 +12383,7 @@
 </p:sld>
 </file>
 
-<file path=ppt/slides/slide5.xml><?xml version="1.0" encoding="utf-8"?>
+<file path=ppt/slides/slide6.xml><?xml version="1.0" encoding="utf-8"?>
 <p:sld xmlns:a="http://schemas.openxmlformats.org/drawingml/2006/main" xmlns:r="http://schemas.openxmlformats.org/officeDocument/2006/relationships" xmlns:p="http://schemas.openxmlformats.org/presentationml/2006/main">
   <p:cSld>
     <p:spTree>
@@ -11054,7 +12499,7 @@
             </a:pPr>
             <a:r>
               <a:rPr lang="en-US" dirty="0"/>
-              <a:t>Applied that to each file for CPP,FAD. </a:t>
+              <a:t>Applied that to each wav file for CPP,FAD. </a:t>
             </a:r>
           </a:p>
           <a:p>
@@ -11071,7 +12516,7 @@
             </a:r>
             <a:r>
               <a:rPr lang="en-US" dirty="0"/>
-              <a:t>:</a:t>
+              <a:t>, STT-CNN:</a:t>
             </a:r>
           </a:p>
           <a:p>
@@ -11081,7 +12526,7 @@
             </a:pPr>
             <a:r>
               <a:rPr lang="en-US" dirty="0"/>
-              <a:t>Normalize only image with z-score. Avoid double normalization. </a:t>
+              <a:t>Normalize only image with z-score. Avoid double normalization? </a:t>
             </a:r>
           </a:p>
           <a:p>
@@ -11116,7 +12561,7 @@
 </p:sld>
 </file>
 
-<file path=ppt/slides/slide6.xml><?xml version="1.0" encoding="utf-8"?>
+<file path=ppt/slides/slide7.xml><?xml version="1.0" encoding="utf-8"?>
 <p:sld xmlns:a="http://schemas.openxmlformats.org/drawingml/2006/main" xmlns:r="http://schemas.openxmlformats.org/officeDocument/2006/relationships" xmlns:p="http://schemas.openxmlformats.org/presentationml/2006/main">
   <p:cSld>
     <p:spTree>
@@ -11192,6 +12637,54 @@
           </a:prstGeom>
         </p:spPr>
       </p:pic>
+      <p:sp>
+        <p:nvSpPr>
+          <p:cNvPr id="4" name="Textfeld 3">
+            <a:extLst>
+              <a:ext uri="{FF2B5EF4-FFF2-40B4-BE49-F238E27FC236}">
+                <a16:creationId xmlns:a16="http://schemas.microsoft.com/office/drawing/2014/main" id="{8804A342-CF9F-91B6-BB72-5077F2E48953}"/>
+              </a:ext>
+            </a:extLst>
+          </p:cNvPr>
+          <p:cNvSpPr txBox="1"/>
+          <p:nvPr/>
+        </p:nvSpPr>
+        <p:spPr>
+          <a:xfrm>
+            <a:off x="5417575" y="521110"/>
+            <a:ext cx="5496232" cy="646331"/>
+          </a:xfrm>
+          <a:prstGeom prst="rect">
+            <a:avLst/>
+          </a:prstGeom>
+          <a:noFill/>
+        </p:spPr>
+        <p:txBody>
+          <a:bodyPr wrap="square" rtlCol="0">
+            <a:spAutoFit/>
+          </a:bodyPr>
+          <a:lstStyle/>
+          <a:p>
+            <a:r>
+              <a:rPr lang="en-US" sz="1800" b="0" dirty="0" err="1">
+                <a:effectLst/>
+                <a:latin typeface="Consolas" panose="020B0609020204030204" pitchFamily="49" charset="0"/>
+              </a:rPr>
+              <a:t>trendline_quefrency_range</a:t>
+            </a:r>
+            <a:r>
+              <a:rPr lang="en-US" sz="1800" b="0" dirty="0">
+                <a:effectLst/>
+                <a:latin typeface="Consolas" panose="020B0609020204030204" pitchFamily="49" charset="0"/>
+              </a:rPr>
+              <a:t>=[0.001, 0.05]</a:t>
+            </a:r>
+          </a:p>
+          <a:p>
+            <a:endParaRPr lang="en-US" dirty="0"/>
+          </a:p>
+        </p:txBody>
+      </p:sp>
     </p:spTree>
     <p:extLst>
       <p:ext uri="{BB962C8B-B14F-4D97-AF65-F5344CB8AC3E}">
@@ -11205,7 +12698,7 @@
 </p:sld>
 </file>
 
-<file path=ppt/slides/slide7.xml><?xml version="1.0" encoding="utf-8"?>
+<file path=ppt/slides/slide8.xml><?xml version="1.0" encoding="utf-8"?>
 <p:sld xmlns:a="http://schemas.openxmlformats.org/drawingml/2006/main" xmlns:r="http://schemas.openxmlformats.org/officeDocument/2006/relationships" xmlns:p="http://schemas.openxmlformats.org/presentationml/2006/main">
   <p:cSld>
     <p:spTree>
@@ -11260,26 +12753,13 @@
                 <a:effectLst/>
                 <a:latin typeface="Consolas" panose="020B0609020204030204" pitchFamily="49" charset="0"/>
               </a:rPr>
-              <a:t>=[60, 1000], </a:t>
-            </a:r>
-          </a:p>
-          <a:p>
-            <a:r>
-              <a:rPr lang="en-US" sz="1800" b="0" dirty="0" err="1">
-                <a:effectLst/>
-                <a:latin typeface="Consolas" panose="020B0609020204030204" pitchFamily="49" charset="0"/>
-              </a:rPr>
-              <a:t>trendline_quefrency_range</a:t>
-            </a:r>
-            <a:r>
-              <a:rPr lang="en-US" sz="1800" b="0" dirty="0">
-                <a:effectLst/>
-                <a:latin typeface="Consolas" panose="020B0609020204030204" pitchFamily="49" charset="0"/>
-              </a:rPr>
-              <a:t>=[0.001, 0.05]</a:t>
-            </a:r>
-          </a:p>
-          <a:p>
+              <a:t>=[60, 1000]HZ, </a:t>
+            </a:r>
+          </a:p>
+          <a:p>
+            <a:pPr marL="0" indent="0">
+              <a:buNone/>
+            </a:pPr>
             <a:endParaRPr lang="en-US" dirty="0"/>
           </a:p>
         </p:txBody>
@@ -11299,7 +12779,7 @@
           <p:nvPr/>
         </p:nvPicPr>
         <p:blipFill>
-          <a:blip r:embed="rId2"/>
+          <a:blip r:embed="rId3"/>
           <a:stretch>
             <a:fillRect/>
           </a:stretch>
@@ -11329,7 +12809,7 @@
           <p:nvPr/>
         </p:nvPicPr>
         <p:blipFill>
-          <a:blip r:embed="rId3"/>
+          <a:blip r:embed="rId4"/>
           <a:stretch>
             <a:fillRect/>
           </a:stretch>
@@ -11357,7 +12837,7 @@
 </p:sld>
 </file>
 
-<file path=ppt/slides/slide8.xml><?xml version="1.0" encoding="utf-8"?>
+<file path=ppt/slides/slide9.xml><?xml version="1.0" encoding="utf-8"?>
 <p:sld xmlns:a="http://schemas.openxmlformats.org/drawingml/2006/main" xmlns:r="http://schemas.openxmlformats.org/officeDocument/2006/relationships" xmlns:p="http://schemas.openxmlformats.org/presentationml/2006/main">
   <p:cSld>
     <p:bg>
@@ -11471,7 +12951,7 @@
           <a:lstStyle/>
           <a:p>
             <a:r>
-              <a:rPr lang="en-US" sz="4000"/>
+              <a:rPr lang="en-US" sz="4000" dirty="0"/>
               <a:t>Paired T-test</a:t>
             </a:r>
           </a:p>
@@ -11670,18 +13150,16 @@
           </a:lstStyle>
           <a:p>
             <a:r>
-              <a:rPr lang="en-US" sz="2000"/>
-              <a:t>pitch_range=[60, 1000], </a:t>
-            </a:r>
-          </a:p>
-          <a:p>
-            <a:r>
-              <a:rPr lang="en-US" sz="2000"/>
-              <a:t>trendline_quefrency_range=[0.001, 0.05]</a:t>
-            </a:r>
-          </a:p>
-          <a:p>
-            <a:endParaRPr lang="en-US" sz="2000"/>
+              <a:rPr lang="en-US" sz="2000" dirty="0" err="1"/>
+              <a:t>pitch_range</a:t>
+            </a:r>
+            <a:r>
+              <a:rPr lang="en-US" sz="2000" dirty="0"/>
+              <a:t>=[60, 1000], </a:t>
+            </a:r>
+          </a:p>
+          <a:p>
+            <a:endParaRPr lang="en-US" sz="2000" dirty="0"/>
           </a:p>
         </p:txBody>
       </p:sp>
@@ -11749,158 +13227,6 @@
     <p:extLst>
       <p:ext uri="{BB962C8B-B14F-4D97-AF65-F5344CB8AC3E}">
         <p14:creationId xmlns:p14="http://schemas.microsoft.com/office/powerpoint/2010/main" val="1754625087"/>
-      </p:ext>
-    </p:extLst>
-  </p:cSld>
-  <p:clrMapOvr>
-    <a:masterClrMapping/>
-  </p:clrMapOvr>
-</p:sld>
-</file>
-
-<file path=ppt/slides/slide9.xml><?xml version="1.0" encoding="utf-8"?>
-<p:sld xmlns:a="http://schemas.openxmlformats.org/drawingml/2006/main" xmlns:r="http://schemas.openxmlformats.org/officeDocument/2006/relationships" xmlns:p="http://schemas.openxmlformats.org/presentationml/2006/main">
-  <p:cSld>
-    <p:spTree>
-      <p:nvGrpSpPr>
-        <p:cNvPr id="1" name=""/>
-        <p:cNvGrpSpPr/>
-        <p:nvPr/>
-      </p:nvGrpSpPr>
-      <p:grpSpPr>
-        <a:xfrm>
-          <a:off x="0" y="0"/>
-          <a:ext cx="0" cy="0"/>
-          <a:chOff x="0" y="0"/>
-          <a:chExt cx="0" cy="0"/>
-        </a:xfrm>
-      </p:grpSpPr>
-      <p:sp>
-        <p:nvSpPr>
-          <p:cNvPr id="3" name="Inhaltsplatzhalter 2">
-            <a:extLst>
-              <a:ext uri="{FF2B5EF4-FFF2-40B4-BE49-F238E27FC236}">
-                <a16:creationId xmlns:a16="http://schemas.microsoft.com/office/drawing/2014/main" id="{65B49D78-A9A4-F7D2-9E68-44EA4F9100AF}"/>
-              </a:ext>
-            </a:extLst>
-          </p:cNvPr>
-          <p:cNvSpPr>
-            <a:spLocks noGrp="1"/>
-          </p:cNvSpPr>
-          <p:nvPr>
-            <p:ph idx="1"/>
-          </p:nvPr>
-        </p:nvSpPr>
-        <p:spPr>
-          <a:xfrm>
-            <a:off x="114300" y="168275"/>
-            <a:ext cx="10515600" cy="4351338"/>
-          </a:xfrm>
-        </p:spPr>
-        <p:txBody>
-          <a:bodyPr/>
-          <a:lstStyle/>
-          <a:p>
-            <a:r>
-              <a:rPr lang="en-US" sz="2800" b="0" dirty="0" err="1">
-                <a:effectLst/>
-                <a:latin typeface="Consolas" panose="020B0609020204030204" pitchFamily="49" charset="0"/>
-              </a:rPr>
-              <a:t>pitch_range</a:t>
-            </a:r>
-            <a:r>
-              <a:rPr lang="en-US" sz="2800" b="0" dirty="0">
-                <a:effectLst/>
-                <a:latin typeface="Consolas" panose="020B0609020204030204" pitchFamily="49" charset="0"/>
-              </a:rPr>
-              <a:t>=[60, 8000], </a:t>
-            </a:r>
-          </a:p>
-          <a:p>
-            <a:r>
-              <a:rPr lang="en-US" sz="2800" b="0" dirty="0" err="1">
-                <a:effectLst/>
-                <a:latin typeface="Consolas" panose="020B0609020204030204" pitchFamily="49" charset="0"/>
-              </a:rPr>
-              <a:t>trendline_quefrency_range</a:t>
-            </a:r>
-            <a:r>
-              <a:rPr lang="en-US" sz="2800" b="0" dirty="0">
-                <a:effectLst/>
-                <a:latin typeface="Consolas" panose="020B0609020204030204" pitchFamily="49" charset="0"/>
-              </a:rPr>
-              <a:t>=[0.001, 0.05]</a:t>
-            </a:r>
-          </a:p>
-          <a:p>
-            <a:endParaRPr lang="en-US" dirty="0"/>
-          </a:p>
-        </p:txBody>
-      </p:sp>
-      <p:pic>
-        <p:nvPicPr>
-          <p:cNvPr id="7" name="Grafik 6">
-            <a:extLst>
-              <a:ext uri="{FF2B5EF4-FFF2-40B4-BE49-F238E27FC236}">
-                <a16:creationId xmlns:a16="http://schemas.microsoft.com/office/drawing/2014/main" id="{07730CBB-3232-E115-B493-4476230BAC8E}"/>
-              </a:ext>
-            </a:extLst>
-          </p:cNvPr>
-          <p:cNvPicPr>
-            <a:picLocks noChangeAspect="1"/>
-          </p:cNvPicPr>
-          <p:nvPr/>
-        </p:nvPicPr>
-        <p:blipFill>
-          <a:blip r:embed="rId2"/>
-          <a:stretch>
-            <a:fillRect/>
-          </a:stretch>
-        </p:blipFill>
-        <p:spPr>
-          <a:xfrm>
-            <a:off x="52387" y="1779669"/>
-            <a:ext cx="5447378" cy="4190869"/>
-          </a:xfrm>
-          <a:prstGeom prst="rect">
-            <a:avLst/>
-          </a:prstGeom>
-        </p:spPr>
-      </p:pic>
-      <p:pic>
-        <p:nvPicPr>
-          <p:cNvPr id="9" name="Grafik 8">
-            <a:extLst>
-              <a:ext uri="{FF2B5EF4-FFF2-40B4-BE49-F238E27FC236}">
-                <a16:creationId xmlns:a16="http://schemas.microsoft.com/office/drawing/2014/main" id="{04A4734F-00F8-83B2-6DDF-1806F6C6779C}"/>
-              </a:ext>
-            </a:extLst>
-          </p:cNvPr>
-          <p:cNvPicPr>
-            <a:picLocks noChangeAspect="1"/>
-          </p:cNvPicPr>
-          <p:nvPr/>
-        </p:nvPicPr>
-        <p:blipFill>
-          <a:blip r:embed="rId3"/>
-          <a:stretch>
-            <a:fillRect/>
-          </a:stretch>
-        </p:blipFill>
-        <p:spPr>
-          <a:xfrm>
-            <a:off x="5437852" y="1184308"/>
-            <a:ext cx="6532823" cy="5381592"/>
-          </a:xfrm>
-          <a:prstGeom prst="rect">
-            <a:avLst/>
-          </a:prstGeom>
-        </p:spPr>
-      </p:pic>
-    </p:spTree>
-    <p:extLst>
-      <p:ext uri="{BB962C8B-B14F-4D97-AF65-F5344CB8AC3E}">
-        <p14:creationId xmlns:p14="http://schemas.microsoft.com/office/powerpoint/2010/main" val="475159716"/>
       </p:ext>
     </p:extLst>
   </p:cSld>

</xml_diff>

<commit_message>
added FID calculations for word pairs
</commit_message>
<xml_diff>
--- a/Interim report 2.pptx
+++ b/Interim report 2.pptx
@@ -5,28 +5,33 @@
     <p:sldMasterId id="2147483648" r:id="rId1"/>
   </p:sldMasterIdLst>
   <p:notesMasterIdLst>
-    <p:notesMasterId r:id="rId21"/>
+    <p:notesMasterId r:id="rId26"/>
   </p:notesMasterIdLst>
   <p:sldIdLst>
     <p:sldId id="256" r:id="rId2"/>
     <p:sldId id="276" r:id="rId3"/>
-    <p:sldId id="258" r:id="rId4"/>
-    <p:sldId id="257" r:id="rId5"/>
-    <p:sldId id="259" r:id="rId6"/>
-    <p:sldId id="262" r:id="rId7"/>
-    <p:sldId id="265" r:id="rId8"/>
-    <p:sldId id="261" r:id="rId9"/>
-    <p:sldId id="266" r:id="rId10"/>
-    <p:sldId id="263" r:id="rId11"/>
-    <p:sldId id="267" r:id="rId12"/>
-    <p:sldId id="260" r:id="rId13"/>
-    <p:sldId id="268" r:id="rId14"/>
-    <p:sldId id="270" r:id="rId15"/>
-    <p:sldId id="269" r:id="rId16"/>
-    <p:sldId id="271" r:id="rId17"/>
-    <p:sldId id="273" r:id="rId18"/>
-    <p:sldId id="274" r:id="rId19"/>
-    <p:sldId id="275" r:id="rId20"/>
+    <p:sldId id="277" r:id="rId4"/>
+    <p:sldId id="258" r:id="rId5"/>
+    <p:sldId id="257" r:id="rId6"/>
+    <p:sldId id="259" r:id="rId7"/>
+    <p:sldId id="262" r:id="rId8"/>
+    <p:sldId id="265" r:id="rId9"/>
+    <p:sldId id="261" r:id="rId10"/>
+    <p:sldId id="266" r:id="rId11"/>
+    <p:sldId id="263" r:id="rId12"/>
+    <p:sldId id="267" r:id="rId13"/>
+    <p:sldId id="260" r:id="rId14"/>
+    <p:sldId id="268" r:id="rId15"/>
+    <p:sldId id="270" r:id="rId16"/>
+    <p:sldId id="269" r:id="rId17"/>
+    <p:sldId id="271" r:id="rId18"/>
+    <p:sldId id="273" r:id="rId19"/>
+    <p:sldId id="274" r:id="rId20"/>
+    <p:sldId id="275" r:id="rId21"/>
+    <p:sldId id="278" r:id="rId22"/>
+    <p:sldId id="281" r:id="rId23"/>
+    <p:sldId id="280" r:id="rId24"/>
+    <p:sldId id="279" r:id="rId25"/>
   </p:sldIdLst>
   <p:sldSz cx="12192000" cy="6858000"/>
   <p:notesSz cx="6858000" cy="9144000"/>
@@ -5370,7 +5375,7 @@
           <a:p>
             <a:fld id="{7A90B0C3-ED28-445D-8A9D-8679C44E937E}" type="datetimeFigureOut">
               <a:rPr lang="en-US" smtClean="0"/>
-              <a:t>1/16/2025</a:t>
+              <a:t>1/17/2025</a:t>
             </a:fld>
             <a:endParaRPr lang="en-US"/>
           </a:p>
@@ -5749,7 +5754,7 @@
           <a:p>
             <a:fld id="{F2F9830F-C021-42C9-B27C-D682D2072031}" type="slidenum">
               <a:rPr lang="en-US" smtClean="0"/>
-              <a:t>5</a:t>
+              <a:t>6</a:t>
             </a:fld>
             <a:endParaRPr lang="en-US"/>
           </a:p>
@@ -5885,7 +5890,7 @@
           <a:p>
             <a:fld id="{F2F9830F-C021-42C9-B27C-D682D2072031}" type="slidenum">
               <a:rPr lang="en-US" smtClean="0"/>
-              <a:t>6</a:t>
+              <a:t>7</a:t>
             </a:fld>
             <a:endParaRPr lang="en-US"/>
           </a:p>
@@ -5950,39 +5955,47 @@
           <a:p>
             <a:r>
               <a:rPr lang="en-US" dirty="0"/>
-              <a:t>the </a:t>
+              <a:t>taking the </a:t>
             </a:r>
             <a:r>
               <a:rPr lang="en-US" b="1" dirty="0"/>
-              <a:t>trendline quefrency range</a:t>
+              <a:t>log magnitude</a:t>
             </a:r>
             <a:r>
               <a:rPr lang="en-US" dirty="0"/>
-              <a:t> is the range of the </a:t>
-            </a:r>
-            <a:r>
-              <a:rPr lang="en-US" i="1" dirty="0" err="1"/>
-              <a:t>cepstrum</a:t>
+              <a:t> of a signal’s Fourier transform and then performing an </a:t>
+            </a:r>
+            <a:r>
+              <a:rPr lang="en-US" b="1" dirty="0"/>
+              <a:t>inverse Fourier transform</a:t>
             </a:r>
             <a:r>
               <a:rPr lang="en-US" dirty="0"/>
-              <a:t> over which you fit a </a:t>
+              <a:t> on that log spectrum. </a:t>
+            </a:r>
+          </a:p>
+          <a:p>
+            <a:r>
+              <a:rPr lang="en-US" dirty="0"/>
+              <a:t>its horizontal axis is sometimes called </a:t>
             </a:r>
             <a:r>
               <a:rPr lang="en-US" b="1" dirty="0"/>
-              <a:t>linear regression</a:t>
-            </a:r>
+              <a:t>quefrency</a:t>
+            </a:r>
+          </a:p>
+          <a:p>
             <a:r>
               <a:rPr lang="en-US" dirty="0"/>
-              <a:t> (or trend line) to model the </a:t>
+              <a:t>If your speech signal has a </a:t>
             </a:r>
             <a:r>
               <a:rPr lang="en-US" b="1" dirty="0"/>
-              <a:t>overall slope</a:t>
+              <a:t>strong fundamental frequency</a:t>
             </a:r>
             <a:r>
               <a:rPr lang="en-US" dirty="0"/>
-              <a:t> of the </a:t>
+              <a:t> F0F_0F0​ (pitch), the </a:t>
             </a:r>
             <a:r>
               <a:rPr lang="en-US" dirty="0" err="1"/>
@@ -5990,8 +6003,25 @@
             </a:r>
             <a:r>
               <a:rPr lang="en-US" dirty="0"/>
-              <a:t>.</a:t>
-            </a:r>
+              <a:t> will typically show a </a:t>
+            </a:r>
+            <a:r>
+              <a:rPr lang="en-US" b="1" dirty="0"/>
+              <a:t>peak</a:t>
+            </a:r>
+            <a:r>
+              <a:rPr lang="en-US" dirty="0"/>
+              <a:t> at the </a:t>
+            </a:r>
+            <a:r>
+              <a:rPr lang="en-US" b="1" dirty="0"/>
+              <a:t>quefrency</a:t>
+            </a:r>
+            <a:r>
+              <a:rPr lang="en-US" dirty="0"/>
+              <a:t> τ0=1/F0\tau_0 = 1 / F_0τ0​=1/F0​.</a:t>
+            </a:r>
+            <a:endParaRPr lang="de-DE" dirty="0"/>
           </a:p>
         </p:txBody>
       </p:sp>
@@ -6021,7 +6051,7 @@
     </p:spTree>
     <p:extLst>
       <p:ext uri="{BB962C8B-B14F-4D97-AF65-F5344CB8AC3E}">
-        <p14:creationId xmlns:p14="http://schemas.microsoft.com/office/powerpoint/2010/main" val="3337141057"/>
+        <p14:creationId xmlns:p14="http://schemas.microsoft.com/office/powerpoint/2010/main" val="3430288255"/>
       </p:ext>
     </p:extLst>
   </p:cSld>
@@ -6076,41 +6106,49 @@
           <a:lstStyle/>
           <a:p>
             <a:r>
-              <a:rPr lang="de-DE" dirty="0"/>
-              <a:t>Noise</a:t>
-            </a:r>
-          </a:p>
-          <a:p>
-            <a:r>
-              <a:rPr lang="de-DE" dirty="0"/>
-              <a:t>Time </a:t>
-            </a:r>
-            <a:r>
-              <a:rPr lang="de-DE" dirty="0" err="1"/>
-              <a:t>strecht</a:t>
-            </a:r>
-            <a:endParaRPr lang="de-DE" dirty="0"/>
-          </a:p>
-          <a:p>
-            <a:r>
-              <a:rPr lang="de-DE" dirty="0"/>
-              <a:t>Pitch shifting</a:t>
-            </a:r>
-          </a:p>
-          <a:p>
-            <a:r>
-              <a:rPr lang="de-DE" dirty="0" err="1"/>
-              <a:t>Crop</a:t>
-            </a:r>
-            <a:r>
-              <a:rPr lang="de-DE" dirty="0"/>
-              <a:t> /</a:t>
-            </a:r>
-            <a:r>
-              <a:rPr lang="de-DE" dirty="0" err="1"/>
-              <a:t>pad</a:t>
-            </a:r>
-            <a:endParaRPr lang="en-US" dirty="0"/>
+              <a:rPr lang="en-US" dirty="0"/>
+              <a:t>the </a:t>
+            </a:r>
+            <a:r>
+              <a:rPr lang="en-US" b="1" dirty="0"/>
+              <a:t>trendline quefrency range</a:t>
+            </a:r>
+            <a:r>
+              <a:rPr lang="en-US" dirty="0"/>
+              <a:t> is the range of the </a:t>
+            </a:r>
+            <a:r>
+              <a:rPr lang="en-US" i="1" dirty="0" err="1"/>
+              <a:t>cepstrum</a:t>
+            </a:r>
+            <a:r>
+              <a:rPr lang="en-US" dirty="0"/>
+              <a:t> over which you fit a </a:t>
+            </a:r>
+            <a:r>
+              <a:rPr lang="en-US" b="1" dirty="0"/>
+              <a:t>linear regression</a:t>
+            </a:r>
+            <a:r>
+              <a:rPr lang="en-US" dirty="0"/>
+              <a:t> (or trend line) to model the </a:t>
+            </a:r>
+            <a:r>
+              <a:rPr lang="en-US" b="1" dirty="0"/>
+              <a:t>overall slope</a:t>
+            </a:r>
+            <a:r>
+              <a:rPr lang="en-US" dirty="0"/>
+              <a:t> of the </a:t>
+            </a:r>
+            <a:r>
+              <a:rPr lang="en-US" dirty="0" err="1"/>
+              <a:t>cepstrum</a:t>
+            </a:r>
+            <a:r>
+              <a:rPr lang="en-US" dirty="0"/>
+              <a:t>.</a:t>
+            </a:r>
           </a:p>
         </p:txBody>
       </p:sp>
@@ -6131,7 +6169,529 @@
           <a:p>
             <a:fld id="{F2F9830F-C021-42C9-B27C-D682D2072031}" type="slidenum">
               <a:rPr lang="en-US" smtClean="0"/>
-              <a:t>19</a:t>
+              <a:t>9</a:t>
+            </a:fld>
+            <a:endParaRPr lang="en-US"/>
+          </a:p>
+        </p:txBody>
+      </p:sp>
+    </p:spTree>
+    <p:extLst>
+      <p:ext uri="{BB962C8B-B14F-4D97-AF65-F5344CB8AC3E}">
+        <p14:creationId xmlns:p14="http://schemas.microsoft.com/office/powerpoint/2010/main" val="3337141057"/>
+      </p:ext>
+    </p:extLst>
+  </p:cSld>
+  <p:clrMapOvr>
+    <a:masterClrMapping/>
+  </p:clrMapOvr>
+</p:notes>
+</file>
+
+<file path=ppt/notesSlides/notesSlide5.xml><?xml version="1.0" encoding="utf-8"?>
+<p:notes xmlns:a="http://schemas.openxmlformats.org/drawingml/2006/main" xmlns:r="http://schemas.openxmlformats.org/officeDocument/2006/relationships" xmlns:p="http://schemas.openxmlformats.org/presentationml/2006/main">
+  <p:cSld>
+    <p:spTree>
+      <p:nvGrpSpPr>
+        <p:cNvPr id="1" name=""/>
+        <p:cNvGrpSpPr/>
+        <p:nvPr/>
+      </p:nvGrpSpPr>
+      <p:grpSpPr>
+        <a:xfrm>
+          <a:off x="0" y="0"/>
+          <a:ext cx="0" cy="0"/>
+          <a:chOff x="0" y="0"/>
+          <a:chExt cx="0" cy="0"/>
+        </a:xfrm>
+      </p:grpSpPr>
+      <p:sp>
+        <p:nvSpPr>
+          <p:cNvPr id="2" name="Folienbildplatzhalter 1"/>
+          <p:cNvSpPr>
+            <a:spLocks noGrp="1" noRot="1" noChangeAspect="1"/>
+          </p:cNvSpPr>
+          <p:nvPr>
+            <p:ph type="sldImg"/>
+          </p:nvPr>
+        </p:nvSpPr>
+        <p:spPr/>
+      </p:sp>
+      <p:sp>
+        <p:nvSpPr>
+          <p:cNvPr id="3" name="Notizenplatzhalter 2"/>
+          <p:cNvSpPr>
+            <a:spLocks noGrp="1"/>
+          </p:cNvSpPr>
+          <p:nvPr>
+            <p:ph type="body" idx="1"/>
+          </p:nvPr>
+        </p:nvSpPr>
+        <p:spPr/>
+        <p:txBody>
+          <a:bodyPr/>
+          <a:lstStyle/>
+          <a:p>
+            <a:endParaRPr lang="de-DE" dirty="0"/>
+          </a:p>
+        </p:txBody>
+      </p:sp>
+      <p:sp>
+        <p:nvSpPr>
+          <p:cNvPr id="4" name="Foliennummernplatzhalter 3"/>
+          <p:cNvSpPr>
+            <a:spLocks noGrp="1"/>
+          </p:cNvSpPr>
+          <p:nvPr>
+            <p:ph type="sldNum" sz="quarter" idx="5"/>
+          </p:nvPr>
+        </p:nvSpPr>
+        <p:spPr/>
+        <p:txBody>
+          <a:bodyPr/>
+          <a:lstStyle/>
+          <a:p>
+            <a:fld id="{F2F9830F-C021-42C9-B27C-D682D2072031}" type="slidenum">
+              <a:rPr lang="en-US" smtClean="0"/>
+              <a:t>13</a:t>
+            </a:fld>
+            <a:endParaRPr lang="en-US"/>
+          </a:p>
+        </p:txBody>
+      </p:sp>
+    </p:spTree>
+    <p:extLst>
+      <p:ext uri="{BB962C8B-B14F-4D97-AF65-F5344CB8AC3E}">
+        <p14:creationId xmlns:p14="http://schemas.microsoft.com/office/powerpoint/2010/main" val="482031348"/>
+      </p:ext>
+    </p:extLst>
+  </p:cSld>
+  <p:clrMapOvr>
+    <a:masterClrMapping/>
+  </p:clrMapOvr>
+</p:notes>
+</file>
+
+<file path=ppt/notesSlides/notesSlide6.xml><?xml version="1.0" encoding="utf-8"?>
+<p:notes xmlns:a="http://schemas.openxmlformats.org/drawingml/2006/main" xmlns:r="http://schemas.openxmlformats.org/officeDocument/2006/relationships" xmlns:p="http://schemas.openxmlformats.org/presentationml/2006/main">
+  <p:cSld>
+    <p:spTree>
+      <p:nvGrpSpPr>
+        <p:cNvPr id="1" name=""/>
+        <p:cNvGrpSpPr/>
+        <p:nvPr/>
+      </p:nvGrpSpPr>
+      <p:grpSpPr>
+        <a:xfrm>
+          <a:off x="0" y="0"/>
+          <a:ext cx="0" cy="0"/>
+          <a:chOff x="0" y="0"/>
+          <a:chExt cx="0" cy="0"/>
+        </a:xfrm>
+      </p:grpSpPr>
+      <p:sp>
+        <p:nvSpPr>
+          <p:cNvPr id="2" name="Folienbildplatzhalter 1"/>
+          <p:cNvSpPr>
+            <a:spLocks noGrp="1" noRot="1" noChangeAspect="1"/>
+          </p:cNvSpPr>
+          <p:nvPr>
+            <p:ph type="sldImg"/>
+          </p:nvPr>
+        </p:nvSpPr>
+        <p:spPr/>
+      </p:sp>
+      <p:sp>
+        <p:nvSpPr>
+          <p:cNvPr id="3" name="Notizenplatzhalter 2"/>
+          <p:cNvSpPr>
+            <a:spLocks noGrp="1"/>
+          </p:cNvSpPr>
+          <p:nvPr>
+            <p:ph type="body" idx="1"/>
+          </p:nvPr>
+        </p:nvSpPr>
+        <p:spPr/>
+        <p:txBody>
+          <a:bodyPr/>
+          <a:lstStyle/>
+          <a:p>
+            <a:r>
+              <a:rPr lang="de-DE" dirty="0"/>
+              <a:t>FAD auch noch machen für</a:t>
+            </a:r>
+          </a:p>
+          <a:p>
+            <a:r>
+              <a:rPr lang="de-DE" dirty="0"/>
+              <a:t>Sonne zu sonne normal ist 0</a:t>
+            </a:r>
+          </a:p>
+          <a:p>
+            <a:r>
+              <a:rPr lang="de-DE" dirty="0"/>
+              <a:t>Sonne zu sonne </a:t>
+            </a:r>
+            <a:r>
+              <a:rPr lang="de-DE" dirty="0" err="1"/>
+              <a:t>sigmatismus</a:t>
+            </a:r>
+            <a:r>
+              <a:rPr lang="de-DE" dirty="0"/>
+              <a:t> </a:t>
+            </a:r>
+            <a:r>
+              <a:rPr lang="de-DE" dirty="0" err="1"/>
+              <a:t>is</a:t>
+            </a:r>
+            <a:r>
+              <a:rPr lang="de-DE" dirty="0"/>
+              <a:t> da oben</a:t>
+            </a:r>
+          </a:p>
+          <a:p>
+            <a:r>
+              <a:rPr lang="de-DE" dirty="0"/>
+              <a:t>Jetzt sonne </a:t>
+            </a:r>
+            <a:r>
+              <a:rPr lang="de-DE" dirty="0" err="1"/>
+              <a:t>sigmatismus</a:t>
+            </a:r>
+            <a:r>
+              <a:rPr lang="de-DE" dirty="0"/>
+              <a:t> oder normal zu </a:t>
+            </a:r>
+            <a:r>
+              <a:rPr lang="de-DE" dirty="0" err="1"/>
+              <a:t>veralssen</a:t>
+            </a:r>
+            <a:r>
+              <a:rPr lang="de-DE" dirty="0"/>
+              <a:t> normal oder </a:t>
+            </a:r>
+            <a:r>
+              <a:rPr lang="de-DE" dirty="0" err="1"/>
+              <a:t>sig</a:t>
+            </a:r>
+            <a:endParaRPr lang="de-DE" dirty="0"/>
+          </a:p>
+          <a:p>
+            <a:r>
+              <a:rPr lang="de-DE" dirty="0"/>
+              <a:t>Vom gleichen </a:t>
+            </a:r>
+            <a:r>
+              <a:rPr lang="de-DE" dirty="0" err="1"/>
+              <a:t>speaker</a:t>
+            </a:r>
+            <a:r>
+              <a:rPr lang="de-DE" dirty="0"/>
+              <a:t> sonne zu sonne normal </a:t>
+            </a:r>
+          </a:p>
+        </p:txBody>
+      </p:sp>
+      <p:sp>
+        <p:nvSpPr>
+          <p:cNvPr id="4" name="Foliennummernplatzhalter 3"/>
+          <p:cNvSpPr>
+            <a:spLocks noGrp="1"/>
+          </p:cNvSpPr>
+          <p:nvPr>
+            <p:ph type="sldNum" sz="quarter" idx="5"/>
+          </p:nvPr>
+        </p:nvSpPr>
+        <p:spPr/>
+        <p:txBody>
+          <a:bodyPr/>
+          <a:lstStyle/>
+          <a:p>
+            <a:fld id="{F2F9830F-C021-42C9-B27C-D682D2072031}" type="slidenum">
+              <a:rPr lang="en-US" smtClean="0"/>
+              <a:t>14</a:t>
+            </a:fld>
+            <a:endParaRPr lang="en-US"/>
+          </a:p>
+        </p:txBody>
+      </p:sp>
+    </p:spTree>
+    <p:extLst>
+      <p:ext uri="{BB962C8B-B14F-4D97-AF65-F5344CB8AC3E}">
+        <p14:creationId xmlns:p14="http://schemas.microsoft.com/office/powerpoint/2010/main" val="1407163495"/>
+      </p:ext>
+    </p:extLst>
+  </p:cSld>
+  <p:clrMapOvr>
+    <a:masterClrMapping/>
+  </p:clrMapOvr>
+</p:notes>
+</file>
+
+<file path=ppt/notesSlides/notesSlide7.xml><?xml version="1.0" encoding="utf-8"?>
+<p:notes xmlns:a="http://schemas.openxmlformats.org/drawingml/2006/main" xmlns:r="http://schemas.openxmlformats.org/officeDocument/2006/relationships" xmlns:p="http://schemas.openxmlformats.org/presentationml/2006/main">
+  <p:cSld>
+    <p:spTree>
+      <p:nvGrpSpPr>
+        <p:cNvPr id="1" name=""/>
+        <p:cNvGrpSpPr/>
+        <p:nvPr/>
+      </p:nvGrpSpPr>
+      <p:grpSpPr>
+        <a:xfrm>
+          <a:off x="0" y="0"/>
+          <a:ext cx="0" cy="0"/>
+          <a:chOff x="0" y="0"/>
+          <a:chExt cx="0" cy="0"/>
+        </a:xfrm>
+      </p:grpSpPr>
+      <p:sp>
+        <p:nvSpPr>
+          <p:cNvPr id="2" name="Folienbildplatzhalter 1"/>
+          <p:cNvSpPr>
+            <a:spLocks noGrp="1" noRot="1" noChangeAspect="1"/>
+          </p:cNvSpPr>
+          <p:nvPr>
+            <p:ph type="sldImg"/>
+          </p:nvPr>
+        </p:nvSpPr>
+        <p:spPr/>
+      </p:sp>
+      <p:sp>
+        <p:nvSpPr>
+          <p:cNvPr id="3" name="Notizenplatzhalter 2"/>
+          <p:cNvSpPr>
+            <a:spLocks noGrp="1"/>
+          </p:cNvSpPr>
+          <p:nvPr>
+            <p:ph type="body" idx="1"/>
+          </p:nvPr>
+        </p:nvSpPr>
+        <p:spPr/>
+        <p:txBody>
+          <a:bodyPr/>
+          <a:lstStyle/>
+          <a:p>
+            <a:r>
+              <a:rPr lang="de-DE" dirty="0"/>
+              <a:t>Das gleiche machen nur das man sich den ausschnitt von dem </a:t>
+            </a:r>
+            <a:r>
+              <a:rPr lang="de-DE" dirty="0" err="1"/>
+              <a:t>wort</a:t>
+            </a:r>
+            <a:r>
+              <a:rPr lang="de-DE" dirty="0"/>
+              <a:t> wo das s ist an und machen nur da </a:t>
+            </a:r>
+            <a:r>
+              <a:rPr lang="de-DE" dirty="0" err="1"/>
+              <a:t>AuC</a:t>
+            </a:r>
+            <a:endParaRPr lang="de-DE" dirty="0"/>
+          </a:p>
+          <a:p>
+            <a:r>
+              <a:rPr lang="de-DE" dirty="0"/>
+              <a:t>Dann slice in time </a:t>
+            </a:r>
+            <a:r>
+              <a:rPr lang="de-DE" dirty="0" err="1"/>
+              <a:t>domain</a:t>
+            </a:r>
+            <a:r>
+              <a:rPr lang="de-DE" dirty="0"/>
+              <a:t> anschaue und übereinanderlegen. </a:t>
+            </a:r>
+          </a:p>
+          <a:p>
+            <a:endParaRPr lang="de-DE" dirty="0"/>
+          </a:p>
+          <a:p>
+            <a:r>
+              <a:rPr lang="de-DE" dirty="0" err="1"/>
+              <a:t>Logistic</a:t>
+            </a:r>
+            <a:r>
+              <a:rPr lang="de-DE" dirty="0"/>
+              <a:t> </a:t>
+            </a:r>
+            <a:r>
+              <a:rPr lang="de-DE" dirty="0" err="1"/>
+              <a:t>regression</a:t>
+            </a:r>
+            <a:r>
+              <a:rPr lang="de-DE" dirty="0"/>
+              <a:t> machen dazu machen auf die biomodale </a:t>
+            </a:r>
+            <a:r>
+              <a:rPr lang="de-DE" dirty="0" err="1"/>
+              <a:t>verteilung</a:t>
+            </a:r>
+            <a:endParaRPr lang="de-DE" dirty="0"/>
+          </a:p>
+          <a:p>
+            <a:endParaRPr lang="de-DE" dirty="0"/>
+          </a:p>
+          <a:p>
+            <a:r>
+              <a:rPr lang="de-DE" dirty="0"/>
+              <a:t>17.Februar </a:t>
+            </a:r>
+            <a:r>
+              <a:rPr lang="de-DE" dirty="0" err="1"/>
+              <a:t>interspeech</a:t>
+            </a:r>
+            <a:endParaRPr lang="de-DE" dirty="0"/>
+          </a:p>
+          <a:p>
+            <a:endParaRPr lang="de-DE" dirty="0"/>
+          </a:p>
+        </p:txBody>
+      </p:sp>
+      <p:sp>
+        <p:nvSpPr>
+          <p:cNvPr id="4" name="Foliennummernplatzhalter 3"/>
+          <p:cNvSpPr>
+            <a:spLocks noGrp="1"/>
+          </p:cNvSpPr>
+          <p:nvPr>
+            <p:ph type="sldNum" sz="quarter" idx="5"/>
+          </p:nvPr>
+        </p:nvSpPr>
+        <p:spPr/>
+        <p:txBody>
+          <a:bodyPr/>
+          <a:lstStyle/>
+          <a:p>
+            <a:fld id="{F2F9830F-C021-42C9-B27C-D682D2072031}" type="slidenum">
+              <a:rPr lang="en-US" smtClean="0"/>
+              <a:t>18</a:t>
+            </a:fld>
+            <a:endParaRPr lang="en-US"/>
+          </a:p>
+        </p:txBody>
+      </p:sp>
+    </p:spTree>
+    <p:extLst>
+      <p:ext uri="{BB962C8B-B14F-4D97-AF65-F5344CB8AC3E}">
+        <p14:creationId xmlns:p14="http://schemas.microsoft.com/office/powerpoint/2010/main" val="2131563463"/>
+      </p:ext>
+    </p:extLst>
+  </p:cSld>
+  <p:clrMapOvr>
+    <a:masterClrMapping/>
+  </p:clrMapOvr>
+</p:notes>
+</file>
+
+<file path=ppt/notesSlides/notesSlide8.xml><?xml version="1.0" encoding="utf-8"?>
+<p:notes xmlns:a="http://schemas.openxmlformats.org/drawingml/2006/main" xmlns:r="http://schemas.openxmlformats.org/officeDocument/2006/relationships" xmlns:p="http://schemas.openxmlformats.org/presentationml/2006/main">
+  <p:cSld>
+    <p:spTree>
+      <p:nvGrpSpPr>
+        <p:cNvPr id="1" name=""/>
+        <p:cNvGrpSpPr/>
+        <p:nvPr/>
+      </p:nvGrpSpPr>
+      <p:grpSpPr>
+        <a:xfrm>
+          <a:off x="0" y="0"/>
+          <a:ext cx="0" cy="0"/>
+          <a:chOff x="0" y="0"/>
+          <a:chExt cx="0" cy="0"/>
+        </a:xfrm>
+      </p:grpSpPr>
+      <p:sp>
+        <p:nvSpPr>
+          <p:cNvPr id="2" name="Folienbildplatzhalter 1"/>
+          <p:cNvSpPr>
+            <a:spLocks noGrp="1" noRot="1" noChangeAspect="1"/>
+          </p:cNvSpPr>
+          <p:nvPr>
+            <p:ph type="sldImg"/>
+          </p:nvPr>
+        </p:nvSpPr>
+        <p:spPr/>
+      </p:sp>
+      <p:sp>
+        <p:nvSpPr>
+          <p:cNvPr id="3" name="Notizenplatzhalter 2"/>
+          <p:cNvSpPr>
+            <a:spLocks noGrp="1"/>
+          </p:cNvSpPr>
+          <p:nvPr>
+            <p:ph type="body" idx="1"/>
+          </p:nvPr>
+        </p:nvSpPr>
+        <p:spPr/>
+        <p:txBody>
+          <a:bodyPr/>
+          <a:lstStyle/>
+          <a:p>
+            <a:r>
+              <a:rPr lang="de-DE" dirty="0"/>
+              <a:t>Noise</a:t>
+            </a:r>
+          </a:p>
+          <a:p>
+            <a:r>
+              <a:rPr lang="de-DE" dirty="0"/>
+              <a:t>Time </a:t>
+            </a:r>
+            <a:r>
+              <a:rPr lang="de-DE" dirty="0" err="1"/>
+              <a:t>strecht</a:t>
+            </a:r>
+            <a:endParaRPr lang="de-DE" dirty="0"/>
+          </a:p>
+          <a:p>
+            <a:r>
+              <a:rPr lang="de-DE" dirty="0"/>
+              <a:t>Pitch shifting</a:t>
+            </a:r>
+          </a:p>
+          <a:p>
+            <a:r>
+              <a:rPr lang="de-DE" dirty="0" err="1"/>
+              <a:t>Crop</a:t>
+            </a:r>
+            <a:r>
+              <a:rPr lang="de-DE" dirty="0"/>
+              <a:t> /</a:t>
+            </a:r>
+            <a:r>
+              <a:rPr lang="de-DE" dirty="0" err="1"/>
+              <a:t>pad</a:t>
+            </a:r>
+            <a:br>
+              <a:rPr lang="de-DE" dirty="0"/>
+            </a:br>
+            <a:br>
+              <a:rPr lang="de-DE" dirty="0"/>
+            </a:br>
+            <a:endParaRPr lang="en-US" dirty="0"/>
+          </a:p>
+        </p:txBody>
+      </p:sp>
+      <p:sp>
+        <p:nvSpPr>
+          <p:cNvPr id="4" name="Foliennummernplatzhalter 3"/>
+          <p:cNvSpPr>
+            <a:spLocks noGrp="1"/>
+          </p:cNvSpPr>
+          <p:nvPr>
+            <p:ph type="sldNum" sz="quarter" idx="5"/>
+          </p:nvPr>
+        </p:nvSpPr>
+        <p:spPr/>
+        <p:txBody>
+          <a:bodyPr/>
+          <a:lstStyle/>
+          <a:p>
+            <a:fld id="{F2F9830F-C021-42C9-B27C-D682D2072031}" type="slidenum">
+              <a:rPr lang="en-US" smtClean="0"/>
+              <a:t>20</a:t>
             </a:fld>
             <a:endParaRPr lang="en-US"/>
           </a:p>
@@ -6299,7 +6859,7 @@
           <a:p>
             <a:fld id="{AC6F5925-0E43-4417-92CA-17A233A7567E}" type="datetimeFigureOut">
               <a:rPr lang="en-US" smtClean="0"/>
-              <a:t>1/16/2025</a:t>
+              <a:t>1/17/2025</a:t>
             </a:fld>
             <a:endParaRPr lang="en-US"/>
           </a:p>
@@ -6499,7 +7059,7 @@
           <a:p>
             <a:fld id="{AC6F5925-0E43-4417-92CA-17A233A7567E}" type="datetimeFigureOut">
               <a:rPr lang="en-US" smtClean="0"/>
-              <a:t>1/16/2025</a:t>
+              <a:t>1/17/2025</a:t>
             </a:fld>
             <a:endParaRPr lang="en-US"/>
           </a:p>
@@ -6709,7 +7269,7 @@
           <a:p>
             <a:fld id="{AC6F5925-0E43-4417-92CA-17A233A7567E}" type="datetimeFigureOut">
               <a:rPr lang="en-US" smtClean="0"/>
-              <a:t>1/16/2025</a:t>
+              <a:t>1/17/2025</a:t>
             </a:fld>
             <a:endParaRPr lang="en-US"/>
           </a:p>
@@ -6909,7 +7469,7 @@
           <a:p>
             <a:fld id="{AC6F5925-0E43-4417-92CA-17A233A7567E}" type="datetimeFigureOut">
               <a:rPr lang="en-US" smtClean="0"/>
-              <a:t>1/16/2025</a:t>
+              <a:t>1/17/2025</a:t>
             </a:fld>
             <a:endParaRPr lang="en-US"/>
           </a:p>
@@ -7185,7 +7745,7 @@
           <a:p>
             <a:fld id="{AC6F5925-0E43-4417-92CA-17A233A7567E}" type="datetimeFigureOut">
               <a:rPr lang="en-US" smtClean="0"/>
-              <a:t>1/16/2025</a:t>
+              <a:t>1/17/2025</a:t>
             </a:fld>
             <a:endParaRPr lang="en-US"/>
           </a:p>
@@ -7453,7 +8013,7 @@
           <a:p>
             <a:fld id="{AC6F5925-0E43-4417-92CA-17A233A7567E}" type="datetimeFigureOut">
               <a:rPr lang="en-US" smtClean="0"/>
-              <a:t>1/16/2025</a:t>
+              <a:t>1/17/2025</a:t>
             </a:fld>
             <a:endParaRPr lang="en-US"/>
           </a:p>
@@ -7868,7 +8428,7 @@
           <a:p>
             <a:fld id="{AC6F5925-0E43-4417-92CA-17A233A7567E}" type="datetimeFigureOut">
               <a:rPr lang="en-US" smtClean="0"/>
-              <a:t>1/16/2025</a:t>
+              <a:t>1/17/2025</a:t>
             </a:fld>
             <a:endParaRPr lang="en-US"/>
           </a:p>
@@ -8010,7 +8570,7 @@
           <a:p>
             <a:fld id="{AC6F5925-0E43-4417-92CA-17A233A7567E}" type="datetimeFigureOut">
               <a:rPr lang="en-US" smtClean="0"/>
-              <a:t>1/16/2025</a:t>
+              <a:t>1/17/2025</a:t>
             </a:fld>
             <a:endParaRPr lang="en-US"/>
           </a:p>
@@ -8123,7 +8683,7 @@
           <a:p>
             <a:fld id="{AC6F5925-0E43-4417-92CA-17A233A7567E}" type="datetimeFigureOut">
               <a:rPr lang="en-US" smtClean="0"/>
-              <a:t>1/16/2025</a:t>
+              <a:t>1/17/2025</a:t>
             </a:fld>
             <a:endParaRPr lang="en-US"/>
           </a:p>
@@ -8436,7 +8996,7 @@
           <a:p>
             <a:fld id="{AC6F5925-0E43-4417-92CA-17A233A7567E}" type="datetimeFigureOut">
               <a:rPr lang="en-US" smtClean="0"/>
-              <a:t>1/16/2025</a:t>
+              <a:t>1/17/2025</a:t>
             </a:fld>
             <a:endParaRPr lang="en-US"/>
           </a:p>
@@ -8725,7 +9285,7 @@
           <a:p>
             <a:fld id="{AC6F5925-0E43-4417-92CA-17A233A7567E}" type="datetimeFigureOut">
               <a:rPr lang="en-US" smtClean="0"/>
-              <a:t>1/16/2025</a:t>
+              <a:t>1/17/2025</a:t>
             </a:fld>
             <a:endParaRPr lang="en-US"/>
           </a:p>
@@ -8968,7 +9528,7 @@
           <a:p>
             <a:fld id="{AC6F5925-0E43-4417-92CA-17A233A7567E}" type="datetimeFigureOut">
               <a:rPr lang="en-US" smtClean="0"/>
-              <a:t>1/16/2025</a:t>
+              <a:t>1/17/2025</a:t>
             </a:fld>
             <a:endParaRPr lang="en-US"/>
           </a:p>
@@ -9455,6 +10015,405 @@
 <file path=ppt/slides/slide10.xml><?xml version="1.0" encoding="utf-8"?>
 <p:sld xmlns:a="http://schemas.openxmlformats.org/drawingml/2006/main" xmlns:r="http://schemas.openxmlformats.org/officeDocument/2006/relationships" xmlns:p="http://schemas.openxmlformats.org/presentationml/2006/main">
   <p:cSld>
+    <p:bg>
+      <p:bgPr>
+        <a:solidFill>
+          <a:schemeClr val="bg1"/>
+        </a:solidFill>
+        <a:effectLst/>
+      </p:bgPr>
+    </p:bg>
+    <p:spTree>
+      <p:nvGrpSpPr>
+        <p:cNvPr id="1" name=""/>
+        <p:cNvGrpSpPr/>
+        <p:nvPr/>
+      </p:nvGrpSpPr>
+      <p:grpSpPr>
+        <a:xfrm>
+          <a:off x="0" y="0"/>
+          <a:ext cx="0" cy="0"/>
+          <a:chOff x="0" y="0"/>
+          <a:chExt cx="0" cy="0"/>
+        </a:xfrm>
+      </p:grpSpPr>
+      <p:sp useBgFill="1">
+        <p:nvSpPr>
+          <p:cNvPr id="12" name="Rectangle 11">
+            <a:extLst>
+              <a:ext uri="{FF2B5EF4-FFF2-40B4-BE49-F238E27FC236}">
+                <a16:creationId xmlns:a16="http://schemas.microsoft.com/office/drawing/2014/main" id="{8761DDFE-071F-4200-B0AA-394476C2D2D6}"/>
+              </a:ext>
+              <a:ext uri="{C183D7F6-B498-43B3-948B-1728B52AA6E4}">
+                <adec:decorative xmlns:adec="http://schemas.microsoft.com/office/drawing/2017/decorative" val="1"/>
+              </a:ext>
+            </a:extLst>
+          </p:cNvPr>
+          <p:cNvSpPr>
+            <a:spLocks noGrp="1" noRot="1" noChangeAspect="1" noMove="1" noResize="1" noEditPoints="1" noAdjustHandles="1" noChangeArrowheads="1" noChangeShapeType="1" noTextEdit="1"/>
+          </p:cNvSpPr>
+          <p:nvPr>
+            <p:extLst>
+              <p:ext uri="{386F3935-93C4-4BCD-93E2-E3B085C9AB24}">
+                <p16:designElem xmlns:p16="http://schemas.microsoft.com/office/powerpoint/2015/main" val="1"/>
+              </p:ext>
+            </p:extLst>
+          </p:nvPr>
+        </p:nvSpPr>
+        <p:spPr>
+          <a:xfrm>
+            <a:off x="-1" y="0"/>
+            <a:ext cx="12188952" cy="6858000"/>
+          </a:xfrm>
+          <a:prstGeom prst="rect">
+            <a:avLst/>
+          </a:prstGeom>
+          <a:ln>
+            <a:noFill/>
+          </a:ln>
+        </p:spPr>
+        <p:style>
+          <a:lnRef idx="2">
+            <a:schemeClr val="accent1">
+              <a:shade val="50000"/>
+            </a:schemeClr>
+          </a:lnRef>
+          <a:fillRef idx="1">
+            <a:schemeClr val="accent1"/>
+          </a:fillRef>
+          <a:effectRef idx="0">
+            <a:schemeClr val="accent1"/>
+          </a:effectRef>
+          <a:fontRef idx="minor">
+            <a:schemeClr val="lt1"/>
+          </a:fontRef>
+        </p:style>
+        <p:txBody>
+          <a:bodyPr rtlCol="0" anchor="ctr"/>
+          <a:lstStyle/>
+          <a:p>
+            <a:pPr algn="ctr"/>
+            <a:endParaRPr lang="en-US"/>
+          </a:p>
+        </p:txBody>
+      </p:sp>
+      <p:sp>
+        <p:nvSpPr>
+          <p:cNvPr id="2" name="Titel 1">
+            <a:extLst>
+              <a:ext uri="{FF2B5EF4-FFF2-40B4-BE49-F238E27FC236}">
+                <a16:creationId xmlns:a16="http://schemas.microsoft.com/office/drawing/2014/main" id="{0B706325-1418-CE46-DD48-1882FD93864F}"/>
+              </a:ext>
+            </a:extLst>
+          </p:cNvPr>
+          <p:cNvSpPr>
+            <a:spLocks noGrp="1"/>
+          </p:cNvSpPr>
+          <p:nvPr>
+            <p:ph type="title"/>
+          </p:nvPr>
+        </p:nvSpPr>
+        <p:spPr>
+          <a:xfrm>
+            <a:off x="838198" y="547815"/>
+            <a:ext cx="5167185" cy="1680519"/>
+          </a:xfrm>
+        </p:spPr>
+        <p:txBody>
+          <a:bodyPr vert="horz" lIns="91440" tIns="45720" rIns="91440" bIns="45720" rtlCol="0" anchor="ctr">
+            <a:normAutofit/>
+          </a:bodyPr>
+          <a:lstStyle/>
+          <a:p>
+            <a:r>
+              <a:rPr lang="en-US" sz="4000" dirty="0"/>
+              <a:t>Paired T-test</a:t>
+            </a:r>
+          </a:p>
+        </p:txBody>
+      </p:sp>
+      <p:sp>
+        <p:nvSpPr>
+          <p:cNvPr id="3" name="Inhaltsplatzhalter 2">
+            <a:extLst>
+              <a:ext uri="{FF2B5EF4-FFF2-40B4-BE49-F238E27FC236}">
+                <a16:creationId xmlns:a16="http://schemas.microsoft.com/office/drawing/2014/main" id="{426C4744-E9A4-FD8A-4940-53A45FA55CCC}"/>
+              </a:ext>
+            </a:extLst>
+          </p:cNvPr>
+          <p:cNvSpPr txBox="1">
+            <a:spLocks/>
+          </p:cNvSpPr>
+          <p:nvPr/>
+        </p:nvSpPr>
+        <p:spPr>
+          <a:xfrm>
+            <a:off x="6186619" y="547815"/>
+            <a:ext cx="5178960" cy="1680519"/>
+          </a:xfrm>
+          <a:prstGeom prst="rect">
+            <a:avLst/>
+          </a:prstGeom>
+        </p:spPr>
+        <p:txBody>
+          <a:bodyPr vert="horz" lIns="91440" tIns="45720" rIns="91440" bIns="45720" rtlCol="0" anchor="ctr">
+            <a:normAutofit/>
+          </a:bodyPr>
+          <a:lstStyle>
+            <a:lvl1pPr marL="228600" indent="-228600" algn="l" defTabSz="914400" rtl="0" eaLnBrk="1" latinLnBrk="0" hangingPunct="1">
+              <a:lnSpc>
+                <a:spcPct val="90000"/>
+              </a:lnSpc>
+              <a:spcBef>
+                <a:spcPts val="1000"/>
+              </a:spcBef>
+              <a:buFont typeface="Arial" panose="020B0604020202020204" pitchFamily="34" charset="0"/>
+              <a:buChar char="•"/>
+              <a:defRPr sz="2800" kern="1200">
+                <a:solidFill>
+                  <a:schemeClr val="tx1"/>
+                </a:solidFill>
+                <a:latin typeface="+mn-lt"/>
+                <a:ea typeface="+mn-ea"/>
+                <a:cs typeface="+mn-cs"/>
+              </a:defRPr>
+            </a:lvl1pPr>
+            <a:lvl2pPr marL="685800" indent="-228600" algn="l" defTabSz="914400" rtl="0" eaLnBrk="1" latinLnBrk="0" hangingPunct="1">
+              <a:lnSpc>
+                <a:spcPct val="90000"/>
+              </a:lnSpc>
+              <a:spcBef>
+                <a:spcPts val="500"/>
+              </a:spcBef>
+              <a:buFont typeface="Arial" panose="020B0604020202020204" pitchFamily="34" charset="0"/>
+              <a:buChar char="•"/>
+              <a:defRPr sz="2400" kern="1200">
+                <a:solidFill>
+                  <a:schemeClr val="tx1"/>
+                </a:solidFill>
+                <a:latin typeface="+mn-lt"/>
+                <a:ea typeface="+mn-ea"/>
+                <a:cs typeface="+mn-cs"/>
+              </a:defRPr>
+            </a:lvl2pPr>
+            <a:lvl3pPr marL="1143000" indent="-228600" algn="l" defTabSz="914400" rtl="0" eaLnBrk="1" latinLnBrk="0" hangingPunct="1">
+              <a:lnSpc>
+                <a:spcPct val="90000"/>
+              </a:lnSpc>
+              <a:spcBef>
+                <a:spcPts val="500"/>
+              </a:spcBef>
+              <a:buFont typeface="Arial" panose="020B0604020202020204" pitchFamily="34" charset="0"/>
+              <a:buChar char="•"/>
+              <a:defRPr sz="2000" kern="1200">
+                <a:solidFill>
+                  <a:schemeClr val="tx1"/>
+                </a:solidFill>
+                <a:latin typeface="+mn-lt"/>
+                <a:ea typeface="+mn-ea"/>
+                <a:cs typeface="+mn-cs"/>
+              </a:defRPr>
+            </a:lvl3pPr>
+            <a:lvl4pPr marL="1600200" indent="-228600" algn="l" defTabSz="914400" rtl="0" eaLnBrk="1" latinLnBrk="0" hangingPunct="1">
+              <a:lnSpc>
+                <a:spcPct val="90000"/>
+              </a:lnSpc>
+              <a:spcBef>
+                <a:spcPts val="500"/>
+              </a:spcBef>
+              <a:buFont typeface="Arial" panose="020B0604020202020204" pitchFamily="34" charset="0"/>
+              <a:buChar char="•"/>
+              <a:defRPr sz="1800" kern="1200">
+                <a:solidFill>
+                  <a:schemeClr val="tx1"/>
+                </a:solidFill>
+                <a:latin typeface="+mn-lt"/>
+                <a:ea typeface="+mn-ea"/>
+                <a:cs typeface="+mn-cs"/>
+              </a:defRPr>
+            </a:lvl4pPr>
+            <a:lvl5pPr marL="2057400" indent="-228600" algn="l" defTabSz="914400" rtl="0" eaLnBrk="1" latinLnBrk="0" hangingPunct="1">
+              <a:lnSpc>
+                <a:spcPct val="90000"/>
+              </a:lnSpc>
+              <a:spcBef>
+                <a:spcPts val="500"/>
+              </a:spcBef>
+              <a:buFont typeface="Arial" panose="020B0604020202020204" pitchFamily="34" charset="0"/>
+              <a:buChar char="•"/>
+              <a:defRPr sz="1800" kern="1200">
+                <a:solidFill>
+                  <a:schemeClr val="tx1"/>
+                </a:solidFill>
+                <a:latin typeface="+mn-lt"/>
+                <a:ea typeface="+mn-ea"/>
+                <a:cs typeface="+mn-cs"/>
+              </a:defRPr>
+            </a:lvl5pPr>
+            <a:lvl6pPr marL="2514600" indent="-228600" algn="l" defTabSz="914400" rtl="0" eaLnBrk="1" latinLnBrk="0" hangingPunct="1">
+              <a:lnSpc>
+                <a:spcPct val="90000"/>
+              </a:lnSpc>
+              <a:spcBef>
+                <a:spcPts val="500"/>
+              </a:spcBef>
+              <a:buFont typeface="Arial" panose="020B0604020202020204" pitchFamily="34" charset="0"/>
+              <a:buChar char="•"/>
+              <a:defRPr sz="1800" kern="1200">
+                <a:solidFill>
+                  <a:schemeClr val="tx1"/>
+                </a:solidFill>
+                <a:latin typeface="+mn-lt"/>
+                <a:ea typeface="+mn-ea"/>
+                <a:cs typeface="+mn-cs"/>
+              </a:defRPr>
+            </a:lvl6pPr>
+            <a:lvl7pPr marL="2971800" indent="-228600" algn="l" defTabSz="914400" rtl="0" eaLnBrk="1" latinLnBrk="0" hangingPunct="1">
+              <a:lnSpc>
+                <a:spcPct val="90000"/>
+              </a:lnSpc>
+              <a:spcBef>
+                <a:spcPts val="500"/>
+              </a:spcBef>
+              <a:buFont typeface="Arial" panose="020B0604020202020204" pitchFamily="34" charset="0"/>
+              <a:buChar char="•"/>
+              <a:defRPr sz="1800" kern="1200">
+                <a:solidFill>
+                  <a:schemeClr val="tx1"/>
+                </a:solidFill>
+                <a:latin typeface="+mn-lt"/>
+                <a:ea typeface="+mn-ea"/>
+                <a:cs typeface="+mn-cs"/>
+              </a:defRPr>
+            </a:lvl7pPr>
+            <a:lvl8pPr marL="3429000" indent="-228600" algn="l" defTabSz="914400" rtl="0" eaLnBrk="1" latinLnBrk="0" hangingPunct="1">
+              <a:lnSpc>
+                <a:spcPct val="90000"/>
+              </a:lnSpc>
+              <a:spcBef>
+                <a:spcPts val="500"/>
+              </a:spcBef>
+              <a:buFont typeface="Arial" panose="020B0604020202020204" pitchFamily="34" charset="0"/>
+              <a:buChar char="•"/>
+              <a:defRPr sz="1800" kern="1200">
+                <a:solidFill>
+                  <a:schemeClr val="tx1"/>
+                </a:solidFill>
+                <a:latin typeface="+mn-lt"/>
+                <a:ea typeface="+mn-ea"/>
+                <a:cs typeface="+mn-cs"/>
+              </a:defRPr>
+            </a:lvl8pPr>
+            <a:lvl9pPr marL="3886200" indent="-228600" algn="l" defTabSz="914400" rtl="0" eaLnBrk="1" latinLnBrk="0" hangingPunct="1">
+              <a:lnSpc>
+                <a:spcPct val="90000"/>
+              </a:lnSpc>
+              <a:spcBef>
+                <a:spcPts val="500"/>
+              </a:spcBef>
+              <a:buFont typeface="Arial" panose="020B0604020202020204" pitchFamily="34" charset="0"/>
+              <a:buChar char="•"/>
+              <a:defRPr sz="1800" kern="1200">
+                <a:solidFill>
+                  <a:schemeClr val="tx1"/>
+                </a:solidFill>
+                <a:latin typeface="+mn-lt"/>
+                <a:ea typeface="+mn-ea"/>
+                <a:cs typeface="+mn-cs"/>
+              </a:defRPr>
+            </a:lvl9pPr>
+          </a:lstStyle>
+          <a:p>
+            <a:r>
+              <a:rPr lang="en-US" sz="2000" dirty="0" err="1"/>
+              <a:t>pitch_range</a:t>
+            </a:r>
+            <a:r>
+              <a:rPr lang="en-US" sz="2000" dirty="0"/>
+              <a:t>=[60, 1000], </a:t>
+            </a:r>
+          </a:p>
+          <a:p>
+            <a:endParaRPr lang="en-US" sz="2000" dirty="0"/>
+          </a:p>
+        </p:txBody>
+      </p:sp>
+      <p:pic>
+        <p:nvPicPr>
+          <p:cNvPr id="7" name="Grafik 6">
+            <a:extLst>
+              <a:ext uri="{FF2B5EF4-FFF2-40B4-BE49-F238E27FC236}">
+                <a16:creationId xmlns:a16="http://schemas.microsoft.com/office/drawing/2014/main" id="{A145A96D-5D9B-724C-686B-D0CCBCCDD5FE}"/>
+              </a:ext>
+            </a:extLst>
+          </p:cNvPr>
+          <p:cNvPicPr>
+            <a:picLocks noChangeAspect="1"/>
+          </p:cNvPicPr>
+          <p:nvPr/>
+        </p:nvPicPr>
+        <p:blipFill>
+          <a:blip r:embed="rId2"/>
+          <a:stretch>
+            <a:fillRect/>
+          </a:stretch>
+        </p:blipFill>
+        <p:spPr>
+          <a:xfrm>
+            <a:off x="931088" y="2421924"/>
+            <a:ext cx="4981404" cy="3711146"/>
+          </a:xfrm>
+          <a:prstGeom prst="rect">
+            <a:avLst/>
+          </a:prstGeom>
+        </p:spPr>
+      </p:pic>
+      <p:pic>
+        <p:nvPicPr>
+          <p:cNvPr id="5" name="Grafik 4">
+            <a:extLst>
+              <a:ext uri="{FF2B5EF4-FFF2-40B4-BE49-F238E27FC236}">
+                <a16:creationId xmlns:a16="http://schemas.microsoft.com/office/drawing/2014/main" id="{2D33B34D-F902-8620-53B8-4A84EC00C2BB}"/>
+              </a:ext>
+            </a:extLst>
+          </p:cNvPr>
+          <p:cNvPicPr>
+            <a:picLocks noChangeAspect="1"/>
+          </p:cNvPicPr>
+          <p:nvPr/>
+        </p:nvPicPr>
+        <p:blipFill>
+          <a:blip r:embed="rId3"/>
+          <a:stretch>
+            <a:fillRect/>
+          </a:stretch>
+        </p:blipFill>
+        <p:spPr>
+          <a:xfrm>
+            <a:off x="6213719" y="2421924"/>
+            <a:ext cx="5136534" cy="3711146"/>
+          </a:xfrm>
+          <a:prstGeom prst="rect">
+            <a:avLst/>
+          </a:prstGeom>
+        </p:spPr>
+      </p:pic>
+    </p:spTree>
+    <p:extLst>
+      <p:ext uri="{BB962C8B-B14F-4D97-AF65-F5344CB8AC3E}">
+        <p14:creationId xmlns:p14="http://schemas.microsoft.com/office/powerpoint/2010/main" val="1754625087"/>
+      </p:ext>
+    </p:extLst>
+  </p:cSld>
+  <p:clrMapOvr>
+    <a:masterClrMapping/>
+  </p:clrMapOvr>
+</p:sld>
+</file>
+
+<file path=ppt/slides/slide11.xml><?xml version="1.0" encoding="utf-8"?>
+<p:sld xmlns:a="http://schemas.openxmlformats.org/drawingml/2006/main" xmlns:r="http://schemas.openxmlformats.org/officeDocument/2006/relationships" xmlns:p="http://schemas.openxmlformats.org/presentationml/2006/main">
+  <p:cSld>
     <p:spTree>
       <p:nvGrpSpPr>
         <p:cNvPr id="1" name=""/>
@@ -9588,7 +10547,7 @@
 </p:sld>
 </file>
 
-<file path=ppt/slides/slide11.xml><?xml version="1.0" encoding="utf-8"?>
+<file path=ppt/slides/slide12.xml><?xml version="1.0" encoding="utf-8"?>
 <p:sld xmlns:a="http://schemas.openxmlformats.org/drawingml/2006/main" xmlns:r="http://schemas.openxmlformats.org/officeDocument/2006/relationships" xmlns:p="http://schemas.openxmlformats.org/presentationml/2006/main">
   <p:cSld>
     <p:bg>
@@ -9993,7 +10952,7 @@
 </p:sld>
 </file>
 
-<file path=ppt/slides/slide12.xml><?xml version="1.0" encoding="utf-8"?>
+<file path=ppt/slides/slide13.xml><?xml version="1.0" encoding="utf-8"?>
 <p:sld xmlns:a="http://schemas.openxmlformats.org/drawingml/2006/main" xmlns:r="http://schemas.openxmlformats.org/officeDocument/2006/relationships" xmlns:p="http://schemas.openxmlformats.org/presentationml/2006/main">
   <p:cSld>
     <p:spTree>
@@ -10254,7 +11213,7 @@
 </p:sld>
 </file>
 
-<file path=ppt/slides/slide13.xml><?xml version="1.0" encoding="utf-8"?>
+<file path=ppt/slides/slide14.xml><?xml version="1.0" encoding="utf-8"?>
 <p:sld xmlns:a="http://schemas.openxmlformats.org/drawingml/2006/main" xmlns:r="http://schemas.openxmlformats.org/officeDocument/2006/relationships" xmlns:p="http://schemas.openxmlformats.org/presentationml/2006/main">
   <p:cSld>
     <p:bg>
@@ -10294,7 +11253,7 @@
           <p:nvPr/>
         </p:nvPicPr>
         <p:blipFill>
-          <a:blip r:embed="rId2"/>
+          <a:blip r:embed="rId3"/>
           <a:stretch>
             <a:fillRect/>
           </a:stretch>
@@ -10324,7 +11283,7 @@
           <p:nvPr/>
         </p:nvPicPr>
         <p:blipFill>
-          <a:blip r:embed="rId3"/>
+          <a:blip r:embed="rId4"/>
           <a:stretch>
             <a:fillRect/>
           </a:stretch>
@@ -10352,7 +11311,7 @@
 </p:sld>
 </file>
 
-<file path=ppt/slides/slide14.xml><?xml version="1.0" encoding="utf-8"?>
+<file path=ppt/slides/slide15.xml><?xml version="1.0" encoding="utf-8"?>
 <p:sld xmlns:a="http://schemas.openxmlformats.org/drawingml/2006/main" xmlns:r="http://schemas.openxmlformats.org/officeDocument/2006/relationships" xmlns:p="http://schemas.openxmlformats.org/presentationml/2006/main">
   <p:cSld>
     <p:spTree>
@@ -10581,7 +11540,7 @@
 </p:sld>
 </file>
 
-<file path=ppt/slides/slide15.xml><?xml version="1.0" encoding="utf-8"?>
+<file path=ppt/slides/slide16.xml><?xml version="1.0" encoding="utf-8"?>
 <p:sld xmlns:a="http://schemas.openxmlformats.org/drawingml/2006/main" xmlns:r="http://schemas.openxmlformats.org/officeDocument/2006/relationships" xmlns:p="http://schemas.openxmlformats.org/presentationml/2006/main">
   <p:cSld>
     <p:spTree>
@@ -10731,7 +11690,7 @@
 </p:sld>
 </file>
 
-<file path=ppt/slides/slide16.xml><?xml version="1.0" encoding="utf-8"?>
+<file path=ppt/slides/slide17.xml><?xml version="1.0" encoding="utf-8"?>
 <p:sld xmlns:a="http://schemas.openxmlformats.org/drawingml/2006/main" xmlns:r="http://schemas.openxmlformats.org/officeDocument/2006/relationships" xmlns:p="http://schemas.openxmlformats.org/presentationml/2006/main">
   <p:cSld>
     <p:spTree>
@@ -10887,7 +11846,7 @@
 </p:sld>
 </file>
 
-<file path=ppt/slides/slide17.xml><?xml version="1.0" encoding="utf-8"?>
+<file path=ppt/slides/slide18.xml><?xml version="1.0" encoding="utf-8"?>
 <p:sld xmlns:a="http://schemas.openxmlformats.org/drawingml/2006/main" xmlns:r="http://schemas.openxmlformats.org/officeDocument/2006/relationships" xmlns:p="http://schemas.openxmlformats.org/presentationml/2006/main">
   <p:cSld>
     <p:spTree>
@@ -10919,7 +11878,7 @@
           <p:nvPr/>
         </p:nvPicPr>
         <p:blipFill>
-          <a:blip r:embed="rId2"/>
+          <a:blip r:embed="rId3"/>
           <a:stretch>
             <a:fillRect/>
           </a:stretch>
@@ -10949,7 +11908,7 @@
           <p:nvPr/>
         </p:nvPicPr>
         <p:blipFill>
-          <a:blip r:embed="rId3"/>
+          <a:blip r:embed="rId4"/>
           <a:stretch>
             <a:fillRect/>
           </a:stretch>
@@ -10979,7 +11938,7 @@
           <p:nvPr/>
         </p:nvPicPr>
         <p:blipFill>
-          <a:blip r:embed="rId4"/>
+          <a:blip r:embed="rId5"/>
           <a:stretch>
             <a:fillRect/>
           </a:stretch>
@@ -11007,7 +11966,7 @@
 </p:sld>
 </file>
 
-<file path=ppt/slides/slide18.xml><?xml version="1.0" encoding="utf-8"?>
+<file path=ppt/slides/slide19.xml><?xml version="1.0" encoding="utf-8"?>
 <p:sld xmlns:a="http://schemas.openxmlformats.org/drawingml/2006/main" xmlns:r="http://schemas.openxmlformats.org/officeDocument/2006/relationships" xmlns:p="http://schemas.openxmlformats.org/presentationml/2006/main">
   <p:cSld>
     <p:spTree>
@@ -11253,438 +12212,6 @@
     <p:extLst>
       <p:ext uri="{BB962C8B-B14F-4D97-AF65-F5344CB8AC3E}">
         <p14:creationId xmlns:p14="http://schemas.microsoft.com/office/powerpoint/2010/main" val="2228676399"/>
-      </p:ext>
-    </p:extLst>
-  </p:cSld>
-  <p:clrMapOvr>
-    <a:masterClrMapping/>
-  </p:clrMapOvr>
-</p:sld>
-</file>
-
-<file path=ppt/slides/slide19.xml><?xml version="1.0" encoding="utf-8"?>
-<p:sld xmlns:a="http://schemas.openxmlformats.org/drawingml/2006/main" xmlns:r="http://schemas.openxmlformats.org/officeDocument/2006/relationships" xmlns:p="http://schemas.openxmlformats.org/presentationml/2006/main">
-  <p:cSld>
-    <p:spTree>
-      <p:nvGrpSpPr>
-        <p:cNvPr id="1" name=""/>
-        <p:cNvGrpSpPr/>
-        <p:nvPr/>
-      </p:nvGrpSpPr>
-      <p:grpSpPr>
-        <a:xfrm>
-          <a:off x="0" y="0"/>
-          <a:ext cx="0" cy="0"/>
-          <a:chOff x="0" y="0"/>
-          <a:chExt cx="0" cy="0"/>
-        </a:xfrm>
-      </p:grpSpPr>
-      <p:sp>
-        <p:nvSpPr>
-          <p:cNvPr id="2" name="Titel 1">
-            <a:extLst>
-              <a:ext uri="{FF2B5EF4-FFF2-40B4-BE49-F238E27FC236}">
-                <a16:creationId xmlns:a16="http://schemas.microsoft.com/office/drawing/2014/main" id="{7FEC82B8-B93A-6B4F-B1EB-4D7842484FCB}"/>
-              </a:ext>
-            </a:extLst>
-          </p:cNvPr>
-          <p:cNvSpPr>
-            <a:spLocks noGrp="1"/>
-          </p:cNvSpPr>
-          <p:nvPr>
-            <p:ph type="title"/>
-          </p:nvPr>
-        </p:nvSpPr>
-        <p:spPr/>
-        <p:txBody>
-          <a:bodyPr/>
-          <a:lstStyle/>
-          <a:p>
-            <a:r>
-              <a:rPr lang="de-DE" dirty="0"/>
-              <a:t>Next </a:t>
-            </a:r>
-            <a:r>
-              <a:rPr lang="de-DE" dirty="0" err="1"/>
-              <a:t>Steps</a:t>
-            </a:r>
-            <a:r>
-              <a:rPr lang="de-DE" dirty="0"/>
-              <a:t>:</a:t>
-            </a:r>
-            <a:endParaRPr lang="en-US" dirty="0"/>
-          </a:p>
-        </p:txBody>
-      </p:sp>
-      <p:sp>
-        <p:nvSpPr>
-          <p:cNvPr id="3" name="Inhaltsplatzhalter 2">
-            <a:extLst>
-              <a:ext uri="{FF2B5EF4-FFF2-40B4-BE49-F238E27FC236}">
-                <a16:creationId xmlns:a16="http://schemas.microsoft.com/office/drawing/2014/main" id="{39B0E42A-F805-D081-9CBE-F8C3B1C3CA97}"/>
-              </a:ext>
-            </a:extLst>
-          </p:cNvPr>
-          <p:cNvSpPr>
-            <a:spLocks noGrp="1"/>
-          </p:cNvSpPr>
-          <p:nvPr>
-            <p:ph idx="1"/>
-          </p:nvPr>
-        </p:nvSpPr>
-        <p:spPr/>
-        <p:txBody>
-          <a:bodyPr>
-            <a:normAutofit lnSpcReduction="10000"/>
-          </a:bodyPr>
-          <a:lstStyle/>
-          <a:p>
-            <a:r>
-              <a:rPr lang="de-DE" dirty="0" err="1"/>
-              <a:t>Hyperparamtuning</a:t>
-            </a:r>
-            <a:r>
-              <a:rPr lang="de-DE" dirty="0"/>
-              <a:t> </a:t>
-            </a:r>
-            <a:r>
-              <a:rPr lang="de-DE" dirty="0" err="1"/>
-              <a:t>for</a:t>
-            </a:r>
-            <a:r>
-              <a:rPr lang="de-DE" dirty="0"/>
-              <a:t> MFCC, Mel-</a:t>
-            </a:r>
-            <a:r>
-              <a:rPr lang="de-DE" dirty="0" err="1"/>
-              <a:t>Specto</a:t>
-            </a:r>
-            <a:r>
-              <a:rPr lang="de-DE" dirty="0"/>
-              <a:t>, Attention 1 &amp;2</a:t>
-            </a:r>
-          </a:p>
-          <a:p>
-            <a:pPr lvl="1"/>
-            <a:r>
-              <a:rPr lang="de-DE" dirty="0" err="1"/>
-              <a:t>How</a:t>
-            </a:r>
-            <a:r>
-              <a:rPr lang="de-DE" dirty="0"/>
-              <a:t> </a:t>
-            </a:r>
-            <a:r>
-              <a:rPr lang="de-DE" dirty="0" err="1"/>
-              <a:t>to</a:t>
-            </a:r>
-            <a:r>
-              <a:rPr lang="de-DE" dirty="0"/>
-              <a:t> </a:t>
-            </a:r>
-            <a:r>
-              <a:rPr lang="de-DE" dirty="0" err="1"/>
-              <a:t>make</a:t>
-            </a:r>
-            <a:r>
-              <a:rPr lang="de-DE" dirty="0"/>
-              <a:t> </a:t>
-            </a:r>
-            <a:r>
-              <a:rPr lang="de-DE" dirty="0" err="1"/>
-              <a:t>fixed</a:t>
-            </a:r>
-            <a:r>
-              <a:rPr lang="de-DE" dirty="0"/>
-              <a:t> </a:t>
-            </a:r>
-            <a:r>
-              <a:rPr lang="de-DE" dirty="0" err="1"/>
-              <a:t>lists</a:t>
-            </a:r>
-            <a:r>
-              <a:rPr lang="de-DE" dirty="0"/>
-              <a:t>? </a:t>
-            </a:r>
-            <a:r>
-              <a:rPr lang="de-DE" dirty="0" err="1"/>
-              <a:t>How</a:t>
-            </a:r>
-            <a:r>
-              <a:rPr lang="de-DE" dirty="0"/>
-              <a:t> </a:t>
-            </a:r>
-            <a:r>
-              <a:rPr lang="de-DE" dirty="0" err="1"/>
-              <a:t>often</a:t>
-            </a:r>
-            <a:r>
-              <a:rPr lang="de-DE" dirty="0"/>
-              <a:t> </a:t>
-            </a:r>
-            <a:r>
-              <a:rPr lang="de-DE" dirty="0" err="1"/>
-              <a:t>what</a:t>
-            </a:r>
-            <a:r>
-              <a:rPr lang="de-DE" dirty="0"/>
-              <a:t> and </a:t>
-            </a:r>
-            <a:r>
-              <a:rPr lang="de-DE" dirty="0" err="1"/>
-              <a:t>how</a:t>
-            </a:r>
-            <a:r>
-              <a:rPr lang="de-DE" dirty="0"/>
-              <a:t> </a:t>
-            </a:r>
-            <a:r>
-              <a:rPr lang="de-DE" dirty="0" err="1"/>
-              <a:t>many</a:t>
-            </a:r>
-            <a:r>
-              <a:rPr lang="de-DE" dirty="0"/>
-              <a:t> </a:t>
-            </a:r>
-            <a:r>
-              <a:rPr lang="de-DE" dirty="0" err="1"/>
-              <a:t>times</a:t>
-            </a:r>
-            <a:r>
-              <a:rPr lang="de-DE" dirty="0"/>
-              <a:t> </a:t>
-            </a:r>
-            <a:r>
-              <a:rPr lang="de-DE" dirty="0" err="1"/>
-              <a:t>augmented</a:t>
-            </a:r>
-            <a:r>
-              <a:rPr lang="de-DE" dirty="0"/>
-              <a:t>?</a:t>
-            </a:r>
-          </a:p>
-          <a:p>
-            <a:pPr lvl="1"/>
-            <a:r>
-              <a:rPr lang="de-DE" dirty="0" err="1"/>
-              <a:t>Should</a:t>
-            </a:r>
-            <a:r>
-              <a:rPr lang="de-DE" dirty="0"/>
-              <a:t> i do </a:t>
-            </a:r>
-            <a:r>
-              <a:rPr lang="de-DE" dirty="0" err="1"/>
-              <a:t>random</a:t>
-            </a:r>
-            <a:r>
-              <a:rPr lang="de-DE" dirty="0"/>
-              <a:t> </a:t>
-            </a:r>
-            <a:r>
-              <a:rPr lang="de-DE" dirty="0" err="1"/>
-              <a:t>Crop</a:t>
-            </a:r>
-            <a:r>
-              <a:rPr lang="de-DE" dirty="0"/>
-              <a:t>/</a:t>
-            </a:r>
-            <a:r>
-              <a:rPr lang="de-DE" dirty="0" err="1"/>
-              <a:t>pad</a:t>
-            </a:r>
-            <a:r>
-              <a:rPr lang="de-DE" dirty="0"/>
-              <a:t> on </a:t>
-            </a:r>
-            <a:r>
-              <a:rPr lang="de-DE" dirty="0" err="1"/>
-              <a:t>audio</a:t>
-            </a:r>
-            <a:r>
-              <a:rPr lang="de-DE" dirty="0"/>
-              <a:t>?</a:t>
-            </a:r>
-          </a:p>
-          <a:p>
-            <a:pPr lvl="1"/>
-            <a:r>
-              <a:rPr lang="de-DE" dirty="0" err="1"/>
-              <a:t>Should</a:t>
-            </a:r>
-            <a:r>
-              <a:rPr lang="de-DE" dirty="0"/>
-              <a:t> i do </a:t>
-            </a:r>
-            <a:r>
-              <a:rPr lang="de-DE" dirty="0" err="1"/>
-              <a:t>any</a:t>
-            </a:r>
-            <a:r>
-              <a:rPr lang="de-DE" dirty="0"/>
-              <a:t> </a:t>
-            </a:r>
-            <a:r>
-              <a:rPr lang="de-DE" dirty="0" err="1"/>
-              <a:t>augmentations</a:t>
-            </a:r>
-            <a:r>
-              <a:rPr lang="de-DE" dirty="0"/>
-              <a:t> on </a:t>
-            </a:r>
-            <a:r>
-              <a:rPr lang="de-DE" dirty="0" err="1"/>
-              <a:t>the</a:t>
-            </a:r>
-            <a:r>
-              <a:rPr lang="de-DE" dirty="0"/>
-              <a:t> </a:t>
-            </a:r>
-            <a:r>
-              <a:rPr lang="de-DE" dirty="0" err="1"/>
-              <a:t>images</a:t>
-            </a:r>
-            <a:r>
-              <a:rPr lang="de-DE" dirty="0"/>
-              <a:t>?</a:t>
-            </a:r>
-          </a:p>
-          <a:p>
-            <a:r>
-              <a:rPr lang="de-DE" dirty="0" err="1"/>
-              <a:t>Hyperparam</a:t>
-            </a:r>
-            <a:r>
-              <a:rPr lang="de-DE" dirty="0"/>
-              <a:t> </a:t>
-            </a:r>
-            <a:r>
-              <a:rPr lang="de-DE" dirty="0" err="1"/>
-              <a:t>training</a:t>
-            </a:r>
-            <a:r>
-              <a:rPr lang="de-DE" dirty="0"/>
-              <a:t> </a:t>
-            </a:r>
-            <a:r>
-              <a:rPr lang="de-DE" dirty="0" err="1"/>
-              <a:t>for</a:t>
-            </a:r>
-            <a:r>
-              <a:rPr lang="de-DE" dirty="0"/>
-              <a:t> STT </a:t>
-            </a:r>
-            <a:r>
-              <a:rPr lang="de-DE" dirty="0" err="1"/>
-              <a:t>approach</a:t>
-            </a:r>
-            <a:r>
-              <a:rPr lang="de-DE" dirty="0"/>
-              <a:t>.</a:t>
-            </a:r>
-          </a:p>
-          <a:p>
-            <a:pPr lvl="1"/>
-            <a:r>
-              <a:rPr lang="de-DE" dirty="0" err="1"/>
-              <a:t>Only</a:t>
-            </a:r>
-            <a:r>
-              <a:rPr lang="de-DE" dirty="0"/>
-              <a:t> </a:t>
-            </a:r>
-            <a:r>
-              <a:rPr lang="de-DE" dirty="0" err="1"/>
-              <a:t>take</a:t>
-            </a:r>
-            <a:r>
-              <a:rPr lang="de-DE" dirty="0"/>
-              <a:t> </a:t>
-            </a:r>
-            <a:r>
-              <a:rPr lang="de-DE" dirty="0" err="1"/>
-              <a:t>rows</a:t>
-            </a:r>
-            <a:r>
-              <a:rPr lang="de-DE" dirty="0"/>
-              <a:t> </a:t>
-            </a:r>
-            <a:r>
-              <a:rPr lang="de-DE" dirty="0" err="1"/>
-              <a:t>of</a:t>
-            </a:r>
-            <a:r>
-              <a:rPr lang="de-DE" dirty="0"/>
-              <a:t> </a:t>
-            </a:r>
-            <a:r>
-              <a:rPr lang="de-DE" dirty="0" err="1"/>
-              <a:t>s,x,z</a:t>
-            </a:r>
-            <a:r>
-              <a:rPr lang="de-DE" dirty="0"/>
-              <a:t>? -&gt; </a:t>
-            </a:r>
-            <a:r>
-              <a:rPr lang="de-DE" dirty="0" err="1"/>
-              <a:t>small</a:t>
-            </a:r>
-            <a:r>
-              <a:rPr lang="de-DE" dirty="0"/>
-              <a:t> </a:t>
-            </a:r>
-            <a:r>
-              <a:rPr lang="de-DE" dirty="0" err="1"/>
-              <a:t>input</a:t>
-            </a:r>
-            <a:r>
-              <a:rPr lang="de-DE" dirty="0"/>
-              <a:t>?</a:t>
-            </a:r>
-          </a:p>
-          <a:p>
-            <a:pPr lvl="1"/>
-            <a:r>
-              <a:rPr lang="en-US"/>
-              <a:t>Any augmentations?</a:t>
-            </a:r>
-            <a:endParaRPr lang="en-US" dirty="0"/>
-          </a:p>
-          <a:p>
-            <a:r>
-              <a:rPr lang="en-US" dirty="0"/>
-              <a:t>How to resize?</a:t>
-            </a:r>
-          </a:p>
-          <a:p>
-            <a:pPr lvl="1"/>
-            <a:r>
-              <a:rPr lang="en-US" dirty="0"/>
-              <a:t>First pad till longest word in time axis. Then interpolate in both axis.</a:t>
-            </a:r>
-          </a:p>
-          <a:p>
-            <a:pPr lvl="2"/>
-            <a:r>
-              <a:rPr lang="en-US" dirty="0"/>
-              <a:t>Do that for STT, MFCC, Mel </a:t>
-            </a:r>
-            <a:r>
-              <a:rPr lang="en-US" dirty="0" err="1"/>
-              <a:t>Specto</a:t>
-            </a:r>
-            <a:r>
-              <a:rPr lang="en-US" dirty="0"/>
-              <a:t>?</a:t>
-            </a:r>
-            <a:endParaRPr lang="de-DE" dirty="0"/>
-          </a:p>
-        </p:txBody>
-      </p:sp>
-    </p:spTree>
-    <p:extLst>
-      <p:ext uri="{BB962C8B-B14F-4D97-AF65-F5344CB8AC3E}">
-        <p14:creationId xmlns:p14="http://schemas.microsoft.com/office/powerpoint/2010/main" val="4228036351"/>
       </p:ext>
     </p:extLst>
   </p:cSld>
@@ -11905,7 +12432,1128 @@
 </p:sld>
 </file>
 
+<file path=ppt/slides/slide20.xml><?xml version="1.0" encoding="utf-8"?>
+<p:sld xmlns:a="http://schemas.openxmlformats.org/drawingml/2006/main" xmlns:r="http://schemas.openxmlformats.org/officeDocument/2006/relationships" xmlns:p="http://schemas.openxmlformats.org/presentationml/2006/main">
+  <p:cSld>
+    <p:spTree>
+      <p:nvGrpSpPr>
+        <p:cNvPr id="1" name=""/>
+        <p:cNvGrpSpPr/>
+        <p:nvPr/>
+      </p:nvGrpSpPr>
+      <p:grpSpPr>
+        <a:xfrm>
+          <a:off x="0" y="0"/>
+          <a:ext cx="0" cy="0"/>
+          <a:chOff x="0" y="0"/>
+          <a:chExt cx="0" cy="0"/>
+        </a:xfrm>
+      </p:grpSpPr>
+      <p:sp>
+        <p:nvSpPr>
+          <p:cNvPr id="2" name="Titel 1">
+            <a:extLst>
+              <a:ext uri="{FF2B5EF4-FFF2-40B4-BE49-F238E27FC236}">
+                <a16:creationId xmlns:a16="http://schemas.microsoft.com/office/drawing/2014/main" id="{7FEC82B8-B93A-6B4F-B1EB-4D7842484FCB}"/>
+              </a:ext>
+            </a:extLst>
+          </p:cNvPr>
+          <p:cNvSpPr>
+            <a:spLocks noGrp="1"/>
+          </p:cNvSpPr>
+          <p:nvPr>
+            <p:ph type="title"/>
+          </p:nvPr>
+        </p:nvSpPr>
+        <p:spPr/>
+        <p:txBody>
+          <a:bodyPr/>
+          <a:lstStyle/>
+          <a:p>
+            <a:r>
+              <a:rPr lang="de-DE" dirty="0"/>
+              <a:t>Next </a:t>
+            </a:r>
+            <a:r>
+              <a:rPr lang="de-DE" dirty="0" err="1"/>
+              <a:t>Steps</a:t>
+            </a:r>
+            <a:r>
+              <a:rPr lang="de-DE" dirty="0"/>
+              <a:t>:</a:t>
+            </a:r>
+            <a:endParaRPr lang="en-US" dirty="0"/>
+          </a:p>
+        </p:txBody>
+      </p:sp>
+      <p:sp>
+        <p:nvSpPr>
+          <p:cNvPr id="3" name="Inhaltsplatzhalter 2">
+            <a:extLst>
+              <a:ext uri="{FF2B5EF4-FFF2-40B4-BE49-F238E27FC236}">
+                <a16:creationId xmlns:a16="http://schemas.microsoft.com/office/drawing/2014/main" id="{39B0E42A-F805-D081-9CBE-F8C3B1C3CA97}"/>
+              </a:ext>
+            </a:extLst>
+          </p:cNvPr>
+          <p:cNvSpPr>
+            <a:spLocks noGrp="1"/>
+          </p:cNvSpPr>
+          <p:nvPr>
+            <p:ph idx="1"/>
+          </p:nvPr>
+        </p:nvSpPr>
+        <p:spPr/>
+        <p:txBody>
+          <a:bodyPr>
+            <a:normAutofit/>
+          </a:bodyPr>
+          <a:lstStyle/>
+          <a:p>
+            <a:r>
+              <a:rPr lang="de-DE" dirty="0" err="1"/>
+              <a:t>Hyperparamtuning</a:t>
+            </a:r>
+            <a:r>
+              <a:rPr lang="de-DE" dirty="0"/>
+              <a:t> </a:t>
+            </a:r>
+            <a:r>
+              <a:rPr lang="de-DE" dirty="0" err="1"/>
+              <a:t>for</a:t>
+            </a:r>
+            <a:r>
+              <a:rPr lang="de-DE" dirty="0"/>
+              <a:t> MFCC, Mel-</a:t>
+            </a:r>
+            <a:r>
+              <a:rPr lang="de-DE" dirty="0" err="1"/>
+              <a:t>Specto</a:t>
+            </a:r>
+            <a:r>
+              <a:rPr lang="de-DE" dirty="0"/>
+              <a:t>, Attention 1 &amp;2</a:t>
+            </a:r>
+          </a:p>
+          <a:p>
+            <a:pPr lvl="1"/>
+            <a:r>
+              <a:rPr lang="de-DE" dirty="0" err="1"/>
+              <a:t>How</a:t>
+            </a:r>
+            <a:r>
+              <a:rPr lang="de-DE" dirty="0"/>
+              <a:t> </a:t>
+            </a:r>
+            <a:r>
+              <a:rPr lang="de-DE" dirty="0" err="1"/>
+              <a:t>to</a:t>
+            </a:r>
+            <a:r>
+              <a:rPr lang="de-DE" dirty="0"/>
+              <a:t> </a:t>
+            </a:r>
+            <a:r>
+              <a:rPr lang="de-DE" dirty="0" err="1"/>
+              <a:t>make</a:t>
+            </a:r>
+            <a:r>
+              <a:rPr lang="de-DE" dirty="0"/>
+              <a:t> </a:t>
+            </a:r>
+            <a:r>
+              <a:rPr lang="de-DE" dirty="0" err="1"/>
+              <a:t>fixed</a:t>
+            </a:r>
+            <a:r>
+              <a:rPr lang="de-DE" dirty="0"/>
+              <a:t> </a:t>
+            </a:r>
+            <a:r>
+              <a:rPr lang="de-DE" dirty="0" err="1"/>
+              <a:t>lists</a:t>
+            </a:r>
+            <a:r>
+              <a:rPr lang="de-DE" dirty="0"/>
+              <a:t>? </a:t>
+            </a:r>
+            <a:r>
+              <a:rPr lang="de-DE" dirty="0" err="1"/>
+              <a:t>How</a:t>
+            </a:r>
+            <a:r>
+              <a:rPr lang="de-DE" dirty="0"/>
+              <a:t> </a:t>
+            </a:r>
+            <a:r>
+              <a:rPr lang="de-DE" dirty="0" err="1"/>
+              <a:t>often</a:t>
+            </a:r>
+            <a:r>
+              <a:rPr lang="de-DE" dirty="0"/>
+              <a:t> </a:t>
+            </a:r>
+            <a:r>
+              <a:rPr lang="de-DE" dirty="0" err="1"/>
+              <a:t>what</a:t>
+            </a:r>
+            <a:r>
+              <a:rPr lang="de-DE" dirty="0"/>
+              <a:t> and </a:t>
+            </a:r>
+            <a:r>
+              <a:rPr lang="de-DE" dirty="0" err="1"/>
+              <a:t>how</a:t>
+            </a:r>
+            <a:r>
+              <a:rPr lang="de-DE" dirty="0"/>
+              <a:t> </a:t>
+            </a:r>
+            <a:r>
+              <a:rPr lang="de-DE" dirty="0" err="1"/>
+              <a:t>many</a:t>
+            </a:r>
+            <a:r>
+              <a:rPr lang="de-DE" dirty="0"/>
+              <a:t> </a:t>
+            </a:r>
+            <a:r>
+              <a:rPr lang="de-DE" dirty="0" err="1"/>
+              <a:t>times</a:t>
+            </a:r>
+            <a:r>
+              <a:rPr lang="de-DE" dirty="0"/>
+              <a:t> </a:t>
+            </a:r>
+            <a:r>
+              <a:rPr lang="de-DE" dirty="0" err="1"/>
+              <a:t>augmented</a:t>
+            </a:r>
+            <a:r>
+              <a:rPr lang="de-DE" dirty="0"/>
+              <a:t>?</a:t>
+            </a:r>
+          </a:p>
+          <a:p>
+            <a:pPr lvl="1"/>
+            <a:r>
+              <a:rPr lang="de-DE" dirty="0" err="1"/>
+              <a:t>Should</a:t>
+            </a:r>
+            <a:r>
+              <a:rPr lang="de-DE" dirty="0"/>
+              <a:t> i do </a:t>
+            </a:r>
+            <a:r>
+              <a:rPr lang="de-DE" dirty="0" err="1"/>
+              <a:t>random</a:t>
+            </a:r>
+            <a:r>
+              <a:rPr lang="de-DE" dirty="0"/>
+              <a:t> </a:t>
+            </a:r>
+            <a:r>
+              <a:rPr lang="de-DE" dirty="0" err="1"/>
+              <a:t>Crop</a:t>
+            </a:r>
+            <a:r>
+              <a:rPr lang="de-DE" dirty="0"/>
+              <a:t>/</a:t>
+            </a:r>
+            <a:r>
+              <a:rPr lang="de-DE" dirty="0" err="1"/>
+              <a:t>pad</a:t>
+            </a:r>
+            <a:r>
+              <a:rPr lang="de-DE" dirty="0"/>
+              <a:t> on </a:t>
+            </a:r>
+            <a:r>
+              <a:rPr lang="de-DE" dirty="0" err="1"/>
+              <a:t>audio</a:t>
+            </a:r>
+            <a:r>
+              <a:rPr lang="de-DE" dirty="0"/>
+              <a:t>?</a:t>
+            </a:r>
+          </a:p>
+          <a:p>
+            <a:pPr lvl="1"/>
+            <a:r>
+              <a:rPr lang="de-DE" dirty="0" err="1"/>
+              <a:t>Should</a:t>
+            </a:r>
+            <a:r>
+              <a:rPr lang="de-DE" dirty="0"/>
+              <a:t> i do </a:t>
+            </a:r>
+            <a:r>
+              <a:rPr lang="de-DE" dirty="0" err="1"/>
+              <a:t>any</a:t>
+            </a:r>
+            <a:r>
+              <a:rPr lang="de-DE" dirty="0"/>
+              <a:t> </a:t>
+            </a:r>
+            <a:r>
+              <a:rPr lang="de-DE" dirty="0" err="1"/>
+              <a:t>augmentations</a:t>
+            </a:r>
+            <a:r>
+              <a:rPr lang="de-DE" dirty="0"/>
+              <a:t> on </a:t>
+            </a:r>
+            <a:r>
+              <a:rPr lang="de-DE" dirty="0" err="1"/>
+              <a:t>the</a:t>
+            </a:r>
+            <a:r>
+              <a:rPr lang="de-DE" dirty="0"/>
+              <a:t> </a:t>
+            </a:r>
+            <a:r>
+              <a:rPr lang="de-DE" dirty="0" err="1"/>
+              <a:t>images</a:t>
+            </a:r>
+            <a:r>
+              <a:rPr lang="de-DE" dirty="0"/>
+              <a:t>?</a:t>
+            </a:r>
+          </a:p>
+          <a:p>
+            <a:r>
+              <a:rPr lang="de-DE" dirty="0" err="1"/>
+              <a:t>Hyperparam</a:t>
+            </a:r>
+            <a:r>
+              <a:rPr lang="de-DE" dirty="0"/>
+              <a:t> </a:t>
+            </a:r>
+            <a:r>
+              <a:rPr lang="de-DE" dirty="0" err="1"/>
+              <a:t>training</a:t>
+            </a:r>
+            <a:r>
+              <a:rPr lang="de-DE" dirty="0"/>
+              <a:t> </a:t>
+            </a:r>
+            <a:r>
+              <a:rPr lang="de-DE" dirty="0" err="1"/>
+              <a:t>for</a:t>
+            </a:r>
+            <a:r>
+              <a:rPr lang="de-DE" dirty="0"/>
+              <a:t> STT </a:t>
+            </a:r>
+            <a:r>
+              <a:rPr lang="de-DE" dirty="0" err="1"/>
+              <a:t>approach</a:t>
+            </a:r>
+            <a:r>
+              <a:rPr lang="de-DE" dirty="0"/>
+              <a:t>.</a:t>
+            </a:r>
+          </a:p>
+          <a:p>
+            <a:pPr lvl="1"/>
+            <a:r>
+              <a:rPr lang="de-DE" dirty="0" err="1"/>
+              <a:t>Only</a:t>
+            </a:r>
+            <a:r>
+              <a:rPr lang="de-DE" dirty="0"/>
+              <a:t> </a:t>
+            </a:r>
+            <a:r>
+              <a:rPr lang="de-DE" dirty="0" err="1"/>
+              <a:t>take</a:t>
+            </a:r>
+            <a:r>
+              <a:rPr lang="de-DE" dirty="0"/>
+              <a:t> </a:t>
+            </a:r>
+            <a:r>
+              <a:rPr lang="de-DE" dirty="0" err="1"/>
+              <a:t>rows</a:t>
+            </a:r>
+            <a:r>
+              <a:rPr lang="de-DE" dirty="0"/>
+              <a:t> </a:t>
+            </a:r>
+            <a:r>
+              <a:rPr lang="de-DE" dirty="0" err="1"/>
+              <a:t>of</a:t>
+            </a:r>
+            <a:r>
+              <a:rPr lang="de-DE" dirty="0"/>
+              <a:t> </a:t>
+            </a:r>
+            <a:r>
+              <a:rPr lang="de-DE" dirty="0" err="1"/>
+              <a:t>s,x,z</a:t>
+            </a:r>
+            <a:r>
+              <a:rPr lang="de-DE" dirty="0"/>
+              <a:t>? -&gt; </a:t>
+            </a:r>
+            <a:r>
+              <a:rPr lang="de-DE" dirty="0" err="1"/>
+              <a:t>small</a:t>
+            </a:r>
+            <a:r>
+              <a:rPr lang="de-DE" dirty="0"/>
+              <a:t> </a:t>
+            </a:r>
+            <a:r>
+              <a:rPr lang="de-DE" dirty="0" err="1"/>
+              <a:t>input</a:t>
+            </a:r>
+            <a:r>
+              <a:rPr lang="de-DE" dirty="0"/>
+              <a:t>?</a:t>
+            </a:r>
+          </a:p>
+          <a:p>
+            <a:pPr lvl="1"/>
+            <a:r>
+              <a:rPr lang="en-US"/>
+              <a:t>Any augmentations?</a:t>
+            </a:r>
+            <a:endParaRPr lang="en-US" dirty="0"/>
+          </a:p>
+          <a:p>
+            <a:r>
+              <a:rPr lang="en-US" dirty="0"/>
+              <a:t>How to resize?</a:t>
+            </a:r>
+          </a:p>
+          <a:p>
+            <a:pPr lvl="1"/>
+            <a:r>
+              <a:rPr lang="en-US" dirty="0"/>
+              <a:t>First pad till longest word in time axis. Then interpolate in both axis.</a:t>
+            </a:r>
+          </a:p>
+          <a:p>
+            <a:pPr lvl="2"/>
+            <a:r>
+              <a:rPr lang="en-US" dirty="0"/>
+              <a:t>Do that for STT, MFCC, Mel </a:t>
+            </a:r>
+            <a:r>
+              <a:rPr lang="en-US" dirty="0" err="1"/>
+              <a:t>Specto</a:t>
+            </a:r>
+            <a:r>
+              <a:rPr lang="en-US" dirty="0"/>
+              <a:t>?</a:t>
+            </a:r>
+            <a:endParaRPr lang="de-DE" dirty="0"/>
+          </a:p>
+        </p:txBody>
+      </p:sp>
+    </p:spTree>
+    <p:extLst>
+      <p:ext uri="{BB962C8B-B14F-4D97-AF65-F5344CB8AC3E}">
+        <p14:creationId xmlns:p14="http://schemas.microsoft.com/office/powerpoint/2010/main" val="4228036351"/>
+      </p:ext>
+    </p:extLst>
+  </p:cSld>
+  <p:clrMapOvr>
+    <a:masterClrMapping/>
+  </p:clrMapOvr>
+</p:sld>
+</file>
+
+<file path=ppt/slides/slide21.xml><?xml version="1.0" encoding="utf-8"?>
+<p:sld xmlns:a="http://schemas.openxmlformats.org/drawingml/2006/main" xmlns:r="http://schemas.openxmlformats.org/officeDocument/2006/relationships" xmlns:p="http://schemas.openxmlformats.org/presentationml/2006/main">
+  <p:cSld>
+    <p:spTree>
+      <p:nvGrpSpPr>
+        <p:cNvPr id="1" name=""/>
+        <p:cNvGrpSpPr/>
+        <p:nvPr/>
+      </p:nvGrpSpPr>
+      <p:grpSpPr>
+        <a:xfrm>
+          <a:off x="0" y="0"/>
+          <a:ext cx="0" cy="0"/>
+          <a:chOff x="0" y="0"/>
+          <a:chExt cx="0" cy="0"/>
+        </a:xfrm>
+      </p:grpSpPr>
+      <p:sp>
+        <p:nvSpPr>
+          <p:cNvPr id="2" name="Titel 1">
+            <a:extLst>
+              <a:ext uri="{FF2B5EF4-FFF2-40B4-BE49-F238E27FC236}">
+                <a16:creationId xmlns:a16="http://schemas.microsoft.com/office/drawing/2014/main" id="{88BEA96E-C074-459F-86C4-ADCC988E6561}"/>
+              </a:ext>
+            </a:extLst>
+          </p:cNvPr>
+          <p:cNvSpPr>
+            <a:spLocks noGrp="1"/>
+          </p:cNvSpPr>
+          <p:nvPr>
+            <p:ph type="title"/>
+          </p:nvPr>
+        </p:nvSpPr>
+        <p:spPr>
+          <a:xfrm>
+            <a:off x="838200" y="329499"/>
+            <a:ext cx="10515600" cy="1325563"/>
+          </a:xfrm>
+        </p:spPr>
+        <p:txBody>
+          <a:bodyPr/>
+          <a:lstStyle/>
+          <a:p>
+            <a:r>
+              <a:rPr lang="de-DE" dirty="0"/>
+              <a:t>Wort n zu gleichem </a:t>
+            </a:r>
+            <a:r>
+              <a:rPr lang="de-DE" dirty="0" err="1"/>
+              <a:t>wort</a:t>
+            </a:r>
+            <a:r>
+              <a:rPr lang="de-DE" dirty="0"/>
+              <a:t> s</a:t>
+            </a:r>
+          </a:p>
+        </p:txBody>
+      </p:sp>
+      <p:pic>
+        <p:nvPicPr>
+          <p:cNvPr id="8" name="Grafik 7">
+            <a:extLst>
+              <a:ext uri="{FF2B5EF4-FFF2-40B4-BE49-F238E27FC236}">
+                <a16:creationId xmlns:a16="http://schemas.microsoft.com/office/drawing/2014/main" id="{F234E90F-CFC3-4EA5-A539-753BB311DE6D}"/>
+              </a:ext>
+            </a:extLst>
+          </p:cNvPr>
+          <p:cNvPicPr>
+            <a:picLocks noChangeAspect="1"/>
+          </p:cNvPicPr>
+          <p:nvPr/>
+        </p:nvPicPr>
+        <p:blipFill>
+          <a:blip r:embed="rId2">
+            <a:extLst>
+              <a:ext uri="{28A0092B-C50C-407E-A947-70E740481C1C}">
+                <a14:useLocalDpi xmlns:a14="http://schemas.microsoft.com/office/drawing/2010/main" val="0"/>
+              </a:ext>
+            </a:extLst>
+          </a:blip>
+          <a:stretch>
+            <a:fillRect/>
+          </a:stretch>
+        </p:blipFill>
+        <p:spPr>
+          <a:xfrm>
+            <a:off x="6388368" y="1655062"/>
+            <a:ext cx="4517143" cy="4517143"/>
+          </a:xfrm>
+          <a:prstGeom prst="rect">
+            <a:avLst/>
+          </a:prstGeom>
+        </p:spPr>
+      </p:pic>
+      <p:pic>
+        <p:nvPicPr>
+          <p:cNvPr id="10" name="Grafik 9">
+            <a:extLst>
+              <a:ext uri="{FF2B5EF4-FFF2-40B4-BE49-F238E27FC236}">
+                <a16:creationId xmlns:a16="http://schemas.microsoft.com/office/drawing/2014/main" id="{DD239D0B-98FC-4661-86B1-E2AFF0771C93}"/>
+              </a:ext>
+            </a:extLst>
+          </p:cNvPr>
+          <p:cNvPicPr>
+            <a:picLocks noChangeAspect="1"/>
+          </p:cNvPicPr>
+          <p:nvPr/>
+        </p:nvPicPr>
+        <p:blipFill>
+          <a:blip r:embed="rId3">
+            <a:extLst>
+              <a:ext uri="{28A0092B-C50C-407E-A947-70E740481C1C}">
+                <a14:useLocalDpi xmlns:a14="http://schemas.microsoft.com/office/drawing/2010/main" val="0"/>
+              </a:ext>
+            </a:extLst>
+          </a:blip>
+          <a:stretch>
+            <a:fillRect/>
+          </a:stretch>
+        </p:blipFill>
+        <p:spPr>
+          <a:xfrm>
+            <a:off x="838199" y="1655062"/>
+            <a:ext cx="4340431" cy="4340431"/>
+          </a:xfrm>
+          <a:prstGeom prst="rect">
+            <a:avLst/>
+          </a:prstGeom>
+        </p:spPr>
+      </p:pic>
+    </p:spTree>
+    <p:extLst>
+      <p:ext uri="{BB962C8B-B14F-4D97-AF65-F5344CB8AC3E}">
+        <p14:creationId xmlns:p14="http://schemas.microsoft.com/office/powerpoint/2010/main" val="2451801601"/>
+      </p:ext>
+    </p:extLst>
+  </p:cSld>
+  <p:clrMapOvr>
+    <a:masterClrMapping/>
+  </p:clrMapOvr>
+</p:sld>
+</file>
+
+<file path=ppt/slides/slide22.xml><?xml version="1.0" encoding="utf-8"?>
+<p:sld xmlns:a="http://schemas.openxmlformats.org/drawingml/2006/main" xmlns:r="http://schemas.openxmlformats.org/officeDocument/2006/relationships" xmlns:p="http://schemas.openxmlformats.org/presentationml/2006/main">
+  <p:cSld>
+    <p:spTree>
+      <p:nvGrpSpPr>
+        <p:cNvPr id="1" name=""/>
+        <p:cNvGrpSpPr/>
+        <p:nvPr/>
+      </p:nvGrpSpPr>
+      <p:grpSpPr>
+        <a:xfrm>
+          <a:off x="0" y="0"/>
+          <a:ext cx="0" cy="0"/>
+          <a:chOff x="0" y="0"/>
+          <a:chExt cx="0" cy="0"/>
+        </a:xfrm>
+      </p:grpSpPr>
+      <p:sp>
+        <p:nvSpPr>
+          <p:cNvPr id="2" name="Titel 1">
+            <a:extLst>
+              <a:ext uri="{FF2B5EF4-FFF2-40B4-BE49-F238E27FC236}">
+                <a16:creationId xmlns:a16="http://schemas.microsoft.com/office/drawing/2014/main" id="{56CB0CFA-309A-4F67-B1F1-336D6A9851EC}"/>
+              </a:ext>
+            </a:extLst>
+          </p:cNvPr>
+          <p:cNvSpPr>
+            <a:spLocks noGrp="1"/>
+          </p:cNvSpPr>
+          <p:nvPr>
+            <p:ph type="title"/>
+          </p:nvPr>
+        </p:nvSpPr>
+        <p:spPr/>
+        <p:txBody>
+          <a:bodyPr/>
+          <a:lstStyle/>
+          <a:p>
+            <a:r>
+              <a:rPr lang="de-DE" dirty="0"/>
+              <a:t>Wort n zu sich selbst</a:t>
+            </a:r>
+          </a:p>
+        </p:txBody>
+      </p:sp>
+      <p:pic>
+        <p:nvPicPr>
+          <p:cNvPr id="4" name="Grafik 3">
+            <a:extLst>
+              <a:ext uri="{FF2B5EF4-FFF2-40B4-BE49-F238E27FC236}">
+                <a16:creationId xmlns:a16="http://schemas.microsoft.com/office/drawing/2014/main" id="{9FA2B019-4FBA-44BA-9146-708392435E0B}"/>
+              </a:ext>
+            </a:extLst>
+          </p:cNvPr>
+          <p:cNvPicPr>
+            <a:picLocks noChangeAspect="1"/>
+          </p:cNvPicPr>
+          <p:nvPr/>
+        </p:nvPicPr>
+        <p:blipFill>
+          <a:blip r:embed="rId2">
+            <a:extLst>
+              <a:ext uri="{28A0092B-C50C-407E-A947-70E740481C1C}">
+                <a14:useLocalDpi xmlns:a14="http://schemas.microsoft.com/office/drawing/2010/main" val="0"/>
+              </a:ext>
+            </a:extLst>
+          </a:blip>
+          <a:stretch>
+            <a:fillRect/>
+          </a:stretch>
+        </p:blipFill>
+        <p:spPr>
+          <a:xfrm>
+            <a:off x="3352795" y="1865415"/>
+            <a:ext cx="4306790" cy="4306790"/>
+          </a:xfrm>
+          <a:prstGeom prst="rect">
+            <a:avLst/>
+          </a:prstGeom>
+        </p:spPr>
+      </p:pic>
+    </p:spTree>
+    <p:extLst>
+      <p:ext uri="{BB962C8B-B14F-4D97-AF65-F5344CB8AC3E}">
+        <p14:creationId xmlns:p14="http://schemas.microsoft.com/office/powerpoint/2010/main" val="885078097"/>
+      </p:ext>
+    </p:extLst>
+  </p:cSld>
+  <p:clrMapOvr>
+    <a:masterClrMapping/>
+  </p:clrMapOvr>
+</p:sld>
+</file>
+
+<file path=ppt/slides/slide23.xml><?xml version="1.0" encoding="utf-8"?>
+<p:sld xmlns:a="http://schemas.openxmlformats.org/drawingml/2006/main" xmlns:r="http://schemas.openxmlformats.org/officeDocument/2006/relationships" xmlns:p="http://schemas.openxmlformats.org/presentationml/2006/main">
+  <p:cSld>
+    <p:spTree>
+      <p:nvGrpSpPr>
+        <p:cNvPr id="1" name=""/>
+        <p:cNvGrpSpPr/>
+        <p:nvPr/>
+      </p:nvGrpSpPr>
+      <p:grpSpPr>
+        <a:xfrm>
+          <a:off x="0" y="0"/>
+          <a:ext cx="0" cy="0"/>
+          <a:chOff x="0" y="0"/>
+          <a:chExt cx="0" cy="0"/>
+        </a:xfrm>
+      </p:grpSpPr>
+      <p:sp>
+        <p:nvSpPr>
+          <p:cNvPr id="2" name="Titel 1">
+            <a:extLst>
+              <a:ext uri="{FF2B5EF4-FFF2-40B4-BE49-F238E27FC236}">
+                <a16:creationId xmlns:a16="http://schemas.microsoft.com/office/drawing/2014/main" id="{55A7F616-4F36-407D-B7CA-855CC25334A7}"/>
+              </a:ext>
+            </a:extLst>
+          </p:cNvPr>
+          <p:cNvSpPr>
+            <a:spLocks noGrp="1"/>
+          </p:cNvSpPr>
+          <p:nvPr>
+            <p:ph type="title"/>
+          </p:nvPr>
+        </p:nvSpPr>
+        <p:spPr/>
+        <p:txBody>
+          <a:bodyPr/>
+          <a:lstStyle/>
+          <a:p>
+            <a:r>
+              <a:rPr lang="de-DE" dirty="0"/>
+              <a:t>Gleicher </a:t>
+            </a:r>
+            <a:r>
+              <a:rPr lang="de-DE" dirty="0" err="1"/>
+              <a:t>speaker</a:t>
+            </a:r>
+            <a:r>
+              <a:rPr lang="de-DE" dirty="0"/>
+              <a:t> sonne n zu sonne n</a:t>
+            </a:r>
+          </a:p>
+        </p:txBody>
+      </p:sp>
+      <p:pic>
+        <p:nvPicPr>
+          <p:cNvPr id="4" name="Grafik 3">
+            <a:extLst>
+              <a:ext uri="{FF2B5EF4-FFF2-40B4-BE49-F238E27FC236}">
+                <a16:creationId xmlns:a16="http://schemas.microsoft.com/office/drawing/2014/main" id="{4E9EFBDA-1D81-46CB-8D47-FF028F39C9F1}"/>
+              </a:ext>
+            </a:extLst>
+          </p:cNvPr>
+          <p:cNvPicPr>
+            <a:picLocks noChangeAspect="1"/>
+          </p:cNvPicPr>
+          <p:nvPr/>
+        </p:nvPicPr>
+        <p:blipFill>
+          <a:blip r:embed="rId2">
+            <a:extLst>
+              <a:ext uri="{28A0092B-C50C-407E-A947-70E740481C1C}">
+                <a14:useLocalDpi xmlns:a14="http://schemas.microsoft.com/office/drawing/2010/main" val="0"/>
+              </a:ext>
+            </a:extLst>
+          </a:blip>
+          <a:stretch>
+            <a:fillRect/>
+          </a:stretch>
+        </p:blipFill>
+        <p:spPr>
+          <a:xfrm>
+            <a:off x="2438392" y="1980210"/>
+            <a:ext cx="5589327" cy="4191995"/>
+          </a:xfrm>
+          <a:prstGeom prst="rect">
+            <a:avLst/>
+          </a:prstGeom>
+        </p:spPr>
+      </p:pic>
+    </p:spTree>
+    <p:extLst>
+      <p:ext uri="{BB962C8B-B14F-4D97-AF65-F5344CB8AC3E}">
+        <p14:creationId xmlns:p14="http://schemas.microsoft.com/office/powerpoint/2010/main" val="2400431951"/>
+      </p:ext>
+    </p:extLst>
+  </p:cSld>
+  <p:clrMapOvr>
+    <a:masterClrMapping/>
+  </p:clrMapOvr>
+</p:sld>
+</file>
+
+<file path=ppt/slides/slide24.xml><?xml version="1.0" encoding="utf-8"?>
+<p:sld xmlns:a="http://schemas.openxmlformats.org/drawingml/2006/main" xmlns:r="http://schemas.openxmlformats.org/officeDocument/2006/relationships" xmlns:p="http://schemas.openxmlformats.org/presentationml/2006/main">
+  <p:cSld>
+    <p:spTree>
+      <p:nvGrpSpPr>
+        <p:cNvPr id="1" name=""/>
+        <p:cNvGrpSpPr/>
+        <p:nvPr/>
+      </p:nvGrpSpPr>
+      <p:grpSpPr>
+        <a:xfrm>
+          <a:off x="0" y="0"/>
+          <a:ext cx="0" cy="0"/>
+          <a:chOff x="0" y="0"/>
+          <a:chExt cx="0" cy="0"/>
+        </a:xfrm>
+      </p:grpSpPr>
+      <p:sp>
+        <p:nvSpPr>
+          <p:cNvPr id="2" name="Titel 1">
+            <a:extLst>
+              <a:ext uri="{FF2B5EF4-FFF2-40B4-BE49-F238E27FC236}">
+                <a16:creationId xmlns:a16="http://schemas.microsoft.com/office/drawing/2014/main" id="{BBA6B176-1D0C-4A30-BC34-317D784E2C3E}"/>
+              </a:ext>
+            </a:extLst>
+          </p:cNvPr>
+          <p:cNvSpPr>
+            <a:spLocks noGrp="1"/>
+          </p:cNvSpPr>
+          <p:nvPr>
+            <p:ph type="title"/>
+          </p:nvPr>
+        </p:nvSpPr>
+        <p:spPr/>
+        <p:txBody>
+          <a:bodyPr/>
+          <a:lstStyle/>
+          <a:p>
+            <a:r>
+              <a:rPr lang="de-DE" dirty="0"/>
+              <a:t>Wort zu anderem </a:t>
+            </a:r>
+            <a:r>
+              <a:rPr lang="de-DE" dirty="0" err="1"/>
+              <a:t>wort</a:t>
+            </a:r>
+            <a:endParaRPr lang="de-DE" dirty="0"/>
+          </a:p>
+        </p:txBody>
+      </p:sp>
+      <p:pic>
+        <p:nvPicPr>
+          <p:cNvPr id="4" name="Grafik 3">
+            <a:extLst>
+              <a:ext uri="{FF2B5EF4-FFF2-40B4-BE49-F238E27FC236}">
+                <a16:creationId xmlns:a16="http://schemas.microsoft.com/office/drawing/2014/main" id="{98622907-20D5-46BF-A931-D710E279E609}"/>
+              </a:ext>
+            </a:extLst>
+          </p:cNvPr>
+          <p:cNvPicPr>
+            <a:picLocks noChangeAspect="1"/>
+          </p:cNvPicPr>
+          <p:nvPr/>
+        </p:nvPicPr>
+        <p:blipFill>
+          <a:blip r:embed="rId2">
+            <a:extLst>
+              <a:ext uri="{28A0092B-C50C-407E-A947-70E740481C1C}">
+                <a14:useLocalDpi xmlns:a14="http://schemas.microsoft.com/office/drawing/2010/main" val="0"/>
+              </a:ext>
+            </a:extLst>
+          </a:blip>
+          <a:stretch>
+            <a:fillRect/>
+          </a:stretch>
+        </p:blipFill>
+        <p:spPr>
+          <a:xfrm>
+            <a:off x="3352795" y="1888177"/>
+            <a:ext cx="4284028" cy="4284028"/>
+          </a:xfrm>
+          <a:prstGeom prst="rect">
+            <a:avLst/>
+          </a:prstGeom>
+        </p:spPr>
+      </p:pic>
+    </p:spTree>
+    <p:extLst>
+      <p:ext uri="{BB962C8B-B14F-4D97-AF65-F5344CB8AC3E}">
+        <p14:creationId xmlns:p14="http://schemas.microsoft.com/office/powerpoint/2010/main" val="246154489"/>
+      </p:ext>
+    </p:extLst>
+  </p:cSld>
+  <p:clrMapOvr>
+    <a:masterClrMapping/>
+  </p:clrMapOvr>
+</p:sld>
+</file>
+
 <file path=ppt/slides/slide3.xml><?xml version="1.0" encoding="utf-8"?>
+<p:sld xmlns:a="http://schemas.openxmlformats.org/drawingml/2006/main" xmlns:r="http://schemas.openxmlformats.org/officeDocument/2006/relationships" xmlns:p="http://schemas.openxmlformats.org/presentationml/2006/main">
+  <p:cSld>
+    <p:spTree>
+      <p:nvGrpSpPr>
+        <p:cNvPr id="1" name=""/>
+        <p:cNvGrpSpPr/>
+        <p:nvPr/>
+      </p:nvGrpSpPr>
+      <p:grpSpPr>
+        <a:xfrm>
+          <a:off x="0" y="0"/>
+          <a:ext cx="0" cy="0"/>
+          <a:chOff x="0" y="0"/>
+          <a:chExt cx="0" cy="0"/>
+        </a:xfrm>
+      </p:grpSpPr>
+      <p:sp>
+        <p:nvSpPr>
+          <p:cNvPr id="2" name="Titel 1">
+            <a:extLst>
+              <a:ext uri="{FF2B5EF4-FFF2-40B4-BE49-F238E27FC236}">
+                <a16:creationId xmlns:a16="http://schemas.microsoft.com/office/drawing/2014/main" id="{480F5B4B-F4D9-4128-8F91-6BB15AFD4446}"/>
+              </a:ext>
+            </a:extLst>
+          </p:cNvPr>
+          <p:cNvSpPr>
+            <a:spLocks noGrp="1"/>
+          </p:cNvSpPr>
+          <p:nvPr>
+            <p:ph type="title"/>
+          </p:nvPr>
+        </p:nvSpPr>
+        <p:spPr/>
+        <p:txBody>
+          <a:bodyPr/>
+          <a:lstStyle/>
+          <a:p>
+            <a:r>
+              <a:rPr lang="de-DE" dirty="0"/>
+              <a:t>Sabine</a:t>
+            </a:r>
+          </a:p>
+        </p:txBody>
+      </p:sp>
+      <p:sp>
+        <p:nvSpPr>
+          <p:cNvPr id="3" name="Inhaltsplatzhalter 2">
+            <a:extLst>
+              <a:ext uri="{FF2B5EF4-FFF2-40B4-BE49-F238E27FC236}">
+                <a16:creationId xmlns:a16="http://schemas.microsoft.com/office/drawing/2014/main" id="{F8624ACD-8E3A-4740-9FD6-0D28A3C49ECD}"/>
+              </a:ext>
+            </a:extLst>
+          </p:cNvPr>
+          <p:cNvSpPr>
+            <a:spLocks noGrp="1"/>
+          </p:cNvSpPr>
+          <p:nvPr>
+            <p:ph idx="1"/>
+          </p:nvPr>
+        </p:nvSpPr>
+        <p:spPr/>
+        <p:txBody>
+          <a:bodyPr/>
+          <a:lstStyle/>
+          <a:p>
+            <a:r>
+              <a:rPr lang="de-DE" dirty="0"/>
+              <a:t>Total:468, </a:t>
+            </a:r>
+            <a:r>
+              <a:rPr lang="de-DE" dirty="0" err="1"/>
+              <a:t>Correct</a:t>
+            </a:r>
+            <a:r>
+              <a:rPr lang="de-DE" dirty="0"/>
+              <a:t>: 270, </a:t>
+            </a:r>
+            <a:r>
+              <a:rPr lang="de-DE" dirty="0" err="1"/>
+              <a:t>False</a:t>
+            </a:r>
+            <a:r>
+              <a:rPr lang="de-DE" dirty="0"/>
+              <a:t>: 198, </a:t>
+            </a:r>
+            <a:r>
+              <a:rPr lang="de-DE" dirty="0" err="1"/>
+              <a:t>Accuracy</a:t>
+            </a:r>
+            <a:r>
+              <a:rPr lang="de-DE" dirty="0"/>
+              <a:t>: 57,69%</a:t>
+            </a:r>
+          </a:p>
+          <a:p>
+            <a:pPr marL="0" indent="0">
+              <a:buNone/>
+            </a:pPr>
+            <a:r>
+              <a:rPr lang="de-DE" dirty="0"/>
+              <a:t>	-&gt; </a:t>
+            </a:r>
+            <a:r>
+              <a:rPr lang="de-DE" dirty="0" err="1"/>
+              <a:t>everything</a:t>
+            </a:r>
+            <a:r>
+              <a:rPr lang="de-DE" dirty="0"/>
+              <a:t> </a:t>
+            </a:r>
+            <a:r>
+              <a:rPr lang="de-DE" dirty="0" err="1"/>
+              <a:t>saved</a:t>
+            </a:r>
+            <a:r>
+              <a:rPr lang="de-DE" dirty="0"/>
+              <a:t> in a </a:t>
+            </a:r>
+            <a:r>
+              <a:rPr lang="de-DE" dirty="0" err="1"/>
+              <a:t>csv</a:t>
+            </a:r>
+            <a:endParaRPr lang="de-DE" dirty="0"/>
+          </a:p>
+          <a:p>
+            <a:endParaRPr lang="de-DE" dirty="0"/>
+          </a:p>
+          <a:p>
+            <a:r>
+              <a:rPr lang="de-DE" dirty="0"/>
+              <a:t>Words </a:t>
+            </a:r>
+            <a:r>
+              <a:rPr lang="de-DE" dirty="0" err="1"/>
+              <a:t>with</a:t>
+            </a:r>
+            <a:r>
+              <a:rPr lang="de-DE" dirty="0"/>
+              <a:t> s in </a:t>
+            </a:r>
+            <a:r>
+              <a:rPr lang="de-DE" dirty="0" err="1"/>
+              <a:t>the</a:t>
+            </a:r>
+            <a:r>
+              <a:rPr lang="de-DE" dirty="0"/>
+              <a:t> end </a:t>
+            </a:r>
+            <a:r>
+              <a:rPr lang="de-DE" dirty="0" err="1"/>
+              <a:t>where</a:t>
+            </a:r>
+            <a:r>
+              <a:rPr lang="de-DE" dirty="0"/>
+              <a:t> </a:t>
+            </a:r>
+            <a:r>
+              <a:rPr lang="de-DE" dirty="0" err="1"/>
+              <a:t>hard</a:t>
+            </a:r>
+            <a:r>
+              <a:rPr lang="de-DE" dirty="0"/>
+              <a:t> (</a:t>
+            </a:r>
+            <a:r>
+              <a:rPr lang="de-DE" dirty="0" err="1"/>
+              <a:t>some</a:t>
+            </a:r>
+            <a:r>
+              <a:rPr lang="de-DE" dirty="0"/>
+              <a:t> </a:t>
+            </a:r>
+            <a:r>
+              <a:rPr lang="de-DE" dirty="0" err="1"/>
+              <a:t>kind</a:t>
+            </a:r>
+            <a:r>
+              <a:rPr lang="de-DE" dirty="0"/>
+              <a:t> </a:t>
+            </a:r>
+            <a:r>
+              <a:rPr lang="de-DE" dirty="0" err="1"/>
+              <a:t>of</a:t>
+            </a:r>
+            <a:r>
+              <a:rPr lang="de-DE" dirty="0"/>
+              <a:t> </a:t>
+            </a:r>
+            <a:r>
+              <a:rPr lang="de-DE" dirty="0" err="1"/>
+              <a:t>cutoff</a:t>
+            </a:r>
+            <a:r>
+              <a:rPr lang="de-DE" dirty="0"/>
+              <a:t>/</a:t>
+            </a:r>
+            <a:r>
+              <a:rPr lang="de-DE" dirty="0" err="1"/>
+              <a:t>ended</a:t>
+            </a:r>
+            <a:r>
+              <a:rPr lang="de-DE" dirty="0"/>
+              <a:t> </a:t>
+            </a:r>
+            <a:r>
+              <a:rPr lang="de-DE" dirty="0" err="1"/>
+              <a:t>to</a:t>
+            </a:r>
+            <a:r>
+              <a:rPr lang="de-DE" dirty="0"/>
+              <a:t> fast)</a:t>
+            </a:r>
+          </a:p>
+          <a:p>
+            <a:r>
+              <a:rPr lang="de-DE" dirty="0"/>
+              <a:t>Score </a:t>
+            </a:r>
+            <a:r>
+              <a:rPr lang="de-DE" dirty="0" err="1"/>
+              <a:t>excluding</a:t>
+            </a:r>
+            <a:r>
+              <a:rPr lang="de-DE" dirty="0"/>
+              <a:t> ‘s‘,‘z‘-</a:t>
+            </a:r>
+            <a:r>
+              <a:rPr lang="de-DE" dirty="0" err="1"/>
+              <a:t>ending-words</a:t>
+            </a:r>
+            <a:r>
+              <a:rPr lang="de-DE" dirty="0"/>
+              <a:t>: 57,31%</a:t>
+            </a:r>
+          </a:p>
+        </p:txBody>
+      </p:sp>
+    </p:spTree>
+    <p:extLst>
+      <p:ext uri="{BB962C8B-B14F-4D97-AF65-F5344CB8AC3E}">
+        <p14:creationId xmlns:p14="http://schemas.microsoft.com/office/powerpoint/2010/main" val="3927973085"/>
+      </p:ext>
+    </p:extLst>
+  </p:cSld>
+  <p:clrMapOvr>
+    <a:masterClrMapping/>
+  </p:clrMapOvr>
+</p:sld>
+</file>
+
+<file path=ppt/slides/slide4.xml><?xml version="1.0" encoding="utf-8"?>
 <p:sld xmlns:a="http://schemas.openxmlformats.org/drawingml/2006/main" xmlns:r="http://schemas.openxmlformats.org/officeDocument/2006/relationships" xmlns:p="http://schemas.openxmlformats.org/presentationml/2006/main">
   <p:cSld>
     <p:spTree>
@@ -12038,7 +13686,7 @@
 </p:sld>
 </file>
 
-<file path=ppt/slides/slide4.xml><?xml version="1.0" encoding="utf-8"?>
+<file path=ppt/slides/slide5.xml><?xml version="1.0" encoding="utf-8"?>
 <p:sld xmlns:a="http://schemas.openxmlformats.org/drawingml/2006/main" xmlns:r="http://schemas.openxmlformats.org/officeDocument/2006/relationships" xmlns:p="http://schemas.openxmlformats.org/presentationml/2006/main">
   <p:cSld>
     <p:spTree>
@@ -12275,7 +13923,7 @@
 </p:sld>
 </file>
 
-<file path=ppt/slides/slide5.xml><?xml version="1.0" encoding="utf-8"?>
+<file path=ppt/slides/slide6.xml><?xml version="1.0" encoding="utf-8"?>
 <p:sld xmlns:a="http://schemas.openxmlformats.org/drawingml/2006/main" xmlns:r="http://schemas.openxmlformats.org/officeDocument/2006/relationships" xmlns:p="http://schemas.openxmlformats.org/presentationml/2006/main">
   <p:cSld>
     <p:spTree>
@@ -12383,7 +14031,7 @@
 </p:sld>
 </file>
 
-<file path=ppt/slides/slide6.xml><?xml version="1.0" encoding="utf-8"?>
+<file path=ppt/slides/slide7.xml><?xml version="1.0" encoding="utf-8"?>
 <p:sld xmlns:a="http://schemas.openxmlformats.org/drawingml/2006/main" xmlns:r="http://schemas.openxmlformats.org/officeDocument/2006/relationships" xmlns:p="http://schemas.openxmlformats.org/presentationml/2006/main">
   <p:cSld>
     <p:spTree>
@@ -12561,7 +14209,7 @@
 </p:sld>
 </file>
 
-<file path=ppt/slides/slide7.xml><?xml version="1.0" encoding="utf-8"?>
+<file path=ppt/slides/slide8.xml><?xml version="1.0" encoding="utf-8"?>
 <p:sld xmlns:a="http://schemas.openxmlformats.org/drawingml/2006/main" xmlns:r="http://schemas.openxmlformats.org/officeDocument/2006/relationships" xmlns:p="http://schemas.openxmlformats.org/presentationml/2006/main">
   <p:cSld>
     <p:spTree>
@@ -12622,14 +14270,14 @@
           <p:nvPr/>
         </p:nvPicPr>
         <p:blipFill>
-          <a:blip r:embed="rId2"/>
+          <a:blip r:embed="rId3"/>
           <a:stretch>
             <a:fillRect/>
           </a:stretch>
         </p:blipFill>
         <p:spPr>
           <a:xfrm>
-            <a:off x="1966582" y="1690688"/>
+            <a:off x="1966582" y="1419363"/>
             <a:ext cx="7434593" cy="5073512"/>
           </a:xfrm>
           <a:prstGeom prst="rect">
@@ -12698,7 +14346,7 @@
 </p:sld>
 </file>
 
-<file path=ppt/slides/slide8.xml><?xml version="1.0" encoding="utf-8"?>
+<file path=ppt/slides/slide9.xml><?xml version="1.0" encoding="utf-8"?>
 <p:sld xmlns:a="http://schemas.openxmlformats.org/drawingml/2006/main" xmlns:r="http://schemas.openxmlformats.org/officeDocument/2006/relationships" xmlns:p="http://schemas.openxmlformats.org/presentationml/2006/main">
   <p:cSld>
     <p:spTree>
@@ -12828,405 +14476,6 @@
     <p:extLst>
       <p:ext uri="{BB962C8B-B14F-4D97-AF65-F5344CB8AC3E}">
         <p14:creationId xmlns:p14="http://schemas.microsoft.com/office/powerpoint/2010/main" val="3325533800"/>
-      </p:ext>
-    </p:extLst>
-  </p:cSld>
-  <p:clrMapOvr>
-    <a:masterClrMapping/>
-  </p:clrMapOvr>
-</p:sld>
-</file>
-
-<file path=ppt/slides/slide9.xml><?xml version="1.0" encoding="utf-8"?>
-<p:sld xmlns:a="http://schemas.openxmlformats.org/drawingml/2006/main" xmlns:r="http://schemas.openxmlformats.org/officeDocument/2006/relationships" xmlns:p="http://schemas.openxmlformats.org/presentationml/2006/main">
-  <p:cSld>
-    <p:bg>
-      <p:bgPr>
-        <a:solidFill>
-          <a:schemeClr val="bg1"/>
-        </a:solidFill>
-        <a:effectLst/>
-      </p:bgPr>
-    </p:bg>
-    <p:spTree>
-      <p:nvGrpSpPr>
-        <p:cNvPr id="1" name=""/>
-        <p:cNvGrpSpPr/>
-        <p:nvPr/>
-      </p:nvGrpSpPr>
-      <p:grpSpPr>
-        <a:xfrm>
-          <a:off x="0" y="0"/>
-          <a:ext cx="0" cy="0"/>
-          <a:chOff x="0" y="0"/>
-          <a:chExt cx="0" cy="0"/>
-        </a:xfrm>
-      </p:grpSpPr>
-      <p:sp useBgFill="1">
-        <p:nvSpPr>
-          <p:cNvPr id="12" name="Rectangle 11">
-            <a:extLst>
-              <a:ext uri="{FF2B5EF4-FFF2-40B4-BE49-F238E27FC236}">
-                <a16:creationId xmlns:a16="http://schemas.microsoft.com/office/drawing/2014/main" id="{8761DDFE-071F-4200-B0AA-394476C2D2D6}"/>
-              </a:ext>
-              <a:ext uri="{C183D7F6-B498-43B3-948B-1728B52AA6E4}">
-                <adec:decorative xmlns:adec="http://schemas.microsoft.com/office/drawing/2017/decorative" val="1"/>
-              </a:ext>
-            </a:extLst>
-          </p:cNvPr>
-          <p:cNvSpPr>
-            <a:spLocks noGrp="1" noRot="1" noChangeAspect="1" noMove="1" noResize="1" noEditPoints="1" noAdjustHandles="1" noChangeArrowheads="1" noChangeShapeType="1" noTextEdit="1"/>
-          </p:cNvSpPr>
-          <p:nvPr>
-            <p:extLst>
-              <p:ext uri="{386F3935-93C4-4BCD-93E2-E3B085C9AB24}">
-                <p16:designElem xmlns:p16="http://schemas.microsoft.com/office/powerpoint/2015/main" val="1"/>
-              </p:ext>
-            </p:extLst>
-          </p:nvPr>
-        </p:nvSpPr>
-        <p:spPr>
-          <a:xfrm>
-            <a:off x="-1" y="0"/>
-            <a:ext cx="12188952" cy="6858000"/>
-          </a:xfrm>
-          <a:prstGeom prst="rect">
-            <a:avLst/>
-          </a:prstGeom>
-          <a:ln>
-            <a:noFill/>
-          </a:ln>
-        </p:spPr>
-        <p:style>
-          <a:lnRef idx="2">
-            <a:schemeClr val="accent1">
-              <a:shade val="50000"/>
-            </a:schemeClr>
-          </a:lnRef>
-          <a:fillRef idx="1">
-            <a:schemeClr val="accent1"/>
-          </a:fillRef>
-          <a:effectRef idx="0">
-            <a:schemeClr val="accent1"/>
-          </a:effectRef>
-          <a:fontRef idx="minor">
-            <a:schemeClr val="lt1"/>
-          </a:fontRef>
-        </p:style>
-        <p:txBody>
-          <a:bodyPr rtlCol="0" anchor="ctr"/>
-          <a:lstStyle/>
-          <a:p>
-            <a:pPr algn="ctr"/>
-            <a:endParaRPr lang="en-US"/>
-          </a:p>
-        </p:txBody>
-      </p:sp>
-      <p:sp>
-        <p:nvSpPr>
-          <p:cNvPr id="2" name="Titel 1">
-            <a:extLst>
-              <a:ext uri="{FF2B5EF4-FFF2-40B4-BE49-F238E27FC236}">
-                <a16:creationId xmlns:a16="http://schemas.microsoft.com/office/drawing/2014/main" id="{0B706325-1418-CE46-DD48-1882FD93864F}"/>
-              </a:ext>
-            </a:extLst>
-          </p:cNvPr>
-          <p:cNvSpPr>
-            <a:spLocks noGrp="1"/>
-          </p:cNvSpPr>
-          <p:nvPr>
-            <p:ph type="title"/>
-          </p:nvPr>
-        </p:nvSpPr>
-        <p:spPr>
-          <a:xfrm>
-            <a:off x="838198" y="547815"/>
-            <a:ext cx="5167185" cy="1680519"/>
-          </a:xfrm>
-        </p:spPr>
-        <p:txBody>
-          <a:bodyPr vert="horz" lIns="91440" tIns="45720" rIns="91440" bIns="45720" rtlCol="0" anchor="ctr">
-            <a:normAutofit/>
-          </a:bodyPr>
-          <a:lstStyle/>
-          <a:p>
-            <a:r>
-              <a:rPr lang="en-US" sz="4000" dirty="0"/>
-              <a:t>Paired T-test</a:t>
-            </a:r>
-          </a:p>
-        </p:txBody>
-      </p:sp>
-      <p:sp>
-        <p:nvSpPr>
-          <p:cNvPr id="3" name="Inhaltsplatzhalter 2">
-            <a:extLst>
-              <a:ext uri="{FF2B5EF4-FFF2-40B4-BE49-F238E27FC236}">
-                <a16:creationId xmlns:a16="http://schemas.microsoft.com/office/drawing/2014/main" id="{426C4744-E9A4-FD8A-4940-53A45FA55CCC}"/>
-              </a:ext>
-            </a:extLst>
-          </p:cNvPr>
-          <p:cNvSpPr txBox="1">
-            <a:spLocks/>
-          </p:cNvSpPr>
-          <p:nvPr/>
-        </p:nvSpPr>
-        <p:spPr>
-          <a:xfrm>
-            <a:off x="6186619" y="547815"/>
-            <a:ext cx="5178960" cy="1680519"/>
-          </a:xfrm>
-          <a:prstGeom prst="rect">
-            <a:avLst/>
-          </a:prstGeom>
-        </p:spPr>
-        <p:txBody>
-          <a:bodyPr vert="horz" lIns="91440" tIns="45720" rIns="91440" bIns="45720" rtlCol="0" anchor="ctr">
-            <a:normAutofit/>
-          </a:bodyPr>
-          <a:lstStyle>
-            <a:lvl1pPr marL="228600" indent="-228600" algn="l" defTabSz="914400" rtl="0" eaLnBrk="1" latinLnBrk="0" hangingPunct="1">
-              <a:lnSpc>
-                <a:spcPct val="90000"/>
-              </a:lnSpc>
-              <a:spcBef>
-                <a:spcPts val="1000"/>
-              </a:spcBef>
-              <a:buFont typeface="Arial" panose="020B0604020202020204" pitchFamily="34" charset="0"/>
-              <a:buChar char="•"/>
-              <a:defRPr sz="2800" kern="1200">
-                <a:solidFill>
-                  <a:schemeClr val="tx1"/>
-                </a:solidFill>
-                <a:latin typeface="+mn-lt"/>
-                <a:ea typeface="+mn-ea"/>
-                <a:cs typeface="+mn-cs"/>
-              </a:defRPr>
-            </a:lvl1pPr>
-            <a:lvl2pPr marL="685800" indent="-228600" algn="l" defTabSz="914400" rtl="0" eaLnBrk="1" latinLnBrk="0" hangingPunct="1">
-              <a:lnSpc>
-                <a:spcPct val="90000"/>
-              </a:lnSpc>
-              <a:spcBef>
-                <a:spcPts val="500"/>
-              </a:spcBef>
-              <a:buFont typeface="Arial" panose="020B0604020202020204" pitchFamily="34" charset="0"/>
-              <a:buChar char="•"/>
-              <a:defRPr sz="2400" kern="1200">
-                <a:solidFill>
-                  <a:schemeClr val="tx1"/>
-                </a:solidFill>
-                <a:latin typeface="+mn-lt"/>
-                <a:ea typeface="+mn-ea"/>
-                <a:cs typeface="+mn-cs"/>
-              </a:defRPr>
-            </a:lvl2pPr>
-            <a:lvl3pPr marL="1143000" indent="-228600" algn="l" defTabSz="914400" rtl="0" eaLnBrk="1" latinLnBrk="0" hangingPunct="1">
-              <a:lnSpc>
-                <a:spcPct val="90000"/>
-              </a:lnSpc>
-              <a:spcBef>
-                <a:spcPts val="500"/>
-              </a:spcBef>
-              <a:buFont typeface="Arial" panose="020B0604020202020204" pitchFamily="34" charset="0"/>
-              <a:buChar char="•"/>
-              <a:defRPr sz="2000" kern="1200">
-                <a:solidFill>
-                  <a:schemeClr val="tx1"/>
-                </a:solidFill>
-                <a:latin typeface="+mn-lt"/>
-                <a:ea typeface="+mn-ea"/>
-                <a:cs typeface="+mn-cs"/>
-              </a:defRPr>
-            </a:lvl3pPr>
-            <a:lvl4pPr marL="1600200" indent="-228600" algn="l" defTabSz="914400" rtl="0" eaLnBrk="1" latinLnBrk="0" hangingPunct="1">
-              <a:lnSpc>
-                <a:spcPct val="90000"/>
-              </a:lnSpc>
-              <a:spcBef>
-                <a:spcPts val="500"/>
-              </a:spcBef>
-              <a:buFont typeface="Arial" panose="020B0604020202020204" pitchFamily="34" charset="0"/>
-              <a:buChar char="•"/>
-              <a:defRPr sz="1800" kern="1200">
-                <a:solidFill>
-                  <a:schemeClr val="tx1"/>
-                </a:solidFill>
-                <a:latin typeface="+mn-lt"/>
-                <a:ea typeface="+mn-ea"/>
-                <a:cs typeface="+mn-cs"/>
-              </a:defRPr>
-            </a:lvl4pPr>
-            <a:lvl5pPr marL="2057400" indent="-228600" algn="l" defTabSz="914400" rtl="0" eaLnBrk="1" latinLnBrk="0" hangingPunct="1">
-              <a:lnSpc>
-                <a:spcPct val="90000"/>
-              </a:lnSpc>
-              <a:spcBef>
-                <a:spcPts val="500"/>
-              </a:spcBef>
-              <a:buFont typeface="Arial" panose="020B0604020202020204" pitchFamily="34" charset="0"/>
-              <a:buChar char="•"/>
-              <a:defRPr sz="1800" kern="1200">
-                <a:solidFill>
-                  <a:schemeClr val="tx1"/>
-                </a:solidFill>
-                <a:latin typeface="+mn-lt"/>
-                <a:ea typeface="+mn-ea"/>
-                <a:cs typeface="+mn-cs"/>
-              </a:defRPr>
-            </a:lvl5pPr>
-            <a:lvl6pPr marL="2514600" indent="-228600" algn="l" defTabSz="914400" rtl="0" eaLnBrk="1" latinLnBrk="0" hangingPunct="1">
-              <a:lnSpc>
-                <a:spcPct val="90000"/>
-              </a:lnSpc>
-              <a:spcBef>
-                <a:spcPts val="500"/>
-              </a:spcBef>
-              <a:buFont typeface="Arial" panose="020B0604020202020204" pitchFamily="34" charset="0"/>
-              <a:buChar char="•"/>
-              <a:defRPr sz="1800" kern="1200">
-                <a:solidFill>
-                  <a:schemeClr val="tx1"/>
-                </a:solidFill>
-                <a:latin typeface="+mn-lt"/>
-                <a:ea typeface="+mn-ea"/>
-                <a:cs typeface="+mn-cs"/>
-              </a:defRPr>
-            </a:lvl6pPr>
-            <a:lvl7pPr marL="2971800" indent="-228600" algn="l" defTabSz="914400" rtl="0" eaLnBrk="1" latinLnBrk="0" hangingPunct="1">
-              <a:lnSpc>
-                <a:spcPct val="90000"/>
-              </a:lnSpc>
-              <a:spcBef>
-                <a:spcPts val="500"/>
-              </a:spcBef>
-              <a:buFont typeface="Arial" panose="020B0604020202020204" pitchFamily="34" charset="0"/>
-              <a:buChar char="•"/>
-              <a:defRPr sz="1800" kern="1200">
-                <a:solidFill>
-                  <a:schemeClr val="tx1"/>
-                </a:solidFill>
-                <a:latin typeface="+mn-lt"/>
-                <a:ea typeface="+mn-ea"/>
-                <a:cs typeface="+mn-cs"/>
-              </a:defRPr>
-            </a:lvl7pPr>
-            <a:lvl8pPr marL="3429000" indent="-228600" algn="l" defTabSz="914400" rtl="0" eaLnBrk="1" latinLnBrk="0" hangingPunct="1">
-              <a:lnSpc>
-                <a:spcPct val="90000"/>
-              </a:lnSpc>
-              <a:spcBef>
-                <a:spcPts val="500"/>
-              </a:spcBef>
-              <a:buFont typeface="Arial" panose="020B0604020202020204" pitchFamily="34" charset="0"/>
-              <a:buChar char="•"/>
-              <a:defRPr sz="1800" kern="1200">
-                <a:solidFill>
-                  <a:schemeClr val="tx1"/>
-                </a:solidFill>
-                <a:latin typeface="+mn-lt"/>
-                <a:ea typeface="+mn-ea"/>
-                <a:cs typeface="+mn-cs"/>
-              </a:defRPr>
-            </a:lvl8pPr>
-            <a:lvl9pPr marL="3886200" indent="-228600" algn="l" defTabSz="914400" rtl="0" eaLnBrk="1" latinLnBrk="0" hangingPunct="1">
-              <a:lnSpc>
-                <a:spcPct val="90000"/>
-              </a:lnSpc>
-              <a:spcBef>
-                <a:spcPts val="500"/>
-              </a:spcBef>
-              <a:buFont typeface="Arial" panose="020B0604020202020204" pitchFamily="34" charset="0"/>
-              <a:buChar char="•"/>
-              <a:defRPr sz="1800" kern="1200">
-                <a:solidFill>
-                  <a:schemeClr val="tx1"/>
-                </a:solidFill>
-                <a:latin typeface="+mn-lt"/>
-                <a:ea typeface="+mn-ea"/>
-                <a:cs typeface="+mn-cs"/>
-              </a:defRPr>
-            </a:lvl9pPr>
-          </a:lstStyle>
-          <a:p>
-            <a:r>
-              <a:rPr lang="en-US" sz="2000" dirty="0" err="1"/>
-              <a:t>pitch_range</a:t>
-            </a:r>
-            <a:r>
-              <a:rPr lang="en-US" sz="2000" dirty="0"/>
-              <a:t>=[60, 1000], </a:t>
-            </a:r>
-          </a:p>
-          <a:p>
-            <a:endParaRPr lang="en-US" sz="2000" dirty="0"/>
-          </a:p>
-        </p:txBody>
-      </p:sp>
-      <p:pic>
-        <p:nvPicPr>
-          <p:cNvPr id="7" name="Grafik 6">
-            <a:extLst>
-              <a:ext uri="{FF2B5EF4-FFF2-40B4-BE49-F238E27FC236}">
-                <a16:creationId xmlns:a16="http://schemas.microsoft.com/office/drawing/2014/main" id="{A145A96D-5D9B-724C-686B-D0CCBCCDD5FE}"/>
-              </a:ext>
-            </a:extLst>
-          </p:cNvPr>
-          <p:cNvPicPr>
-            <a:picLocks noChangeAspect="1"/>
-          </p:cNvPicPr>
-          <p:nvPr/>
-        </p:nvPicPr>
-        <p:blipFill>
-          <a:blip r:embed="rId2"/>
-          <a:stretch>
-            <a:fillRect/>
-          </a:stretch>
-        </p:blipFill>
-        <p:spPr>
-          <a:xfrm>
-            <a:off x="931088" y="2421924"/>
-            <a:ext cx="4981404" cy="3711146"/>
-          </a:xfrm>
-          <a:prstGeom prst="rect">
-            <a:avLst/>
-          </a:prstGeom>
-        </p:spPr>
-      </p:pic>
-      <p:pic>
-        <p:nvPicPr>
-          <p:cNvPr id="5" name="Grafik 4">
-            <a:extLst>
-              <a:ext uri="{FF2B5EF4-FFF2-40B4-BE49-F238E27FC236}">
-                <a16:creationId xmlns:a16="http://schemas.microsoft.com/office/drawing/2014/main" id="{2D33B34D-F902-8620-53B8-4A84EC00C2BB}"/>
-              </a:ext>
-            </a:extLst>
-          </p:cNvPr>
-          <p:cNvPicPr>
-            <a:picLocks noChangeAspect="1"/>
-          </p:cNvPicPr>
-          <p:nvPr/>
-        </p:nvPicPr>
-        <p:blipFill>
-          <a:blip r:embed="rId3"/>
-          <a:stretch>
-            <a:fillRect/>
-          </a:stretch>
-        </p:blipFill>
-        <p:spPr>
-          <a:xfrm>
-            <a:off x="6213719" y="2421924"/>
-            <a:ext cx="5136534" cy="3711146"/>
-          </a:xfrm>
-          <a:prstGeom prst="rect">
-            <a:avLst/>
-          </a:prstGeom>
-        </p:spPr>
-      </p:pic>
-    </p:spTree>
-    <p:extLst>
-      <p:ext uri="{BB962C8B-B14F-4D97-AF65-F5344CB8AC3E}">
-        <p14:creationId xmlns:p14="http://schemas.microsoft.com/office/powerpoint/2010/main" val="1754625087"/>
       </p:ext>
     </p:extLst>
   </p:cSld>

</xml_diff>

<commit_message>
made a script to train the logistic regressino algo on the AuC
</commit_message>
<xml_diff>
--- a/Interim report 2.pptx
+++ b/Interim report 2.pptx
@@ -5,7 +5,7 @@
     <p:sldMasterId id="2147483648" r:id="rId1"/>
   </p:sldMasterIdLst>
   <p:notesMasterIdLst>
-    <p:notesMasterId r:id="rId26"/>
+    <p:notesMasterId r:id="rId34"/>
   </p:notesMasterIdLst>
   <p:sldIdLst>
     <p:sldId id="256" r:id="rId2"/>
@@ -28,10 +28,18 @@
     <p:sldId id="273" r:id="rId19"/>
     <p:sldId id="274" r:id="rId20"/>
     <p:sldId id="275" r:id="rId21"/>
-    <p:sldId id="278" r:id="rId22"/>
-    <p:sldId id="281" r:id="rId23"/>
+    <p:sldId id="281" r:id="rId22"/>
+    <p:sldId id="278" r:id="rId23"/>
     <p:sldId id="280" r:id="rId24"/>
     <p:sldId id="279" r:id="rId25"/>
+    <p:sldId id="288" r:id="rId26"/>
+    <p:sldId id="286" r:id="rId27"/>
+    <p:sldId id="282" r:id="rId28"/>
+    <p:sldId id="284" r:id="rId29"/>
+    <p:sldId id="283" r:id="rId30"/>
+    <p:sldId id="287" r:id="rId31"/>
+    <p:sldId id="290" r:id="rId32"/>
+    <p:sldId id="289" r:id="rId33"/>
   </p:sldIdLst>
   <p:sldSz cx="12192000" cy="6858000"/>
   <p:notesSz cx="6858000" cy="9144000"/>
@@ -141,7 +149,7 @@
 <file path=ppt/revisionInfo.xml><?xml version="1.0" encoding="utf-8"?>
 <p1510:revInfo xmlns:a="http://schemas.openxmlformats.org/drawingml/2006/main" xmlns:r="http://schemas.openxmlformats.org/officeDocument/2006/relationships" xmlns:p1510="http://schemas.microsoft.com/office/powerpoint/2015/10/main">
   <p1510:revLst>
-    <p1510:client id="{0CFA2A2E-46D0-42F7-A6D8-B16498946566}" v="13" dt="2025-01-16T16:16:33.186"/>
+    <p1510:client id="{0CFA2A2E-46D0-42F7-A6D8-B16498946566}" v="25" dt="2025-01-20T09:43:48.774"/>
   </p1510:revLst>
 </p1510:revInfo>
 </file>
@@ -151,7 +159,7 @@
   <pc:docChgLst>
     <pc:chgData name="Florian Gritsch" userId="6461bc0e-c9be-4bd0-a028-abdbd39772c1" providerId="ADAL" clId="{0CFA2A2E-46D0-42F7-A6D8-B16498946566}"/>
     <pc:docChg chg="undo custSel addSld delSld modSld sldOrd">
-      <pc:chgData name="Florian Gritsch" userId="6461bc0e-c9be-4bd0-a028-abdbd39772c1" providerId="ADAL" clId="{0CFA2A2E-46D0-42F7-A6D8-B16498946566}" dt="2025-01-16T16:26:53.981" v="2498" actId="20577"/>
+      <pc:chgData name="Florian Gritsch" userId="6461bc0e-c9be-4bd0-a028-abdbd39772c1" providerId="ADAL" clId="{0CFA2A2E-46D0-42F7-A6D8-B16498946566}" dt="2025-01-20T13:14:33.988" v="2954" actId="20577"/>
       <pc:docMkLst>
         <pc:docMk/>
       </pc:docMkLst>
@@ -200,14 +208,6 @@
             <ac:picMk id="4" creationId="{8D077684-B06D-58CF-DB8E-5DABCBED8E80}"/>
           </ac:picMkLst>
         </pc:picChg>
-        <pc:picChg chg="add del mod">
-          <ac:chgData name="Florian Gritsch" userId="6461bc0e-c9be-4bd0-a028-abdbd39772c1" providerId="ADAL" clId="{0CFA2A2E-46D0-42F7-A6D8-B16498946566}" dt="2025-01-16T09:19:42.770" v="159" actId="478"/>
-          <ac:picMkLst>
-            <pc:docMk/>
-            <pc:sldMk cId="476522378" sldId="257"/>
-            <ac:picMk id="6" creationId="{015A2603-615C-A968-F6B7-3630A3104E99}"/>
-          </ac:picMkLst>
-        </pc:picChg>
         <pc:picChg chg="add mod">
           <ac:chgData name="Florian Gritsch" userId="6461bc0e-c9be-4bd0-a028-abdbd39772c1" providerId="ADAL" clId="{0CFA2A2E-46D0-42F7-A6D8-B16498946566}" dt="2025-01-16T09:19:49.914" v="162" actId="1076"/>
           <ac:picMkLst>
@@ -239,14 +239,6 @@
             <ac:spMk id="3" creationId="{28D978D2-C776-AE7D-445F-3291AEEBC9AA}"/>
           </ac:spMkLst>
         </pc:spChg>
-        <pc:spChg chg="del">
-          <ac:chgData name="Florian Gritsch" userId="6461bc0e-c9be-4bd0-a028-abdbd39772c1" providerId="ADAL" clId="{0CFA2A2E-46D0-42F7-A6D8-B16498946566}" dt="2025-01-16T09:11:13.851" v="32"/>
-          <ac:spMkLst>
-            <pc:docMk/>
-            <pc:sldMk cId="978471892" sldId="258"/>
-            <ac:spMk id="3" creationId="{34076AFA-6B8C-CA5D-276F-AC2B3674D10C}"/>
-          </ac:spMkLst>
-        </pc:spChg>
         <pc:graphicFrameChg chg="add mod">
           <ac:chgData name="Florian Gritsch" userId="6461bc0e-c9be-4bd0-a028-abdbd39772c1" providerId="ADAL" clId="{0CFA2A2E-46D0-42F7-A6D8-B16498946566}" dt="2025-01-16T16:11:02.449" v="2346"/>
           <ac:graphicFrameMkLst>
@@ -268,14 +260,6 @@
             <pc:docMk/>
             <pc:sldMk cId="3039404096" sldId="259"/>
             <ac:spMk id="2" creationId="{7C5CC6A6-436D-41F6-7260-18829BA6DB3F}"/>
-          </ac:spMkLst>
-        </pc:spChg>
-        <pc:spChg chg="del">
-          <ac:chgData name="Florian Gritsch" userId="6461bc0e-c9be-4bd0-a028-abdbd39772c1" providerId="ADAL" clId="{0CFA2A2E-46D0-42F7-A6D8-B16498946566}" dt="2025-01-16T10:04:29.475" v="166" actId="22"/>
-          <ac:spMkLst>
-            <pc:docMk/>
-            <pc:sldMk cId="3039404096" sldId="259"/>
-            <ac:spMk id="3" creationId="{CA1973D3-4514-4F6F-59BF-6E53FDC70D69}"/>
           </ac:spMkLst>
         </pc:spChg>
         <pc:picChg chg="add mod ord">
@@ -316,28 +300,12 @@
           <pc:docMk/>
           <pc:sldMk cId="3325533800" sldId="261"/>
         </pc:sldMkLst>
-        <pc:spChg chg="del mod">
-          <ac:chgData name="Florian Gritsch" userId="6461bc0e-c9be-4bd0-a028-abdbd39772c1" providerId="ADAL" clId="{0CFA2A2E-46D0-42F7-A6D8-B16498946566}" dt="2025-01-16T13:33:12.630" v="1150" actId="478"/>
-          <ac:spMkLst>
-            <pc:docMk/>
-            <pc:sldMk cId="3325533800" sldId="261"/>
-            <ac:spMk id="2" creationId="{E558FEED-8927-49C3-1702-98462F2E785F}"/>
-          </ac:spMkLst>
-        </pc:spChg>
         <pc:spChg chg="mod">
           <ac:chgData name="Florian Gritsch" userId="6461bc0e-c9be-4bd0-a028-abdbd39772c1" providerId="ADAL" clId="{0CFA2A2E-46D0-42F7-A6D8-B16498946566}" dt="2025-01-16T16:16:25.002" v="2372" actId="5793"/>
           <ac:spMkLst>
             <pc:docMk/>
             <pc:sldMk cId="3325533800" sldId="261"/>
             <ac:spMk id="3" creationId="{9CE47444-DA71-ED9C-E7B1-7F393F052210}"/>
-          </ac:spMkLst>
-        </pc:spChg>
-        <pc:spChg chg="add del mod">
-          <ac:chgData name="Florian Gritsch" userId="6461bc0e-c9be-4bd0-a028-abdbd39772c1" providerId="ADAL" clId="{0CFA2A2E-46D0-42F7-A6D8-B16498946566}" dt="2025-01-16T13:33:13.996" v="1151" actId="478"/>
-          <ac:spMkLst>
-            <pc:docMk/>
-            <pc:sldMk cId="3325533800" sldId="261"/>
-            <ac:spMk id="9" creationId="{8F4586FA-5262-96E8-3FE7-EC5F71D64A3E}"/>
           </ac:spMkLst>
         </pc:spChg>
         <pc:picChg chg="add mod">
@@ -386,28 +354,12 @@
           <pc:docMk/>
           <pc:sldMk cId="475159716" sldId="263"/>
         </pc:sldMkLst>
-        <pc:spChg chg="del mod">
-          <ac:chgData name="Florian Gritsch" userId="6461bc0e-c9be-4bd0-a028-abdbd39772c1" providerId="ADAL" clId="{0CFA2A2E-46D0-42F7-A6D8-B16498946566}" dt="2025-01-16T13:25:53.569" v="1041" actId="478"/>
-          <ac:spMkLst>
-            <pc:docMk/>
-            <pc:sldMk cId="475159716" sldId="263"/>
-            <ac:spMk id="2" creationId="{3C12658D-C639-0553-B7F2-ACBBBEC7C40B}"/>
-          </ac:spMkLst>
-        </pc:spChg>
         <pc:spChg chg="mod">
           <ac:chgData name="Florian Gritsch" userId="6461bc0e-c9be-4bd0-a028-abdbd39772c1" providerId="ADAL" clId="{0CFA2A2E-46D0-42F7-A6D8-B16498946566}" dt="2025-01-16T16:16:48.756" v="2377" actId="20577"/>
           <ac:spMkLst>
             <pc:docMk/>
             <pc:sldMk cId="475159716" sldId="263"/>
             <ac:spMk id="3" creationId="{65B49D78-A9A4-F7D2-9E68-44EA4F9100AF}"/>
-          </ac:spMkLst>
-        </pc:spChg>
-        <pc:spChg chg="add del mod">
-          <ac:chgData name="Florian Gritsch" userId="6461bc0e-c9be-4bd0-a028-abdbd39772c1" providerId="ADAL" clId="{0CFA2A2E-46D0-42F7-A6D8-B16498946566}" dt="2025-01-16T13:25:55.912" v="1042" actId="478"/>
-          <ac:spMkLst>
-            <pc:docMk/>
-            <pc:sldMk cId="475159716" sldId="263"/>
-            <ac:spMk id="5" creationId="{4D46DB5E-956F-D565-28A7-887B1AE8A0CD}"/>
           </ac:spMkLst>
         </pc:spChg>
         <pc:picChg chg="add mod">
@@ -440,14 +392,6 @@
           <pc:docMk/>
           <pc:sldMk cId="3116470725" sldId="264"/>
         </pc:sldMkLst>
-        <pc:picChg chg="add">
-          <ac:chgData name="Florian Gritsch" userId="6461bc0e-c9be-4bd0-a028-abdbd39772c1" providerId="ADAL" clId="{0CFA2A2E-46D0-42F7-A6D8-B16498946566}" dt="2025-01-16T13:30:03.586" v="1055" actId="22"/>
-          <ac:picMkLst>
-            <pc:docMk/>
-            <pc:sldMk cId="3116470725" sldId="264"/>
-            <ac:picMk id="3" creationId="{C6942737-FE12-5A0E-462C-B1D4A0997AA9}"/>
-          </ac:picMkLst>
-        </pc:picChg>
       </pc:sldChg>
       <pc:sldChg chg="addSp modSp new mod">
         <pc:chgData name="Florian Gritsch" userId="6461bc0e-c9be-4bd0-a028-abdbd39772c1" providerId="ADAL" clId="{0CFA2A2E-46D0-42F7-A6D8-B16498946566}" dt="2025-01-16T16:16:35.234" v="2375" actId="14100"/>
@@ -548,14 +492,6 @@
             <ac:spMk id="3" creationId="{068B1CCF-02E6-4D45-739A-966F41C9D9D4}"/>
           </ac:spMkLst>
         </pc:spChg>
-        <pc:spChg chg="del">
-          <ac:chgData name="Florian Gritsch" userId="6461bc0e-c9be-4bd0-a028-abdbd39772c1" providerId="ADAL" clId="{0CFA2A2E-46D0-42F7-A6D8-B16498946566}" dt="2025-01-16T13:35:46.899" v="1194"/>
-          <ac:spMkLst>
-            <pc:docMk/>
-            <pc:sldMk cId="275728200" sldId="267"/>
-            <ac:spMk id="12" creationId="{475CD847-7FB9-353E-8B05-11B30FE2C1FF}"/>
-          </ac:spMkLst>
-        </pc:spChg>
         <pc:spChg chg="add">
           <ac:chgData name="Florian Gritsch" userId="6461bc0e-c9be-4bd0-a028-abdbd39772c1" providerId="ADAL" clId="{0CFA2A2E-46D0-42F7-A6D8-B16498946566}" dt="2025-01-16T13:36:54.627" v="1201" actId="26606"/>
           <ac:spMkLst>
@@ -564,28 +500,12 @@
             <ac:spMk id="14" creationId="{8761DDFE-071F-4200-B0AA-394476C2D2D6}"/>
           </ac:spMkLst>
         </pc:spChg>
-        <pc:picChg chg="del">
-          <ac:chgData name="Florian Gritsch" userId="6461bc0e-c9be-4bd0-a028-abdbd39772c1" providerId="ADAL" clId="{0CFA2A2E-46D0-42F7-A6D8-B16498946566}" dt="2025-01-16T13:35:53.594" v="1198" actId="478"/>
-          <ac:picMkLst>
-            <pc:docMk/>
-            <pc:sldMk cId="275728200" sldId="267"/>
-            <ac:picMk id="5" creationId="{65B55C6C-C24B-281F-C879-B54632EF7056}"/>
-          </ac:picMkLst>
-        </pc:picChg>
         <pc:picChg chg="add mod">
           <ac:chgData name="Florian Gritsch" userId="6461bc0e-c9be-4bd0-a028-abdbd39772c1" providerId="ADAL" clId="{0CFA2A2E-46D0-42F7-A6D8-B16498946566}" dt="2025-01-16T13:36:54.627" v="1201" actId="26606"/>
           <ac:picMkLst>
             <pc:docMk/>
             <pc:sldMk cId="275728200" sldId="267"/>
             <ac:picMk id="6" creationId="{415E0BDE-F544-BA83-55D6-8A5F28D14E39}"/>
-          </ac:picMkLst>
-        </pc:picChg>
-        <pc:picChg chg="del">
-          <ac:chgData name="Florian Gritsch" userId="6461bc0e-c9be-4bd0-a028-abdbd39772c1" providerId="ADAL" clId="{0CFA2A2E-46D0-42F7-A6D8-B16498946566}" dt="2025-01-16T13:35:53.130" v="1197" actId="478"/>
-          <ac:picMkLst>
-            <pc:docMk/>
-            <pc:sldMk cId="275728200" sldId="267"/>
-            <ac:picMk id="7" creationId="{35108E0A-27BF-8C4C-507E-CB58A592EA8E}"/>
           </ac:picMkLst>
         </pc:picChg>
         <pc:picChg chg="add mod">
@@ -617,14 +537,6 @@
           <pc:docMk/>
           <pc:sldMk cId="2229681153" sldId="268"/>
         </pc:sldMkLst>
-        <pc:picChg chg="add del mod">
-          <ac:chgData name="Florian Gritsch" userId="6461bc0e-c9be-4bd0-a028-abdbd39772c1" providerId="ADAL" clId="{0CFA2A2E-46D0-42F7-A6D8-B16498946566}" dt="2025-01-16T13:40:35.281" v="1248" actId="478"/>
-          <ac:picMkLst>
-            <pc:docMk/>
-            <pc:sldMk cId="2229681153" sldId="268"/>
-            <ac:picMk id="3" creationId="{D5F688E1-8169-E44D-1D64-D79E73692283}"/>
-          </ac:picMkLst>
-        </pc:picChg>
         <pc:picChg chg="add mod ord">
           <ac:chgData name="Florian Gritsch" userId="6461bc0e-c9be-4bd0-a028-abdbd39772c1" providerId="ADAL" clId="{0CFA2A2E-46D0-42F7-A6D8-B16498946566}" dt="2025-01-16T13:41:21.696" v="1252" actId="26606"/>
           <ac:picMkLst>
@@ -648,22 +560,6 @@
           <pc:docMk/>
           <pc:sldMk cId="1757992743" sldId="269"/>
         </pc:sldMkLst>
-        <pc:spChg chg="del mod">
-          <ac:chgData name="Florian Gritsch" userId="6461bc0e-c9be-4bd0-a028-abdbd39772c1" providerId="ADAL" clId="{0CFA2A2E-46D0-42F7-A6D8-B16498946566}" dt="2025-01-16T13:54:03.430" v="1467" actId="478"/>
-          <ac:spMkLst>
-            <pc:docMk/>
-            <pc:sldMk cId="1757992743" sldId="269"/>
-            <ac:spMk id="2" creationId="{1E7B199F-09BE-47AE-A5B9-A848B2826BB4}"/>
-          </ac:spMkLst>
-        </pc:spChg>
-        <pc:spChg chg="add del mod">
-          <ac:chgData name="Florian Gritsch" userId="6461bc0e-c9be-4bd0-a028-abdbd39772c1" providerId="ADAL" clId="{0CFA2A2E-46D0-42F7-A6D8-B16498946566}" dt="2025-01-16T13:54:06.587" v="1468" actId="478"/>
-          <ac:spMkLst>
-            <pc:docMk/>
-            <pc:sldMk cId="1757992743" sldId="269"/>
-            <ac:spMk id="8" creationId="{C10E43DE-0C65-8642-1F2A-8DE658B91923}"/>
-          </ac:spMkLst>
-        </pc:spChg>
         <pc:spChg chg="add mod">
           <ac:chgData name="Florian Gritsch" userId="6461bc0e-c9be-4bd0-a028-abdbd39772c1" providerId="ADAL" clId="{0CFA2A2E-46D0-42F7-A6D8-B16498946566}" dt="2025-01-16T13:59:27.032" v="1483" actId="20577"/>
           <ac:spMkLst>
@@ -686,14 +582,6 @@
             <pc:docMk/>
             <pc:sldMk cId="1757992743" sldId="269"/>
             <ac:picMk id="6" creationId="{B6610DB4-D852-F748-1CE8-7FDAFA2AB4CA}"/>
-          </ac:picMkLst>
-        </pc:picChg>
-        <pc:picChg chg="add del">
-          <ac:chgData name="Florian Gritsch" userId="6461bc0e-c9be-4bd0-a028-abdbd39772c1" providerId="ADAL" clId="{0CFA2A2E-46D0-42F7-A6D8-B16498946566}" dt="2025-01-16T14:03:38.175" v="1485" actId="22"/>
-          <ac:picMkLst>
-            <pc:docMk/>
-            <pc:sldMk cId="1757992743" sldId="269"/>
-            <ac:picMk id="11" creationId="{B43B6DCF-C055-C428-6B63-535A44775A0F}"/>
           </ac:picMkLst>
         </pc:picChg>
       </pc:sldChg>
@@ -749,22 +637,6 @@
             <ac:picMk id="3" creationId="{CE3EDBB1-9B0B-FDA6-7DCA-EF3DA1B400EF}"/>
           </ac:picMkLst>
         </pc:picChg>
-        <pc:picChg chg="del">
-          <ac:chgData name="Florian Gritsch" userId="6461bc0e-c9be-4bd0-a028-abdbd39772c1" providerId="ADAL" clId="{0CFA2A2E-46D0-42F7-A6D8-B16498946566}" dt="2025-01-16T14:03:45.831" v="1487" actId="478"/>
-          <ac:picMkLst>
-            <pc:docMk/>
-            <pc:sldMk cId="3749808203" sldId="271"/>
-            <ac:picMk id="4" creationId="{2986AEB9-0B0A-7D7D-2370-F5C0FB0EF971}"/>
-          </ac:picMkLst>
-        </pc:picChg>
-        <pc:picChg chg="del">
-          <ac:chgData name="Florian Gritsch" userId="6461bc0e-c9be-4bd0-a028-abdbd39772c1" providerId="ADAL" clId="{0CFA2A2E-46D0-42F7-A6D8-B16498946566}" dt="2025-01-16T14:03:46.478" v="1488" actId="478"/>
-          <ac:picMkLst>
-            <pc:docMk/>
-            <pc:sldMk cId="3749808203" sldId="271"/>
-            <ac:picMk id="6" creationId="{F5E06ABD-0425-90BA-BFC7-D3FE1EBA9003}"/>
-          </ac:picMkLst>
-        </pc:picChg>
         <pc:picChg chg="add mod">
           <ac:chgData name="Florian Gritsch" userId="6461bc0e-c9be-4bd0-a028-abdbd39772c1" providerId="ADAL" clId="{0CFA2A2E-46D0-42F7-A6D8-B16498946566}" dt="2025-01-16T14:04:14.596" v="1495" actId="1076"/>
           <ac:picMkLst>
@@ -780,70 +652,6 @@
           <pc:docMk/>
           <pc:sldMk cId="1600483674" sldId="272"/>
         </pc:sldMkLst>
-        <pc:spChg chg="del">
-          <ac:chgData name="Florian Gritsch" userId="6461bc0e-c9be-4bd0-a028-abdbd39772c1" providerId="ADAL" clId="{0CFA2A2E-46D0-42F7-A6D8-B16498946566}" dt="2025-01-16T14:42:08.996" v="1610" actId="478"/>
-          <ac:spMkLst>
-            <pc:docMk/>
-            <pc:sldMk cId="1600483674" sldId="272"/>
-            <ac:spMk id="2" creationId="{1E0097EE-8236-C6B1-D04D-3EF7D6F84962}"/>
-          </ac:spMkLst>
-        </pc:spChg>
-        <pc:picChg chg="add mod">
-          <ac:chgData name="Florian Gritsch" userId="6461bc0e-c9be-4bd0-a028-abdbd39772c1" providerId="ADAL" clId="{0CFA2A2E-46D0-42F7-A6D8-B16498946566}" dt="2025-01-16T14:42:49.597" v="1617" actId="26606"/>
-          <ac:picMkLst>
-            <pc:docMk/>
-            <pc:sldMk cId="1600483674" sldId="272"/>
-            <ac:picMk id="4" creationId="{0724911C-D71D-FBFD-D998-F4B8DED6F9F7}"/>
-          </ac:picMkLst>
-        </pc:picChg>
-        <pc:picChg chg="add mod ord">
-          <ac:chgData name="Florian Gritsch" userId="6461bc0e-c9be-4bd0-a028-abdbd39772c1" providerId="ADAL" clId="{0CFA2A2E-46D0-42F7-A6D8-B16498946566}" dt="2025-01-16T14:42:34.512" v="1613" actId="27614"/>
-          <ac:picMkLst>
-            <pc:docMk/>
-            <pc:sldMk cId="1600483674" sldId="272"/>
-            <ac:picMk id="6" creationId="{A487570E-5D97-23DF-66A3-1EAE7BC24002}"/>
-          </ac:picMkLst>
-        </pc:picChg>
-        <pc:picChg chg="add mod">
-          <ac:chgData name="Florian Gritsch" userId="6461bc0e-c9be-4bd0-a028-abdbd39772c1" providerId="ADAL" clId="{0CFA2A2E-46D0-42F7-A6D8-B16498946566}" dt="2025-01-16T14:42:34.418" v="1612" actId="27614"/>
-          <ac:picMkLst>
-            <pc:docMk/>
-            <pc:sldMk cId="1600483674" sldId="272"/>
-            <ac:picMk id="8" creationId="{94574DB2-82BA-8935-063F-3D1CB0AE3AD6}"/>
-          </ac:picMkLst>
-        </pc:picChg>
-        <pc:cxnChg chg="add del">
-          <ac:chgData name="Florian Gritsch" userId="6461bc0e-c9be-4bd0-a028-abdbd39772c1" providerId="ADAL" clId="{0CFA2A2E-46D0-42F7-A6D8-B16498946566}" dt="2025-01-16T14:42:49.597" v="1617" actId="26606"/>
-          <ac:cxnSpMkLst>
-            <pc:docMk/>
-            <pc:sldMk cId="1600483674" sldId="272"/>
-            <ac:cxnSpMk id="13" creationId="{DCD67800-37AC-4E14-89B0-F79DCB3FB86D}"/>
-          </ac:cxnSpMkLst>
-        </pc:cxnChg>
-        <pc:cxnChg chg="add del">
-          <ac:chgData name="Florian Gritsch" userId="6461bc0e-c9be-4bd0-a028-abdbd39772c1" providerId="ADAL" clId="{0CFA2A2E-46D0-42F7-A6D8-B16498946566}" dt="2025-01-16T14:42:49.597" v="1617" actId="26606"/>
-          <ac:cxnSpMkLst>
-            <pc:docMk/>
-            <pc:sldMk cId="1600483674" sldId="272"/>
-            <ac:cxnSpMk id="15" creationId="{20F1788F-A5AE-4188-8274-F7F2E3833ECD}"/>
-          </ac:cxnSpMkLst>
-        </pc:cxnChg>
-        <pc:cxnChg chg="add">
-          <ac:chgData name="Florian Gritsch" userId="6461bc0e-c9be-4bd0-a028-abdbd39772c1" providerId="ADAL" clId="{0CFA2A2E-46D0-42F7-A6D8-B16498946566}" dt="2025-01-16T14:42:49.597" v="1617" actId="26606"/>
-          <ac:cxnSpMkLst>
-            <pc:docMk/>
-            <pc:sldMk cId="1600483674" sldId="272"/>
-            <ac:cxnSpMk id="20" creationId="{DCD67800-37AC-4E14-89B0-F79DCB3FB86D}"/>
-          </ac:cxnSpMkLst>
-        </pc:cxnChg>
-        <pc:cxnChg chg="add">
-          <ac:chgData name="Florian Gritsch" userId="6461bc0e-c9be-4bd0-a028-abdbd39772c1" providerId="ADAL" clId="{0CFA2A2E-46D0-42F7-A6D8-B16498946566}" dt="2025-01-16T14:42:49.597" v="1617" actId="26606"/>
-          <ac:cxnSpMkLst>
-            <pc:docMk/>
-            <pc:sldMk cId="1600483674" sldId="272"/>
-            <ac:cxnSpMk id="22" creationId="{20F1788F-A5AE-4188-8274-F7F2E3833ECD}"/>
-          </ac:cxnSpMkLst>
-        </pc:cxnChg>
       </pc:sldChg>
       <pc:sldChg chg="addSp delSp modSp new mod">
         <pc:chgData name="Florian Gritsch" userId="6461bc0e-c9be-4bd0-a028-abdbd39772c1" providerId="ADAL" clId="{0CFA2A2E-46D0-42F7-A6D8-B16498946566}" dt="2025-01-16T14:45:20.575" v="1635" actId="1076"/>
@@ -851,14 +659,6 @@
           <pc:docMk/>
           <pc:sldMk cId="1253735066" sldId="273"/>
         </pc:sldMkLst>
-        <pc:spChg chg="del">
-          <ac:chgData name="Florian Gritsch" userId="6461bc0e-c9be-4bd0-a028-abdbd39772c1" providerId="ADAL" clId="{0CFA2A2E-46D0-42F7-A6D8-B16498946566}" dt="2025-01-16T14:43:11.116" v="1619" actId="478"/>
-          <ac:spMkLst>
-            <pc:docMk/>
-            <pc:sldMk cId="1253735066" sldId="273"/>
-            <ac:spMk id="2" creationId="{5F661C82-CB13-EA98-D3E4-C37BC3467C57}"/>
-          </ac:spMkLst>
-        </pc:spChg>
         <pc:picChg chg="add mod">
           <ac:chgData name="Florian Gritsch" userId="6461bc0e-c9be-4bd0-a028-abdbd39772c1" providerId="ADAL" clId="{0CFA2A2E-46D0-42F7-A6D8-B16498946566}" dt="2025-01-16T14:45:20.575" v="1635" actId="1076"/>
           <ac:picMkLst>
@@ -896,14 +696,6 @@
             <pc:docMk/>
             <pc:sldMk cId="2228676399" sldId="274"/>
             <ac:spMk id="2" creationId="{A41905CD-1B88-4006-462A-F2FD03E19A84}"/>
-          </ac:spMkLst>
-        </pc:spChg>
-        <pc:spChg chg="del">
-          <ac:chgData name="Florian Gritsch" userId="6461bc0e-c9be-4bd0-a028-abdbd39772c1" providerId="ADAL" clId="{0CFA2A2E-46D0-42F7-A6D8-B16498946566}" dt="2025-01-16T15:24:15.353" v="1657" actId="478"/>
-          <ac:spMkLst>
-            <pc:docMk/>
-            <pc:sldMk cId="2228676399" sldId="274"/>
-            <ac:spMk id="3" creationId="{BAB90D56-30B1-6B39-C1D8-E026481CF27B}"/>
           </ac:spMkLst>
         </pc:spChg>
         <pc:spChg chg="add mod">
@@ -947,7 +739,7 @@
         </pc:sldMkLst>
       </pc:sldChg>
       <pc:sldChg chg="modSp new mod modNotesTx">
-        <pc:chgData name="Florian Gritsch" userId="6461bc0e-c9be-4bd0-a028-abdbd39772c1" providerId="ADAL" clId="{0CFA2A2E-46D0-42F7-A6D8-B16498946566}" dt="2025-01-16T16:26:53.981" v="2498" actId="20577"/>
+        <pc:chgData name="Florian Gritsch" userId="6461bc0e-c9be-4bd0-a028-abdbd39772c1" providerId="ADAL" clId="{0CFA2A2E-46D0-42F7-A6D8-B16498946566}" dt="2025-01-20T07:56:04.449" v="2556" actId="27636"/>
         <pc:sldMkLst>
           <pc:docMk/>
           <pc:sldMk cId="4228036351" sldId="275"/>
@@ -961,7 +753,7 @@
           </ac:spMkLst>
         </pc:spChg>
         <pc:spChg chg="mod">
-          <ac:chgData name="Florian Gritsch" userId="6461bc0e-c9be-4bd0-a028-abdbd39772c1" providerId="ADAL" clId="{0CFA2A2E-46D0-42F7-A6D8-B16498946566}" dt="2025-01-16T16:26:53.981" v="2498" actId="20577"/>
+          <ac:chgData name="Florian Gritsch" userId="6461bc0e-c9be-4bd0-a028-abdbd39772c1" providerId="ADAL" clId="{0CFA2A2E-46D0-42F7-A6D8-B16498946566}" dt="2025-01-20T07:56:04.449" v="2556" actId="27636"/>
           <ac:spMkLst>
             <pc:docMk/>
             <pc:sldMk cId="4228036351" sldId="275"/>
@@ -1007,6 +799,292 @@
             <ac:picMk id="7" creationId="{37310A8F-286E-1C26-EFF9-A83BE72A27C1}"/>
           </ac:picMkLst>
         </pc:picChg>
+      </pc:sldChg>
+      <pc:sldChg chg="ord">
+        <pc:chgData name="Florian Gritsch" userId="6461bc0e-c9be-4bd0-a028-abdbd39772c1" providerId="ADAL" clId="{0CFA2A2E-46D0-42F7-A6D8-B16498946566}" dt="2025-01-19T14:51:18.440" v="2500"/>
+        <pc:sldMkLst>
+          <pc:docMk/>
+          <pc:sldMk cId="885078097" sldId="281"/>
+        </pc:sldMkLst>
+      </pc:sldChg>
+      <pc:sldChg chg="addSp delSp modSp new mod">
+        <pc:chgData name="Florian Gritsch" userId="6461bc0e-c9be-4bd0-a028-abdbd39772c1" providerId="ADAL" clId="{0CFA2A2E-46D0-42F7-A6D8-B16498946566}" dt="2025-01-20T09:02:10.630" v="2748" actId="14100"/>
+        <pc:sldMkLst>
+          <pc:docMk/>
+          <pc:sldMk cId="2304022680" sldId="282"/>
+        </pc:sldMkLst>
+        <pc:spChg chg="mod">
+          <ac:chgData name="Florian Gritsch" userId="6461bc0e-c9be-4bd0-a028-abdbd39772c1" providerId="ADAL" clId="{0CFA2A2E-46D0-42F7-A6D8-B16498946566}" dt="2025-01-19T15:00:14.576" v="2518" actId="20577"/>
+          <ac:spMkLst>
+            <pc:docMk/>
+            <pc:sldMk cId="2304022680" sldId="282"/>
+            <ac:spMk id="2" creationId="{6CA0CC5A-11E6-53EB-E6D3-2BB68C5AE05D}"/>
+          </ac:spMkLst>
+        </pc:spChg>
+        <pc:spChg chg="add mod">
+          <ac:chgData name="Florian Gritsch" userId="6461bc0e-c9be-4bd0-a028-abdbd39772c1" providerId="ADAL" clId="{0CFA2A2E-46D0-42F7-A6D8-B16498946566}" dt="2025-01-20T08:40:30.227" v="2667" actId="20577"/>
+          <ac:spMkLst>
+            <pc:docMk/>
+            <pc:sldMk cId="2304022680" sldId="282"/>
+            <ac:spMk id="4" creationId="{7608A9E2-B05A-D10E-098E-39F26DDF4014}"/>
+          </ac:spMkLst>
+        </pc:spChg>
+        <pc:picChg chg="add del mod">
+          <ac:chgData name="Florian Gritsch" userId="6461bc0e-c9be-4bd0-a028-abdbd39772c1" providerId="ADAL" clId="{0CFA2A2E-46D0-42F7-A6D8-B16498946566}" dt="2025-01-20T08:57:44.768" v="2735" actId="478"/>
+          <ac:picMkLst>
+            <pc:docMk/>
+            <pc:sldMk cId="2304022680" sldId="282"/>
+            <ac:picMk id="3" creationId="{3A8C67C9-4CD4-5978-E3B1-212E12BC393D}"/>
+          </ac:picMkLst>
+        </pc:picChg>
+        <pc:picChg chg="add mod">
+          <ac:chgData name="Florian Gritsch" userId="6461bc0e-c9be-4bd0-a028-abdbd39772c1" providerId="ADAL" clId="{0CFA2A2E-46D0-42F7-A6D8-B16498946566}" dt="2025-01-20T09:02:10.630" v="2748" actId="14100"/>
+          <ac:picMkLst>
+            <pc:docMk/>
+            <pc:sldMk cId="2304022680" sldId="282"/>
+            <ac:picMk id="6" creationId="{3A8366B1-5958-75C7-1E6F-4D749B2128E5}"/>
+          </ac:picMkLst>
+        </pc:picChg>
+      </pc:sldChg>
+      <pc:sldChg chg="addSp delSp modSp new mod">
+        <pc:chgData name="Florian Gritsch" userId="6461bc0e-c9be-4bd0-a028-abdbd39772c1" providerId="ADAL" clId="{0CFA2A2E-46D0-42F7-A6D8-B16498946566}" dt="2025-01-20T09:24:58.452" v="2913" actId="1076"/>
+        <pc:sldMkLst>
+          <pc:docMk/>
+          <pc:sldMk cId="1043435716" sldId="283"/>
+        </pc:sldMkLst>
+        <pc:spChg chg="mod">
+          <ac:chgData name="Florian Gritsch" userId="6461bc0e-c9be-4bd0-a028-abdbd39772c1" providerId="ADAL" clId="{0CFA2A2E-46D0-42F7-A6D8-B16498946566}" dt="2025-01-20T09:04:37.065" v="2793" actId="20577"/>
+          <ac:spMkLst>
+            <pc:docMk/>
+            <pc:sldMk cId="1043435716" sldId="283"/>
+            <ac:spMk id="2" creationId="{7CEF9255-7FB3-2B6F-46DD-08D01136672C}"/>
+          </ac:spMkLst>
+        </pc:spChg>
+        <pc:spChg chg="add mod">
+          <ac:chgData name="Florian Gritsch" userId="6461bc0e-c9be-4bd0-a028-abdbd39772c1" providerId="ADAL" clId="{0CFA2A2E-46D0-42F7-A6D8-B16498946566}" dt="2025-01-20T09:20:52.896" v="2835" actId="20577"/>
+          <ac:spMkLst>
+            <pc:docMk/>
+            <pc:sldMk cId="1043435716" sldId="283"/>
+            <ac:spMk id="6" creationId="{B4CE6D28-FA22-AFB5-9C86-E9FDED8237E6}"/>
+          </ac:spMkLst>
+        </pc:spChg>
+        <pc:picChg chg="add del mod">
+          <ac:chgData name="Florian Gritsch" userId="6461bc0e-c9be-4bd0-a028-abdbd39772c1" providerId="ADAL" clId="{0CFA2A2E-46D0-42F7-A6D8-B16498946566}" dt="2025-01-20T07:56:20.641" v="2561" actId="478"/>
+          <ac:picMkLst>
+            <pc:docMk/>
+            <pc:sldMk cId="1043435716" sldId="283"/>
+            <ac:picMk id="4" creationId="{F09E02A9-B748-93B4-1E2C-CD19B203B1B6}"/>
+          </ac:picMkLst>
+        </pc:picChg>
+        <pc:picChg chg="add del mod">
+          <ac:chgData name="Florian Gritsch" userId="6461bc0e-c9be-4bd0-a028-abdbd39772c1" providerId="ADAL" clId="{0CFA2A2E-46D0-42F7-A6D8-B16498946566}" dt="2025-01-20T07:56:10.746" v="2558" actId="478"/>
+          <ac:picMkLst>
+            <pc:docMk/>
+            <pc:sldMk cId="1043435716" sldId="283"/>
+            <ac:picMk id="5" creationId="{E6A8A50A-F945-F5CD-AF83-54616293E47C}"/>
+          </ac:picMkLst>
+        </pc:picChg>
+        <pc:picChg chg="add mod">
+          <ac:chgData name="Florian Gritsch" userId="6461bc0e-c9be-4bd0-a028-abdbd39772c1" providerId="ADAL" clId="{0CFA2A2E-46D0-42F7-A6D8-B16498946566}" dt="2025-01-20T09:24:58.452" v="2913" actId="1076"/>
+          <ac:picMkLst>
+            <pc:docMk/>
+            <pc:sldMk cId="1043435716" sldId="283"/>
+            <ac:picMk id="8" creationId="{8CA56C8C-B62A-5CA4-F626-E38606F299A0}"/>
+          </ac:picMkLst>
+        </pc:picChg>
+      </pc:sldChg>
+      <pc:sldChg chg="addSp modSp add mod">
+        <pc:chgData name="Florian Gritsch" userId="6461bc0e-c9be-4bd0-a028-abdbd39772c1" providerId="ADAL" clId="{0CFA2A2E-46D0-42F7-A6D8-B16498946566}" dt="2025-01-20T08:57:34.737" v="2734" actId="14100"/>
+        <pc:sldMkLst>
+          <pc:docMk/>
+          <pc:sldMk cId="3119303849" sldId="284"/>
+        </pc:sldMkLst>
+        <pc:spChg chg="mod">
+          <ac:chgData name="Florian Gritsch" userId="6461bc0e-c9be-4bd0-a028-abdbd39772c1" providerId="ADAL" clId="{0CFA2A2E-46D0-42F7-A6D8-B16498946566}" dt="2025-01-20T08:56:13.187" v="2680" actId="5793"/>
+          <ac:spMkLst>
+            <pc:docMk/>
+            <pc:sldMk cId="3119303849" sldId="284"/>
+            <ac:spMk id="2" creationId="{B814759B-30BC-3DC6-F90C-7E203E8B1D30}"/>
+          </ac:spMkLst>
+        </pc:spChg>
+        <pc:spChg chg="add mod">
+          <ac:chgData name="Florian Gritsch" userId="6461bc0e-c9be-4bd0-a028-abdbd39772c1" providerId="ADAL" clId="{0CFA2A2E-46D0-42F7-A6D8-B16498946566}" dt="2025-01-20T08:57:26.942" v="2731" actId="1076"/>
+          <ac:spMkLst>
+            <pc:docMk/>
+            <pc:sldMk cId="3119303849" sldId="284"/>
+            <ac:spMk id="7" creationId="{11332C5D-1B8D-8E16-A251-E754EF928F41}"/>
+          </ac:spMkLst>
+        </pc:spChg>
+        <pc:picChg chg="add mod">
+          <ac:chgData name="Florian Gritsch" userId="6461bc0e-c9be-4bd0-a028-abdbd39772c1" providerId="ADAL" clId="{0CFA2A2E-46D0-42F7-A6D8-B16498946566}" dt="2025-01-20T08:57:34.737" v="2734" actId="14100"/>
+          <ac:picMkLst>
+            <pc:docMk/>
+            <pc:sldMk cId="3119303849" sldId="284"/>
+            <ac:picMk id="4" creationId="{5DACFB5A-47AA-00F5-4837-499645BE0887}"/>
+          </ac:picMkLst>
+        </pc:picChg>
+        <pc:picChg chg="add mod">
+          <ac:chgData name="Florian Gritsch" userId="6461bc0e-c9be-4bd0-a028-abdbd39772c1" providerId="ADAL" clId="{0CFA2A2E-46D0-42F7-A6D8-B16498946566}" dt="2025-01-20T08:57:01.259" v="2687" actId="1076"/>
+          <ac:picMkLst>
+            <pc:docMk/>
+            <pc:sldMk cId="3119303849" sldId="284"/>
+            <ac:picMk id="6" creationId="{3BC7DF13-C6A3-5577-4D67-0EDAA4547BB1}"/>
+          </ac:picMkLst>
+        </pc:picChg>
+      </pc:sldChg>
+      <pc:sldChg chg="delSp add del mod">
+        <pc:chgData name="Florian Gritsch" userId="6461bc0e-c9be-4bd0-a028-abdbd39772c1" providerId="ADAL" clId="{0CFA2A2E-46D0-42F7-A6D8-B16498946566}" dt="2025-01-20T09:24:29.749" v="2911" actId="47"/>
+        <pc:sldMkLst>
+          <pc:docMk/>
+          <pc:sldMk cId="392317283" sldId="285"/>
+        </pc:sldMkLst>
+        <pc:picChg chg="del">
+          <ac:chgData name="Florian Gritsch" userId="6461bc0e-c9be-4bd0-a028-abdbd39772c1" providerId="ADAL" clId="{0CFA2A2E-46D0-42F7-A6D8-B16498946566}" dt="2025-01-20T07:56:22.617" v="2562" actId="478"/>
+          <ac:picMkLst>
+            <pc:docMk/>
+            <pc:sldMk cId="392317283" sldId="285"/>
+            <ac:picMk id="4" creationId="{A15A05C2-1B0B-AA9D-5A88-C2BFFE6B5EAB}"/>
+          </ac:picMkLst>
+        </pc:picChg>
+      </pc:sldChg>
+      <pc:sldChg chg="addSp delSp modSp new mod">
+        <pc:chgData name="Florian Gritsch" userId="6461bc0e-c9be-4bd0-a028-abdbd39772c1" providerId="ADAL" clId="{0CFA2A2E-46D0-42F7-A6D8-B16498946566}" dt="2025-01-20T09:43:51.753" v="2916" actId="478"/>
+        <pc:sldMkLst>
+          <pc:docMk/>
+          <pc:sldMk cId="2659030694" sldId="286"/>
+        </pc:sldMkLst>
+        <pc:spChg chg="mod">
+          <ac:chgData name="Florian Gritsch" userId="6461bc0e-c9be-4bd0-a028-abdbd39772c1" providerId="ADAL" clId="{0CFA2A2E-46D0-42F7-A6D8-B16498946566}" dt="2025-01-20T08:35:36.303" v="2566" actId="20577"/>
+          <ac:spMkLst>
+            <pc:docMk/>
+            <pc:sldMk cId="2659030694" sldId="286"/>
+            <ac:spMk id="2" creationId="{4F377489-3EB7-BB34-E5F8-FB2644A68D3C}"/>
+          </ac:spMkLst>
+        </pc:spChg>
+        <pc:spChg chg="add mod">
+          <ac:chgData name="Florian Gritsch" userId="6461bc0e-c9be-4bd0-a028-abdbd39772c1" providerId="ADAL" clId="{0CFA2A2E-46D0-42F7-A6D8-B16498946566}" dt="2025-01-20T08:37:08.400" v="2609" actId="1076"/>
+          <ac:spMkLst>
+            <pc:docMk/>
+            <pc:sldMk cId="2659030694" sldId="286"/>
+            <ac:spMk id="7" creationId="{B1B8D915-8C41-BFFF-2FBE-71C453FBA075}"/>
+          </ac:spMkLst>
+        </pc:spChg>
+        <pc:picChg chg="add mod">
+          <ac:chgData name="Florian Gritsch" userId="6461bc0e-c9be-4bd0-a028-abdbd39772c1" providerId="ADAL" clId="{0CFA2A2E-46D0-42F7-A6D8-B16498946566}" dt="2025-01-20T08:36:21.231" v="2576" actId="14100"/>
+          <ac:picMkLst>
+            <pc:docMk/>
+            <pc:sldMk cId="2659030694" sldId="286"/>
+            <ac:picMk id="4" creationId="{EE9A597D-A573-9A9C-67C5-CB9D6BDED87E}"/>
+          </ac:picMkLst>
+        </pc:picChg>
+        <pc:picChg chg="add mod">
+          <ac:chgData name="Florian Gritsch" userId="6461bc0e-c9be-4bd0-a028-abdbd39772c1" providerId="ADAL" clId="{0CFA2A2E-46D0-42F7-A6D8-B16498946566}" dt="2025-01-20T08:36:31.689" v="2578" actId="1076"/>
+          <ac:picMkLst>
+            <pc:docMk/>
+            <pc:sldMk cId="2659030694" sldId="286"/>
+            <ac:picMk id="6" creationId="{AC9A4703-0A32-07A3-9F90-CBE3C121101A}"/>
+          </ac:picMkLst>
+        </pc:picChg>
+        <pc:picChg chg="add del mod">
+          <ac:chgData name="Florian Gritsch" userId="6461bc0e-c9be-4bd0-a028-abdbd39772c1" providerId="ADAL" clId="{0CFA2A2E-46D0-42F7-A6D8-B16498946566}" dt="2025-01-20T09:43:51.753" v="2916" actId="478"/>
+          <ac:picMkLst>
+            <pc:docMk/>
+            <pc:sldMk cId="2659030694" sldId="286"/>
+            <ac:picMk id="8" creationId="{52F58435-8E48-A8E4-15DA-472E594C868E}"/>
+          </ac:picMkLst>
+        </pc:picChg>
+      </pc:sldChg>
+      <pc:sldChg chg="addSp delSp modSp add mod">
+        <pc:chgData name="Florian Gritsch" userId="6461bc0e-c9be-4bd0-a028-abdbd39772c1" providerId="ADAL" clId="{0CFA2A2E-46D0-42F7-A6D8-B16498946566}" dt="2025-01-20T09:23:48.293" v="2907" actId="20577"/>
+        <pc:sldMkLst>
+          <pc:docMk/>
+          <pc:sldMk cId="3389828515" sldId="287"/>
+        </pc:sldMkLst>
+        <pc:spChg chg="mod">
+          <ac:chgData name="Florian Gritsch" userId="6461bc0e-c9be-4bd0-a028-abdbd39772c1" providerId="ADAL" clId="{0CFA2A2E-46D0-42F7-A6D8-B16498946566}" dt="2025-01-20T09:19:48.761" v="2802" actId="20577"/>
+          <ac:spMkLst>
+            <pc:docMk/>
+            <pc:sldMk cId="3389828515" sldId="287"/>
+            <ac:spMk id="2" creationId="{E6805EC8-DFD0-D33D-6CD3-C14CDF33DE14}"/>
+          </ac:spMkLst>
+        </pc:spChg>
+        <pc:spChg chg="del">
+          <ac:chgData name="Florian Gritsch" userId="6461bc0e-c9be-4bd0-a028-abdbd39772c1" providerId="ADAL" clId="{0CFA2A2E-46D0-42F7-A6D8-B16498946566}" dt="2025-01-20T09:19:52.121" v="2803" actId="478"/>
+          <ac:spMkLst>
+            <pc:docMk/>
+            <pc:sldMk cId="3389828515" sldId="287"/>
+            <ac:spMk id="6" creationId="{6D141BC4-8E52-B095-01BA-9654065F1EB7}"/>
+          </ac:spMkLst>
+        </pc:spChg>
+        <pc:spChg chg="add mod">
+          <ac:chgData name="Florian Gritsch" userId="6461bc0e-c9be-4bd0-a028-abdbd39772c1" providerId="ADAL" clId="{0CFA2A2E-46D0-42F7-A6D8-B16498946566}" dt="2025-01-20T09:23:48.293" v="2907" actId="20577"/>
+          <ac:spMkLst>
+            <pc:docMk/>
+            <pc:sldMk cId="3389828515" sldId="287"/>
+            <ac:spMk id="8" creationId="{AAEC1ECA-72A0-32E6-469A-312E93B59D76}"/>
+          </ac:spMkLst>
+        </pc:spChg>
+        <pc:picChg chg="add del mod">
+          <ac:chgData name="Florian Gritsch" userId="6461bc0e-c9be-4bd0-a028-abdbd39772c1" providerId="ADAL" clId="{0CFA2A2E-46D0-42F7-A6D8-B16498946566}" dt="2025-01-20T09:20:37.889" v="2808" actId="478"/>
+          <ac:picMkLst>
+            <pc:docMk/>
+            <pc:sldMk cId="3389828515" sldId="287"/>
+            <ac:picMk id="4" creationId="{EA1231B3-C419-A39C-C7B2-5736F1C5C3EC}"/>
+          </ac:picMkLst>
+        </pc:picChg>
+        <pc:picChg chg="add mod">
+          <ac:chgData name="Florian Gritsch" userId="6461bc0e-c9be-4bd0-a028-abdbd39772c1" providerId="ADAL" clId="{0CFA2A2E-46D0-42F7-A6D8-B16498946566}" dt="2025-01-20T09:23:21.651" v="2839" actId="1076"/>
+          <ac:picMkLst>
+            <pc:docMk/>
+            <pc:sldMk cId="3389828515" sldId="287"/>
+            <ac:picMk id="7" creationId="{DD032F7D-2E38-E3E4-949E-B3812F485C58}"/>
+          </ac:picMkLst>
+        </pc:picChg>
+      </pc:sldChg>
+      <pc:sldChg chg="addSp modSp new mod">
+        <pc:chgData name="Florian Gritsch" userId="6461bc0e-c9be-4bd0-a028-abdbd39772c1" providerId="ADAL" clId="{0CFA2A2E-46D0-42F7-A6D8-B16498946566}" dt="2025-01-20T09:44:03.014" v="2920" actId="1076"/>
+        <pc:sldMkLst>
+          <pc:docMk/>
+          <pc:sldMk cId="3230079903" sldId="288"/>
+        </pc:sldMkLst>
+        <pc:picChg chg="add mod">
+          <ac:chgData name="Florian Gritsch" userId="6461bc0e-c9be-4bd0-a028-abdbd39772c1" providerId="ADAL" clId="{0CFA2A2E-46D0-42F7-A6D8-B16498946566}" dt="2025-01-20T09:44:03.014" v="2920" actId="1076"/>
+          <ac:picMkLst>
+            <pc:docMk/>
+            <pc:sldMk cId="3230079903" sldId="288"/>
+            <ac:picMk id="3" creationId="{7564CBC9-1416-B024-9A74-94543D40F9A3}"/>
+          </ac:picMkLst>
+        </pc:picChg>
+      </pc:sldChg>
+      <pc:sldChg chg="modSp new mod">
+        <pc:chgData name="Florian Gritsch" userId="6461bc0e-c9be-4bd0-a028-abdbd39772c1" providerId="ADAL" clId="{0CFA2A2E-46D0-42F7-A6D8-B16498946566}" dt="2025-01-20T13:14:23.581" v="2941" actId="20577"/>
+        <pc:sldMkLst>
+          <pc:docMk/>
+          <pc:sldMk cId="2154113216" sldId="289"/>
+        </pc:sldMkLst>
+        <pc:spChg chg="mod">
+          <ac:chgData name="Florian Gritsch" userId="6461bc0e-c9be-4bd0-a028-abdbd39772c1" providerId="ADAL" clId="{0CFA2A2E-46D0-42F7-A6D8-B16498946566}" dt="2025-01-20T13:14:23.581" v="2941" actId="20577"/>
+          <ac:spMkLst>
+            <pc:docMk/>
+            <pc:sldMk cId="2154113216" sldId="289"/>
+            <ac:spMk id="2" creationId="{21F741C4-AB14-0EEA-9BD2-13C5D63840AF}"/>
+          </ac:spMkLst>
+        </pc:spChg>
+      </pc:sldChg>
+      <pc:sldChg chg="modSp new mod">
+        <pc:chgData name="Florian Gritsch" userId="6461bc0e-c9be-4bd0-a028-abdbd39772c1" providerId="ADAL" clId="{0CFA2A2E-46D0-42F7-A6D8-B16498946566}" dt="2025-01-20T13:14:33.988" v="2954" actId="20577"/>
+        <pc:sldMkLst>
+          <pc:docMk/>
+          <pc:sldMk cId="2632012452" sldId="290"/>
+        </pc:sldMkLst>
+        <pc:spChg chg="mod">
+          <ac:chgData name="Florian Gritsch" userId="6461bc0e-c9be-4bd0-a028-abdbd39772c1" providerId="ADAL" clId="{0CFA2A2E-46D0-42F7-A6D8-B16498946566}" dt="2025-01-20T13:14:33.988" v="2954" actId="20577"/>
+          <ac:spMkLst>
+            <pc:docMk/>
+            <pc:sldMk cId="2632012452" sldId="290"/>
+            <ac:spMk id="2" creationId="{81D457E7-FB6C-166C-4786-D08891B58DF1}"/>
+          </ac:spMkLst>
+        </pc:spChg>
       </pc:sldChg>
     </pc:docChg>
   </pc:docChgLst>
@@ -5375,7 +5453,7 @@
           <a:p>
             <a:fld id="{7A90B0C3-ED28-445D-8A9D-8679C44E937E}" type="datetimeFigureOut">
               <a:rPr lang="en-US" smtClean="0"/>
-              <a:t>1/17/2025</a:t>
+              <a:t>1/20/2025</a:t>
             </a:fld>
             <a:endParaRPr lang="en-US"/>
           </a:p>
@@ -6859,7 +6937,7 @@
           <a:p>
             <a:fld id="{AC6F5925-0E43-4417-92CA-17A233A7567E}" type="datetimeFigureOut">
               <a:rPr lang="en-US" smtClean="0"/>
-              <a:t>1/17/2025</a:t>
+              <a:t>1/20/2025</a:t>
             </a:fld>
             <a:endParaRPr lang="en-US"/>
           </a:p>
@@ -7059,7 +7137,7 @@
           <a:p>
             <a:fld id="{AC6F5925-0E43-4417-92CA-17A233A7567E}" type="datetimeFigureOut">
               <a:rPr lang="en-US" smtClean="0"/>
-              <a:t>1/17/2025</a:t>
+              <a:t>1/20/2025</a:t>
             </a:fld>
             <a:endParaRPr lang="en-US"/>
           </a:p>
@@ -7269,7 +7347,7 @@
           <a:p>
             <a:fld id="{AC6F5925-0E43-4417-92CA-17A233A7567E}" type="datetimeFigureOut">
               <a:rPr lang="en-US" smtClean="0"/>
-              <a:t>1/17/2025</a:t>
+              <a:t>1/20/2025</a:t>
             </a:fld>
             <a:endParaRPr lang="en-US"/>
           </a:p>
@@ -7469,7 +7547,7 @@
           <a:p>
             <a:fld id="{AC6F5925-0E43-4417-92CA-17A233A7567E}" type="datetimeFigureOut">
               <a:rPr lang="en-US" smtClean="0"/>
-              <a:t>1/17/2025</a:t>
+              <a:t>1/20/2025</a:t>
             </a:fld>
             <a:endParaRPr lang="en-US"/>
           </a:p>
@@ -7745,7 +7823,7 @@
           <a:p>
             <a:fld id="{AC6F5925-0E43-4417-92CA-17A233A7567E}" type="datetimeFigureOut">
               <a:rPr lang="en-US" smtClean="0"/>
-              <a:t>1/17/2025</a:t>
+              <a:t>1/20/2025</a:t>
             </a:fld>
             <a:endParaRPr lang="en-US"/>
           </a:p>
@@ -8013,7 +8091,7 @@
           <a:p>
             <a:fld id="{AC6F5925-0E43-4417-92CA-17A233A7567E}" type="datetimeFigureOut">
               <a:rPr lang="en-US" smtClean="0"/>
-              <a:t>1/17/2025</a:t>
+              <a:t>1/20/2025</a:t>
             </a:fld>
             <a:endParaRPr lang="en-US"/>
           </a:p>
@@ -8428,7 +8506,7 @@
           <a:p>
             <a:fld id="{AC6F5925-0E43-4417-92CA-17A233A7567E}" type="datetimeFigureOut">
               <a:rPr lang="en-US" smtClean="0"/>
-              <a:t>1/17/2025</a:t>
+              <a:t>1/20/2025</a:t>
             </a:fld>
             <a:endParaRPr lang="en-US"/>
           </a:p>
@@ -8570,7 +8648,7 @@
           <a:p>
             <a:fld id="{AC6F5925-0E43-4417-92CA-17A233A7567E}" type="datetimeFigureOut">
               <a:rPr lang="en-US" smtClean="0"/>
-              <a:t>1/17/2025</a:t>
+              <a:t>1/20/2025</a:t>
             </a:fld>
             <a:endParaRPr lang="en-US"/>
           </a:p>
@@ -8683,7 +8761,7 @@
           <a:p>
             <a:fld id="{AC6F5925-0E43-4417-92CA-17A233A7567E}" type="datetimeFigureOut">
               <a:rPr lang="en-US" smtClean="0"/>
-              <a:t>1/17/2025</a:t>
+              <a:t>1/20/2025</a:t>
             </a:fld>
             <a:endParaRPr lang="en-US"/>
           </a:p>
@@ -8996,7 +9074,7 @@
           <a:p>
             <a:fld id="{AC6F5925-0E43-4417-92CA-17A233A7567E}" type="datetimeFigureOut">
               <a:rPr lang="en-US" smtClean="0"/>
-              <a:t>1/17/2025</a:t>
+              <a:t>1/20/2025</a:t>
             </a:fld>
             <a:endParaRPr lang="en-US"/>
           </a:p>
@@ -9285,7 +9363,7 @@
           <a:p>
             <a:fld id="{AC6F5925-0E43-4417-92CA-17A233A7567E}" type="datetimeFigureOut">
               <a:rPr lang="en-US" smtClean="0"/>
-              <a:t>1/17/2025</a:t>
+              <a:t>1/20/2025</a:t>
             </a:fld>
             <a:endParaRPr lang="en-US"/>
           </a:p>
@@ -9528,7 +9606,7 @@
           <a:p>
             <a:fld id="{AC6F5925-0E43-4417-92CA-17A233A7567E}" type="datetimeFigureOut">
               <a:rPr lang="en-US" smtClean="0"/>
-              <a:t>1/17/2025</a:t>
+              <a:t>1/20/2025</a:t>
             </a:fld>
             <a:endParaRPr lang="en-US"/>
           </a:p>
@@ -12505,7 +12583,7 @@
         <p:spPr/>
         <p:txBody>
           <a:bodyPr>
-            <a:normAutofit/>
+            <a:normAutofit lnSpcReduction="10000"/>
           </a:bodyPr>
           <a:lstStyle/>
           <a:p>
@@ -12865,6 +12943,100 @@
 </file>
 
 <file path=ppt/slides/slide21.xml><?xml version="1.0" encoding="utf-8"?>
+<p:sld xmlns:a="http://schemas.openxmlformats.org/drawingml/2006/main" xmlns:r="http://schemas.openxmlformats.org/officeDocument/2006/relationships" xmlns:p="http://schemas.openxmlformats.org/presentationml/2006/main">
+  <p:cSld>
+    <p:spTree>
+      <p:nvGrpSpPr>
+        <p:cNvPr id="1" name=""/>
+        <p:cNvGrpSpPr/>
+        <p:nvPr/>
+      </p:nvGrpSpPr>
+      <p:grpSpPr>
+        <a:xfrm>
+          <a:off x="0" y="0"/>
+          <a:ext cx="0" cy="0"/>
+          <a:chOff x="0" y="0"/>
+          <a:chExt cx="0" cy="0"/>
+        </a:xfrm>
+      </p:grpSpPr>
+      <p:sp>
+        <p:nvSpPr>
+          <p:cNvPr id="2" name="Titel 1">
+            <a:extLst>
+              <a:ext uri="{FF2B5EF4-FFF2-40B4-BE49-F238E27FC236}">
+                <a16:creationId xmlns:a16="http://schemas.microsoft.com/office/drawing/2014/main" id="{56CB0CFA-309A-4F67-B1F1-336D6A9851EC}"/>
+              </a:ext>
+            </a:extLst>
+          </p:cNvPr>
+          <p:cNvSpPr>
+            <a:spLocks noGrp="1"/>
+          </p:cNvSpPr>
+          <p:nvPr>
+            <p:ph type="title"/>
+          </p:nvPr>
+        </p:nvSpPr>
+        <p:spPr/>
+        <p:txBody>
+          <a:bodyPr/>
+          <a:lstStyle/>
+          <a:p>
+            <a:r>
+              <a:rPr lang="de-DE" dirty="0"/>
+              <a:t>Wort n zu sich selbst</a:t>
+            </a:r>
+          </a:p>
+        </p:txBody>
+      </p:sp>
+      <p:pic>
+        <p:nvPicPr>
+          <p:cNvPr id="4" name="Grafik 3">
+            <a:extLst>
+              <a:ext uri="{FF2B5EF4-FFF2-40B4-BE49-F238E27FC236}">
+                <a16:creationId xmlns:a16="http://schemas.microsoft.com/office/drawing/2014/main" id="{9FA2B019-4FBA-44BA-9146-708392435E0B}"/>
+              </a:ext>
+            </a:extLst>
+          </p:cNvPr>
+          <p:cNvPicPr>
+            <a:picLocks noChangeAspect="1"/>
+          </p:cNvPicPr>
+          <p:nvPr/>
+        </p:nvPicPr>
+        <p:blipFill>
+          <a:blip r:embed="rId2">
+            <a:extLst>
+              <a:ext uri="{28A0092B-C50C-407E-A947-70E740481C1C}">
+                <a14:useLocalDpi xmlns:a14="http://schemas.microsoft.com/office/drawing/2010/main" val="0"/>
+              </a:ext>
+            </a:extLst>
+          </a:blip>
+          <a:stretch>
+            <a:fillRect/>
+          </a:stretch>
+        </p:blipFill>
+        <p:spPr>
+          <a:xfrm>
+            <a:off x="3352795" y="1865415"/>
+            <a:ext cx="4306790" cy="4306790"/>
+          </a:xfrm>
+          <a:prstGeom prst="rect">
+            <a:avLst/>
+          </a:prstGeom>
+        </p:spPr>
+      </p:pic>
+    </p:spTree>
+    <p:extLst>
+      <p:ext uri="{BB962C8B-B14F-4D97-AF65-F5344CB8AC3E}">
+        <p14:creationId xmlns:p14="http://schemas.microsoft.com/office/powerpoint/2010/main" val="885078097"/>
+      </p:ext>
+    </p:extLst>
+  </p:cSld>
+  <p:clrMapOvr>
+    <a:masterClrMapping/>
+  </p:clrMapOvr>
+</p:sld>
+</file>
+
+<file path=ppt/slides/slide22.xml><?xml version="1.0" encoding="utf-8"?>
 <p:sld xmlns:a="http://schemas.openxmlformats.org/drawingml/2006/main" xmlns:r="http://schemas.openxmlformats.org/officeDocument/2006/relationships" xmlns:p="http://schemas.openxmlformats.org/presentationml/2006/main">
   <p:cSld>
     <p:spTree>
@@ -12998,100 +13170,6 @@
     <p:extLst>
       <p:ext uri="{BB962C8B-B14F-4D97-AF65-F5344CB8AC3E}">
         <p14:creationId xmlns:p14="http://schemas.microsoft.com/office/powerpoint/2010/main" val="2451801601"/>
-      </p:ext>
-    </p:extLst>
-  </p:cSld>
-  <p:clrMapOvr>
-    <a:masterClrMapping/>
-  </p:clrMapOvr>
-</p:sld>
-</file>
-
-<file path=ppt/slides/slide22.xml><?xml version="1.0" encoding="utf-8"?>
-<p:sld xmlns:a="http://schemas.openxmlformats.org/drawingml/2006/main" xmlns:r="http://schemas.openxmlformats.org/officeDocument/2006/relationships" xmlns:p="http://schemas.openxmlformats.org/presentationml/2006/main">
-  <p:cSld>
-    <p:spTree>
-      <p:nvGrpSpPr>
-        <p:cNvPr id="1" name=""/>
-        <p:cNvGrpSpPr/>
-        <p:nvPr/>
-      </p:nvGrpSpPr>
-      <p:grpSpPr>
-        <a:xfrm>
-          <a:off x="0" y="0"/>
-          <a:ext cx="0" cy="0"/>
-          <a:chOff x="0" y="0"/>
-          <a:chExt cx="0" cy="0"/>
-        </a:xfrm>
-      </p:grpSpPr>
-      <p:sp>
-        <p:nvSpPr>
-          <p:cNvPr id="2" name="Titel 1">
-            <a:extLst>
-              <a:ext uri="{FF2B5EF4-FFF2-40B4-BE49-F238E27FC236}">
-                <a16:creationId xmlns:a16="http://schemas.microsoft.com/office/drawing/2014/main" id="{56CB0CFA-309A-4F67-B1F1-336D6A9851EC}"/>
-              </a:ext>
-            </a:extLst>
-          </p:cNvPr>
-          <p:cNvSpPr>
-            <a:spLocks noGrp="1"/>
-          </p:cNvSpPr>
-          <p:nvPr>
-            <p:ph type="title"/>
-          </p:nvPr>
-        </p:nvSpPr>
-        <p:spPr/>
-        <p:txBody>
-          <a:bodyPr/>
-          <a:lstStyle/>
-          <a:p>
-            <a:r>
-              <a:rPr lang="de-DE" dirty="0"/>
-              <a:t>Wort n zu sich selbst</a:t>
-            </a:r>
-          </a:p>
-        </p:txBody>
-      </p:sp>
-      <p:pic>
-        <p:nvPicPr>
-          <p:cNvPr id="4" name="Grafik 3">
-            <a:extLst>
-              <a:ext uri="{FF2B5EF4-FFF2-40B4-BE49-F238E27FC236}">
-                <a16:creationId xmlns:a16="http://schemas.microsoft.com/office/drawing/2014/main" id="{9FA2B019-4FBA-44BA-9146-708392435E0B}"/>
-              </a:ext>
-            </a:extLst>
-          </p:cNvPr>
-          <p:cNvPicPr>
-            <a:picLocks noChangeAspect="1"/>
-          </p:cNvPicPr>
-          <p:nvPr/>
-        </p:nvPicPr>
-        <p:blipFill>
-          <a:blip r:embed="rId2">
-            <a:extLst>
-              <a:ext uri="{28A0092B-C50C-407E-A947-70E740481C1C}">
-                <a14:useLocalDpi xmlns:a14="http://schemas.microsoft.com/office/drawing/2010/main" val="0"/>
-              </a:ext>
-            </a:extLst>
-          </a:blip>
-          <a:stretch>
-            <a:fillRect/>
-          </a:stretch>
-        </p:blipFill>
-        <p:spPr>
-          <a:xfrm>
-            <a:off x="3352795" y="1865415"/>
-            <a:ext cx="4306790" cy="4306790"/>
-          </a:xfrm>
-          <a:prstGeom prst="rect">
-            <a:avLst/>
-          </a:prstGeom>
-        </p:spPr>
-      </p:pic>
-    </p:spTree>
-    <p:extLst>
-      <p:ext uri="{BB962C8B-B14F-4D97-AF65-F5344CB8AC3E}">
-        <p14:creationId xmlns:p14="http://schemas.microsoft.com/office/powerpoint/2010/main" val="885078097"/>
       </p:ext>
     </p:extLst>
   </p:cSld>
@@ -13302,6 +13380,768 @@
 </p:sld>
 </file>
 
+<file path=ppt/slides/slide25.xml><?xml version="1.0" encoding="utf-8"?>
+<p:sld xmlns:a="http://schemas.openxmlformats.org/drawingml/2006/main" xmlns:r="http://schemas.openxmlformats.org/officeDocument/2006/relationships" xmlns:p="http://schemas.openxmlformats.org/presentationml/2006/main">
+  <p:cSld>
+    <p:spTree>
+      <p:nvGrpSpPr>
+        <p:cNvPr id="1" name=""/>
+        <p:cNvGrpSpPr/>
+        <p:nvPr/>
+      </p:nvGrpSpPr>
+      <p:grpSpPr>
+        <a:xfrm>
+          <a:off x="0" y="0"/>
+          <a:ext cx="0" cy="0"/>
+          <a:chOff x="0" y="0"/>
+          <a:chExt cx="0" cy="0"/>
+        </a:xfrm>
+      </p:grpSpPr>
+      <p:sp>
+        <p:nvSpPr>
+          <p:cNvPr id="2" name="Titel 1">
+            <a:extLst>
+              <a:ext uri="{FF2B5EF4-FFF2-40B4-BE49-F238E27FC236}">
+                <a16:creationId xmlns:a16="http://schemas.microsoft.com/office/drawing/2014/main" id="{FA2CCDF3-259C-9F49-E8B9-224C0396BD07}"/>
+              </a:ext>
+            </a:extLst>
+          </p:cNvPr>
+          <p:cNvSpPr>
+            <a:spLocks noGrp="1"/>
+          </p:cNvSpPr>
+          <p:nvPr>
+            <p:ph type="title"/>
+          </p:nvPr>
+        </p:nvSpPr>
+        <p:spPr/>
+        <p:txBody>
+          <a:bodyPr/>
+          <a:lstStyle/>
+          <a:p>
+            <a:endParaRPr lang="en-US"/>
+          </a:p>
+        </p:txBody>
+      </p:sp>
+      <p:pic>
+        <p:nvPicPr>
+          <p:cNvPr id="3" name="Grafik 2">
+            <a:extLst>
+              <a:ext uri="{FF2B5EF4-FFF2-40B4-BE49-F238E27FC236}">
+                <a16:creationId xmlns:a16="http://schemas.microsoft.com/office/drawing/2014/main" id="{7564CBC9-1416-B024-9A74-94543D40F9A3}"/>
+              </a:ext>
+            </a:extLst>
+          </p:cNvPr>
+          <p:cNvPicPr>
+            <a:picLocks noChangeAspect="1"/>
+          </p:cNvPicPr>
+          <p:nvPr/>
+        </p:nvPicPr>
+        <p:blipFill>
+          <a:blip r:embed="rId2"/>
+          <a:stretch>
+            <a:fillRect/>
+          </a:stretch>
+        </p:blipFill>
+        <p:spPr>
+          <a:xfrm>
+            <a:off x="591825" y="2669665"/>
+            <a:ext cx="11008349" cy="416435"/>
+          </a:xfrm>
+          <a:prstGeom prst="rect">
+            <a:avLst/>
+          </a:prstGeom>
+        </p:spPr>
+      </p:pic>
+    </p:spTree>
+    <p:extLst>
+      <p:ext uri="{BB962C8B-B14F-4D97-AF65-F5344CB8AC3E}">
+        <p14:creationId xmlns:p14="http://schemas.microsoft.com/office/powerpoint/2010/main" val="3230079903"/>
+      </p:ext>
+    </p:extLst>
+  </p:cSld>
+  <p:clrMapOvr>
+    <a:masterClrMapping/>
+  </p:clrMapOvr>
+</p:sld>
+</file>
+
+<file path=ppt/slides/slide26.xml><?xml version="1.0" encoding="utf-8"?>
+<p:sld xmlns:a="http://schemas.openxmlformats.org/drawingml/2006/main" xmlns:r="http://schemas.openxmlformats.org/officeDocument/2006/relationships" xmlns:p="http://schemas.openxmlformats.org/presentationml/2006/main">
+  <p:cSld>
+    <p:spTree>
+      <p:nvGrpSpPr>
+        <p:cNvPr id="1" name=""/>
+        <p:cNvGrpSpPr/>
+        <p:nvPr/>
+      </p:nvGrpSpPr>
+      <p:grpSpPr>
+        <a:xfrm>
+          <a:off x="0" y="0"/>
+          <a:ext cx="0" cy="0"/>
+          <a:chOff x="0" y="0"/>
+          <a:chExt cx="0" cy="0"/>
+        </a:xfrm>
+      </p:grpSpPr>
+      <p:sp>
+        <p:nvSpPr>
+          <p:cNvPr id="2" name="Titel 1">
+            <a:extLst>
+              <a:ext uri="{FF2B5EF4-FFF2-40B4-BE49-F238E27FC236}">
+                <a16:creationId xmlns:a16="http://schemas.microsoft.com/office/drawing/2014/main" id="{4F377489-3EB7-BB34-E5F8-FB2644A68D3C}"/>
+              </a:ext>
+            </a:extLst>
+          </p:cNvPr>
+          <p:cNvSpPr>
+            <a:spLocks noGrp="1"/>
+          </p:cNvSpPr>
+          <p:nvPr>
+            <p:ph type="title"/>
+          </p:nvPr>
+        </p:nvSpPr>
+        <p:spPr/>
+        <p:txBody>
+          <a:bodyPr/>
+          <a:lstStyle/>
+          <a:p>
+            <a:r>
+              <a:rPr lang="de-DE" dirty="0"/>
+              <a:t>STT</a:t>
+            </a:r>
+            <a:endParaRPr lang="en-US" dirty="0"/>
+          </a:p>
+        </p:txBody>
+      </p:sp>
+      <p:pic>
+        <p:nvPicPr>
+          <p:cNvPr id="4" name="Grafik 3">
+            <a:extLst>
+              <a:ext uri="{FF2B5EF4-FFF2-40B4-BE49-F238E27FC236}">
+                <a16:creationId xmlns:a16="http://schemas.microsoft.com/office/drawing/2014/main" id="{EE9A597D-A573-9A9C-67C5-CB9D6BDED87E}"/>
+              </a:ext>
+            </a:extLst>
+          </p:cNvPr>
+          <p:cNvPicPr>
+            <a:picLocks noChangeAspect="1"/>
+          </p:cNvPicPr>
+          <p:nvPr/>
+        </p:nvPicPr>
+        <p:blipFill>
+          <a:blip r:embed="rId2"/>
+          <a:stretch>
+            <a:fillRect/>
+          </a:stretch>
+        </p:blipFill>
+        <p:spPr>
+          <a:xfrm>
+            <a:off x="2348750" y="365125"/>
+            <a:ext cx="5601450" cy="2890109"/>
+          </a:xfrm>
+          <a:prstGeom prst="rect">
+            <a:avLst/>
+          </a:prstGeom>
+        </p:spPr>
+      </p:pic>
+      <p:pic>
+        <p:nvPicPr>
+          <p:cNvPr id="6" name="Grafik 5">
+            <a:extLst>
+              <a:ext uri="{FF2B5EF4-FFF2-40B4-BE49-F238E27FC236}">
+                <a16:creationId xmlns:a16="http://schemas.microsoft.com/office/drawing/2014/main" id="{AC9A4703-0A32-07A3-9F90-CBE3C121101A}"/>
+              </a:ext>
+            </a:extLst>
+          </p:cNvPr>
+          <p:cNvPicPr>
+            <a:picLocks noChangeAspect="1"/>
+          </p:cNvPicPr>
+          <p:nvPr/>
+        </p:nvPicPr>
+        <p:blipFill>
+          <a:blip r:embed="rId3"/>
+          <a:stretch>
+            <a:fillRect/>
+          </a:stretch>
+        </p:blipFill>
+        <p:spPr>
+          <a:xfrm>
+            <a:off x="2267509" y="3967891"/>
+            <a:ext cx="5520209" cy="2890109"/>
+          </a:xfrm>
+          <a:prstGeom prst="rect">
+            <a:avLst/>
+          </a:prstGeom>
+        </p:spPr>
+      </p:pic>
+      <p:sp>
+        <p:nvSpPr>
+          <p:cNvPr id="7" name="Textfeld 6">
+            <a:extLst>
+              <a:ext uri="{FF2B5EF4-FFF2-40B4-BE49-F238E27FC236}">
+                <a16:creationId xmlns:a16="http://schemas.microsoft.com/office/drawing/2014/main" id="{B1B8D915-8C41-BFFF-2FBE-71C453FBA075}"/>
+              </a:ext>
+            </a:extLst>
+          </p:cNvPr>
+          <p:cNvSpPr txBox="1"/>
+          <p:nvPr/>
+        </p:nvSpPr>
+        <p:spPr>
+          <a:xfrm>
+            <a:off x="3873125" y="3293334"/>
+            <a:ext cx="2552700" cy="646331"/>
+          </a:xfrm>
+          <a:prstGeom prst="rect">
+            <a:avLst/>
+          </a:prstGeom>
+          <a:noFill/>
+        </p:spPr>
+        <p:txBody>
+          <a:bodyPr wrap="square" rtlCol="0">
+            <a:spAutoFit/>
+          </a:bodyPr>
+          <a:lstStyle/>
+          <a:p>
+            <a:r>
+              <a:rPr lang="de-DE" dirty="0" err="1"/>
+              <a:t>Softmax</a:t>
+            </a:r>
+            <a:r>
+              <a:rPr lang="de-DE" dirty="0"/>
+              <a:t> </a:t>
+            </a:r>
+            <a:r>
+              <a:rPr lang="de-DE" dirty="0" err="1"/>
+              <a:t>along</a:t>
+            </a:r>
+            <a:r>
+              <a:rPr lang="de-DE" dirty="0"/>
+              <a:t> </a:t>
+            </a:r>
+            <a:r>
+              <a:rPr lang="de-DE" dirty="0" err="1"/>
+              <a:t>vocab</a:t>
+            </a:r>
+            <a:r>
+              <a:rPr lang="de-DE" dirty="0"/>
+              <a:t> </a:t>
+            </a:r>
+            <a:r>
+              <a:rPr lang="de-DE" dirty="0" err="1"/>
+              <a:t>dimension</a:t>
+            </a:r>
+            <a:endParaRPr lang="en-US" dirty="0"/>
+          </a:p>
+        </p:txBody>
+      </p:sp>
+    </p:spTree>
+    <p:extLst>
+      <p:ext uri="{BB962C8B-B14F-4D97-AF65-F5344CB8AC3E}">
+        <p14:creationId xmlns:p14="http://schemas.microsoft.com/office/powerpoint/2010/main" val="2659030694"/>
+      </p:ext>
+    </p:extLst>
+  </p:cSld>
+  <p:clrMapOvr>
+    <a:masterClrMapping/>
+  </p:clrMapOvr>
+</p:sld>
+</file>
+
+<file path=ppt/slides/slide27.xml><?xml version="1.0" encoding="utf-8"?>
+<p:sld xmlns:a="http://schemas.openxmlformats.org/drawingml/2006/main" xmlns:r="http://schemas.openxmlformats.org/officeDocument/2006/relationships" xmlns:p="http://schemas.openxmlformats.org/presentationml/2006/main">
+  <p:cSld>
+    <p:spTree>
+      <p:nvGrpSpPr>
+        <p:cNvPr id="1" name=""/>
+        <p:cNvGrpSpPr/>
+        <p:nvPr/>
+      </p:nvGrpSpPr>
+      <p:grpSpPr>
+        <a:xfrm>
+          <a:off x="0" y="0"/>
+          <a:ext cx="0" cy="0"/>
+          <a:chOff x="0" y="0"/>
+          <a:chExt cx="0" cy="0"/>
+        </a:xfrm>
+      </p:grpSpPr>
+      <p:sp>
+        <p:nvSpPr>
+          <p:cNvPr id="2" name="Titel 1">
+            <a:extLst>
+              <a:ext uri="{FF2B5EF4-FFF2-40B4-BE49-F238E27FC236}">
+                <a16:creationId xmlns:a16="http://schemas.microsoft.com/office/drawing/2014/main" id="{6CA0CC5A-11E6-53EB-E6D3-2BB68C5AE05D}"/>
+              </a:ext>
+            </a:extLst>
+          </p:cNvPr>
+          <p:cNvSpPr>
+            <a:spLocks noGrp="1"/>
+          </p:cNvSpPr>
+          <p:nvPr>
+            <p:ph type="title"/>
+          </p:nvPr>
+        </p:nvSpPr>
+        <p:spPr/>
+        <p:txBody>
+          <a:bodyPr/>
+          <a:lstStyle/>
+          <a:p>
+            <a:r>
+              <a:rPr lang="de-DE" dirty="0"/>
+              <a:t>STT – Approach 1</a:t>
+            </a:r>
+            <a:endParaRPr lang="en-US" dirty="0"/>
+          </a:p>
+        </p:txBody>
+      </p:sp>
+      <p:sp>
+        <p:nvSpPr>
+          <p:cNvPr id="4" name="Textfeld 3">
+            <a:extLst>
+              <a:ext uri="{FF2B5EF4-FFF2-40B4-BE49-F238E27FC236}">
+                <a16:creationId xmlns:a16="http://schemas.microsoft.com/office/drawing/2014/main" id="{7608A9E2-B05A-D10E-098E-39F26DDF4014}"/>
+              </a:ext>
+            </a:extLst>
+          </p:cNvPr>
+          <p:cNvSpPr txBox="1"/>
+          <p:nvPr/>
+        </p:nvSpPr>
+        <p:spPr>
+          <a:xfrm>
+            <a:off x="457199" y="1690688"/>
+            <a:ext cx="2730501" cy="646331"/>
+          </a:xfrm>
+          <a:prstGeom prst="rect">
+            <a:avLst/>
+          </a:prstGeom>
+          <a:noFill/>
+        </p:spPr>
+        <p:txBody>
+          <a:bodyPr wrap="square" rtlCol="0">
+            <a:spAutoFit/>
+          </a:bodyPr>
+          <a:lstStyle/>
+          <a:p>
+            <a:pPr marL="285750" indent="-285750">
+              <a:buFont typeface="Arial" panose="020B0604020202020204" pitchFamily="34" charset="0"/>
+              <a:buChar char="•"/>
+            </a:pPr>
+            <a:r>
+              <a:rPr lang="de-DE" dirty="0" err="1"/>
+              <a:t>Got</a:t>
+            </a:r>
+            <a:r>
+              <a:rPr lang="de-DE" dirty="0"/>
+              <a:t> </a:t>
+            </a:r>
+            <a:r>
+              <a:rPr lang="de-DE" dirty="0" err="1"/>
+              <a:t>phone</a:t>
+            </a:r>
+            <a:r>
+              <a:rPr lang="de-DE" dirty="0"/>
+              <a:t> </a:t>
+            </a:r>
+            <a:r>
+              <a:rPr lang="de-DE" dirty="0" err="1"/>
+              <a:t>segments</a:t>
+            </a:r>
+            <a:r>
+              <a:rPr lang="de-DE" dirty="0"/>
+              <a:t> </a:t>
+            </a:r>
+            <a:r>
+              <a:rPr lang="de-DE" dirty="0" err="1"/>
+              <a:t>from</a:t>
+            </a:r>
+            <a:r>
+              <a:rPr lang="de-DE" dirty="0"/>
+              <a:t> </a:t>
+            </a:r>
+            <a:r>
+              <a:rPr lang="de-DE" dirty="0" err="1"/>
+              <a:t>webmouse</a:t>
+            </a:r>
+            <a:endParaRPr lang="en-US" dirty="0"/>
+          </a:p>
+        </p:txBody>
+      </p:sp>
+      <p:pic>
+        <p:nvPicPr>
+          <p:cNvPr id="6" name="Grafik 5" descr="Ein Bild, das Screenshot, Farbigkeit, Rechteck, Text enthält.&#10;&#10;Automatisch generierte Beschreibung">
+            <a:extLst>
+              <a:ext uri="{FF2B5EF4-FFF2-40B4-BE49-F238E27FC236}">
+                <a16:creationId xmlns:a16="http://schemas.microsoft.com/office/drawing/2014/main" id="{3A8366B1-5958-75C7-1E6F-4D749B2128E5}"/>
+              </a:ext>
+            </a:extLst>
+          </p:cNvPr>
+          <p:cNvPicPr>
+            <a:picLocks noChangeAspect="1"/>
+          </p:cNvPicPr>
+          <p:nvPr/>
+        </p:nvPicPr>
+        <p:blipFill>
+          <a:blip r:embed="rId2">
+            <a:extLst>
+              <a:ext uri="{28A0092B-C50C-407E-A947-70E740481C1C}">
+                <a14:useLocalDpi xmlns:a14="http://schemas.microsoft.com/office/drawing/2010/main" val="0"/>
+              </a:ext>
+            </a:extLst>
+          </a:blip>
+          <a:stretch>
+            <a:fillRect/>
+          </a:stretch>
+        </p:blipFill>
+        <p:spPr>
+          <a:xfrm>
+            <a:off x="3340099" y="1257300"/>
+            <a:ext cx="8305801" cy="5537200"/>
+          </a:xfrm>
+          <a:prstGeom prst="rect">
+            <a:avLst/>
+          </a:prstGeom>
+        </p:spPr>
+      </p:pic>
+    </p:spTree>
+    <p:extLst>
+      <p:ext uri="{BB962C8B-B14F-4D97-AF65-F5344CB8AC3E}">
+        <p14:creationId xmlns:p14="http://schemas.microsoft.com/office/powerpoint/2010/main" val="2304022680"/>
+      </p:ext>
+    </p:extLst>
+  </p:cSld>
+  <p:clrMapOvr>
+    <a:masterClrMapping/>
+  </p:clrMapOvr>
+</p:sld>
+</file>
+
+<file path=ppt/slides/slide28.xml><?xml version="1.0" encoding="utf-8"?>
+<p:sld xmlns:a="http://schemas.openxmlformats.org/drawingml/2006/main" xmlns:r="http://schemas.openxmlformats.org/officeDocument/2006/relationships" xmlns:p="http://schemas.openxmlformats.org/presentationml/2006/main">
+  <p:cSld>
+    <p:spTree>
+      <p:nvGrpSpPr>
+        <p:cNvPr id="1" name="">
+          <a:extLst>
+            <a:ext uri="{FF2B5EF4-FFF2-40B4-BE49-F238E27FC236}">
+              <a16:creationId xmlns:a16="http://schemas.microsoft.com/office/drawing/2014/main" id="{1D127298-1F35-DDB7-9232-C7F318A8EC25}"/>
+            </a:ext>
+          </a:extLst>
+        </p:cNvPr>
+        <p:cNvGrpSpPr/>
+        <p:nvPr/>
+      </p:nvGrpSpPr>
+      <p:grpSpPr>
+        <a:xfrm>
+          <a:off x="0" y="0"/>
+          <a:ext cx="0" cy="0"/>
+          <a:chOff x="0" y="0"/>
+          <a:chExt cx="0" cy="0"/>
+        </a:xfrm>
+      </p:grpSpPr>
+      <p:sp>
+        <p:nvSpPr>
+          <p:cNvPr id="2" name="Titel 1">
+            <a:extLst>
+              <a:ext uri="{FF2B5EF4-FFF2-40B4-BE49-F238E27FC236}">
+                <a16:creationId xmlns:a16="http://schemas.microsoft.com/office/drawing/2014/main" id="{B814759B-30BC-3DC6-F90C-7E203E8B1D30}"/>
+              </a:ext>
+            </a:extLst>
+          </p:cNvPr>
+          <p:cNvSpPr>
+            <a:spLocks noGrp="1"/>
+          </p:cNvSpPr>
+          <p:nvPr>
+            <p:ph type="title"/>
+          </p:nvPr>
+        </p:nvSpPr>
+        <p:spPr/>
+        <p:txBody>
+          <a:bodyPr/>
+          <a:lstStyle/>
+          <a:p>
+            <a:r>
+              <a:rPr lang="de-DE" dirty="0"/>
+              <a:t>STT – Approach 1 – Problems:</a:t>
+            </a:r>
+            <a:endParaRPr lang="en-US" dirty="0"/>
+          </a:p>
+        </p:txBody>
+      </p:sp>
+      <p:pic>
+        <p:nvPicPr>
+          <p:cNvPr id="4" name="Grafik 3">
+            <a:extLst>
+              <a:ext uri="{FF2B5EF4-FFF2-40B4-BE49-F238E27FC236}">
+                <a16:creationId xmlns:a16="http://schemas.microsoft.com/office/drawing/2014/main" id="{5DACFB5A-47AA-00F5-4837-499645BE0887}"/>
+              </a:ext>
+            </a:extLst>
+          </p:cNvPr>
+          <p:cNvPicPr>
+            <a:picLocks noChangeAspect="1"/>
+          </p:cNvPicPr>
+          <p:nvPr/>
+        </p:nvPicPr>
+        <p:blipFill>
+          <a:blip r:embed="rId2"/>
+          <a:stretch>
+            <a:fillRect/>
+          </a:stretch>
+        </p:blipFill>
+        <p:spPr>
+          <a:xfrm>
+            <a:off x="4616523" y="1536700"/>
+            <a:ext cx="7470394" cy="5191857"/>
+          </a:xfrm>
+          <a:prstGeom prst="rect">
+            <a:avLst/>
+          </a:prstGeom>
+        </p:spPr>
+      </p:pic>
+      <p:pic>
+        <p:nvPicPr>
+          <p:cNvPr id="6" name="Grafik 5">
+            <a:extLst>
+              <a:ext uri="{FF2B5EF4-FFF2-40B4-BE49-F238E27FC236}">
+                <a16:creationId xmlns:a16="http://schemas.microsoft.com/office/drawing/2014/main" id="{3BC7DF13-C6A3-5577-4D67-0EDAA4547BB1}"/>
+              </a:ext>
+            </a:extLst>
+          </p:cNvPr>
+          <p:cNvPicPr>
+            <a:picLocks noChangeAspect="1"/>
+          </p:cNvPicPr>
+          <p:nvPr/>
+        </p:nvPicPr>
+        <p:blipFill>
+          <a:blip r:embed="rId3"/>
+          <a:stretch>
+            <a:fillRect/>
+          </a:stretch>
+        </p:blipFill>
+        <p:spPr>
+          <a:xfrm>
+            <a:off x="342900" y="3146303"/>
+            <a:ext cx="4036234" cy="2344859"/>
+          </a:xfrm>
+          <a:prstGeom prst="rect">
+            <a:avLst/>
+          </a:prstGeom>
+        </p:spPr>
+      </p:pic>
+      <p:sp>
+        <p:nvSpPr>
+          <p:cNvPr id="7" name="Textfeld 6">
+            <a:extLst>
+              <a:ext uri="{FF2B5EF4-FFF2-40B4-BE49-F238E27FC236}">
+                <a16:creationId xmlns:a16="http://schemas.microsoft.com/office/drawing/2014/main" id="{11332C5D-1B8D-8E16-A251-E754EF928F41}"/>
+              </a:ext>
+            </a:extLst>
+          </p:cNvPr>
+          <p:cNvSpPr txBox="1"/>
+          <p:nvPr/>
+        </p:nvSpPr>
+        <p:spPr>
+          <a:xfrm>
+            <a:off x="342900" y="2204404"/>
+            <a:ext cx="3911600" cy="369332"/>
+          </a:xfrm>
+          <a:prstGeom prst="rect">
+            <a:avLst/>
+          </a:prstGeom>
+          <a:noFill/>
+        </p:spPr>
+        <p:txBody>
+          <a:bodyPr wrap="square" rtlCol="0">
+            <a:spAutoFit/>
+          </a:bodyPr>
+          <a:lstStyle/>
+          <a:p>
+            <a:r>
+              <a:rPr lang="de-DE" dirty="0" err="1"/>
+              <a:t>Webmouse</a:t>
+            </a:r>
+            <a:r>
+              <a:rPr lang="de-DE" dirty="0"/>
+              <a:t> </a:t>
+            </a:r>
+            <a:r>
+              <a:rPr lang="de-DE" dirty="0" err="1"/>
+              <a:t>failed</a:t>
+            </a:r>
+            <a:r>
+              <a:rPr lang="de-DE" dirty="0"/>
+              <a:t> </a:t>
+            </a:r>
+            <a:r>
+              <a:rPr lang="de-DE" dirty="0" err="1"/>
+              <a:t>labeling</a:t>
+            </a:r>
+            <a:r>
+              <a:rPr lang="de-DE" dirty="0"/>
+              <a:t> </a:t>
+            </a:r>
+            <a:r>
+              <a:rPr lang="de-DE" dirty="0" err="1"/>
+              <a:t>the</a:t>
+            </a:r>
+            <a:r>
+              <a:rPr lang="de-DE" dirty="0"/>
+              <a:t> </a:t>
+            </a:r>
+            <a:r>
+              <a:rPr lang="de-DE" dirty="0" err="1"/>
+              <a:t>phones</a:t>
+            </a:r>
+            <a:endParaRPr lang="en-US" dirty="0"/>
+          </a:p>
+        </p:txBody>
+      </p:sp>
+    </p:spTree>
+    <p:extLst>
+      <p:ext uri="{BB962C8B-B14F-4D97-AF65-F5344CB8AC3E}">
+        <p14:creationId xmlns:p14="http://schemas.microsoft.com/office/powerpoint/2010/main" val="3119303849"/>
+      </p:ext>
+    </p:extLst>
+  </p:cSld>
+  <p:clrMapOvr>
+    <a:masterClrMapping/>
+  </p:clrMapOvr>
+</p:sld>
+</file>
+
+<file path=ppt/slides/slide29.xml><?xml version="1.0" encoding="utf-8"?>
+<p:sld xmlns:a="http://schemas.openxmlformats.org/drawingml/2006/main" xmlns:r="http://schemas.openxmlformats.org/officeDocument/2006/relationships" xmlns:p="http://schemas.openxmlformats.org/presentationml/2006/main">
+  <p:cSld>
+    <p:spTree>
+      <p:nvGrpSpPr>
+        <p:cNvPr id="1" name=""/>
+        <p:cNvGrpSpPr/>
+        <p:nvPr/>
+      </p:nvGrpSpPr>
+      <p:grpSpPr>
+        <a:xfrm>
+          <a:off x="0" y="0"/>
+          <a:ext cx="0" cy="0"/>
+          <a:chOff x="0" y="0"/>
+          <a:chExt cx="0" cy="0"/>
+        </a:xfrm>
+      </p:grpSpPr>
+      <p:sp>
+        <p:nvSpPr>
+          <p:cNvPr id="2" name="Titel 1">
+            <a:extLst>
+              <a:ext uri="{FF2B5EF4-FFF2-40B4-BE49-F238E27FC236}">
+                <a16:creationId xmlns:a16="http://schemas.microsoft.com/office/drawing/2014/main" id="{7CEF9255-7FB3-2B6F-46DD-08D01136672C}"/>
+              </a:ext>
+            </a:extLst>
+          </p:cNvPr>
+          <p:cNvSpPr>
+            <a:spLocks noGrp="1"/>
+          </p:cNvSpPr>
+          <p:nvPr>
+            <p:ph type="title"/>
+          </p:nvPr>
+        </p:nvSpPr>
+        <p:spPr/>
+        <p:txBody>
+          <a:bodyPr/>
+          <a:lstStyle/>
+          <a:p>
+            <a:r>
+              <a:rPr lang="de-DE" dirty="0"/>
+              <a:t>STT – Approach 2 – Attention relative</a:t>
+            </a:r>
+            <a:endParaRPr lang="en-US" dirty="0"/>
+          </a:p>
+        </p:txBody>
+      </p:sp>
+      <p:sp>
+        <p:nvSpPr>
+          <p:cNvPr id="6" name="Textfeld 5">
+            <a:extLst>
+              <a:ext uri="{FF2B5EF4-FFF2-40B4-BE49-F238E27FC236}">
+                <a16:creationId xmlns:a16="http://schemas.microsoft.com/office/drawing/2014/main" id="{B4CE6D28-FA22-AFB5-9C86-E9FDED8237E6}"/>
+              </a:ext>
+            </a:extLst>
+          </p:cNvPr>
+          <p:cNvSpPr txBox="1"/>
+          <p:nvPr/>
+        </p:nvSpPr>
+        <p:spPr>
+          <a:xfrm>
+            <a:off x="215900" y="1690688"/>
+            <a:ext cx="3479800" cy="923330"/>
+          </a:xfrm>
+          <a:prstGeom prst="rect">
+            <a:avLst/>
+          </a:prstGeom>
+          <a:noFill/>
+        </p:spPr>
+        <p:txBody>
+          <a:bodyPr wrap="square" rtlCol="0">
+            <a:spAutoFit/>
+          </a:bodyPr>
+          <a:lstStyle/>
+          <a:p>
+            <a:pPr marL="285750" indent="-285750">
+              <a:buFont typeface="Arial" panose="020B0604020202020204" pitchFamily="34" charset="0"/>
+              <a:buChar char="•"/>
+            </a:pPr>
+            <a:r>
+              <a:rPr lang="en-US" dirty="0"/>
+              <a:t>Weighted by the relative number of chars in the word</a:t>
+            </a:r>
+          </a:p>
+          <a:p>
+            <a:pPr marL="285750" indent="-285750">
+              <a:buFont typeface="Arial" panose="020B0604020202020204" pitchFamily="34" charset="0"/>
+              <a:buChar char="•"/>
+            </a:pPr>
+            <a:r>
+              <a:rPr lang="en-US" dirty="0"/>
+              <a:t>SCH and ST and not taken</a:t>
+            </a:r>
+          </a:p>
+        </p:txBody>
+      </p:sp>
+      <p:pic>
+        <p:nvPicPr>
+          <p:cNvPr id="8" name="Grafik 7">
+            <a:extLst>
+              <a:ext uri="{FF2B5EF4-FFF2-40B4-BE49-F238E27FC236}">
+                <a16:creationId xmlns:a16="http://schemas.microsoft.com/office/drawing/2014/main" id="{8CA56C8C-B62A-5CA4-F626-E38606F299A0}"/>
+              </a:ext>
+            </a:extLst>
+          </p:cNvPr>
+          <p:cNvPicPr>
+            <a:picLocks noChangeAspect="1"/>
+          </p:cNvPicPr>
+          <p:nvPr/>
+        </p:nvPicPr>
+        <p:blipFill>
+          <a:blip r:embed="rId2"/>
+          <a:stretch>
+            <a:fillRect/>
+          </a:stretch>
+        </p:blipFill>
+        <p:spPr>
+          <a:xfrm>
+            <a:off x="3682999" y="1374140"/>
+            <a:ext cx="7670801" cy="5369560"/>
+          </a:xfrm>
+          <a:prstGeom prst="rect">
+            <a:avLst/>
+          </a:prstGeom>
+        </p:spPr>
+      </p:pic>
+    </p:spTree>
+    <p:extLst>
+      <p:ext uri="{BB962C8B-B14F-4D97-AF65-F5344CB8AC3E}">
+        <p14:creationId xmlns:p14="http://schemas.microsoft.com/office/powerpoint/2010/main" val="1043435716"/>
+      </p:ext>
+    </p:extLst>
+  </p:cSld>
+  <p:clrMapOvr>
+    <a:masterClrMapping/>
+  </p:clrMapOvr>
+</p:sld>
+</file>
+
 <file path=ppt/slides/slide3.xml><?xml version="1.0" encoding="utf-8"?>
 <p:sld xmlns:a="http://schemas.openxmlformats.org/drawingml/2006/main" xmlns:r="http://schemas.openxmlformats.org/officeDocument/2006/relationships" xmlns:p="http://schemas.openxmlformats.org/presentationml/2006/main">
   <p:cSld>
@@ -13544,6 +14384,335 @@
     <p:extLst>
       <p:ext uri="{BB962C8B-B14F-4D97-AF65-F5344CB8AC3E}">
         <p14:creationId xmlns:p14="http://schemas.microsoft.com/office/powerpoint/2010/main" val="3927973085"/>
+      </p:ext>
+    </p:extLst>
+  </p:cSld>
+  <p:clrMapOvr>
+    <a:masterClrMapping/>
+  </p:clrMapOvr>
+</p:sld>
+</file>
+
+<file path=ppt/slides/slide30.xml><?xml version="1.0" encoding="utf-8"?>
+<p:sld xmlns:a="http://schemas.openxmlformats.org/drawingml/2006/main" xmlns:r="http://schemas.openxmlformats.org/officeDocument/2006/relationships" xmlns:p="http://schemas.openxmlformats.org/presentationml/2006/main">
+  <p:cSld>
+    <p:spTree>
+      <p:nvGrpSpPr>
+        <p:cNvPr id="1" name="">
+          <a:extLst>
+            <a:ext uri="{FF2B5EF4-FFF2-40B4-BE49-F238E27FC236}">
+              <a16:creationId xmlns:a16="http://schemas.microsoft.com/office/drawing/2014/main" id="{0C172180-83AD-BE45-1B0A-B07F3826ED58}"/>
+            </a:ext>
+          </a:extLst>
+        </p:cNvPr>
+        <p:cNvGrpSpPr/>
+        <p:nvPr/>
+      </p:nvGrpSpPr>
+      <p:grpSpPr>
+        <a:xfrm>
+          <a:off x="0" y="0"/>
+          <a:ext cx="0" cy="0"/>
+          <a:chOff x="0" y="0"/>
+          <a:chExt cx="0" cy="0"/>
+        </a:xfrm>
+      </p:grpSpPr>
+      <p:sp>
+        <p:nvSpPr>
+          <p:cNvPr id="2" name="Titel 1">
+            <a:extLst>
+              <a:ext uri="{FF2B5EF4-FFF2-40B4-BE49-F238E27FC236}">
+                <a16:creationId xmlns:a16="http://schemas.microsoft.com/office/drawing/2014/main" id="{E6805EC8-DFD0-D33D-6CD3-C14CDF33DE14}"/>
+              </a:ext>
+            </a:extLst>
+          </p:cNvPr>
+          <p:cNvSpPr>
+            <a:spLocks noGrp="1"/>
+          </p:cNvSpPr>
+          <p:nvPr>
+            <p:ph type="title"/>
+          </p:nvPr>
+        </p:nvSpPr>
+        <p:spPr/>
+        <p:txBody>
+          <a:bodyPr/>
+          <a:lstStyle/>
+          <a:p>
+            <a:r>
+              <a:rPr lang="de-DE" dirty="0"/>
+              <a:t>STT – Approach 2 – Problems</a:t>
+            </a:r>
+            <a:endParaRPr lang="en-US" dirty="0"/>
+          </a:p>
+        </p:txBody>
+      </p:sp>
+      <p:pic>
+        <p:nvPicPr>
+          <p:cNvPr id="7" name="Grafik 6">
+            <a:extLst>
+              <a:ext uri="{FF2B5EF4-FFF2-40B4-BE49-F238E27FC236}">
+                <a16:creationId xmlns:a16="http://schemas.microsoft.com/office/drawing/2014/main" id="{DD032F7D-2E38-E3E4-949E-B3812F485C58}"/>
+              </a:ext>
+            </a:extLst>
+          </p:cNvPr>
+          <p:cNvPicPr>
+            <a:picLocks noChangeAspect="1"/>
+          </p:cNvPicPr>
+          <p:nvPr/>
+        </p:nvPicPr>
+        <p:blipFill>
+          <a:blip r:embed="rId2"/>
+          <a:stretch>
+            <a:fillRect/>
+          </a:stretch>
+        </p:blipFill>
+        <p:spPr>
+          <a:xfrm>
+            <a:off x="3223444" y="1628775"/>
+            <a:ext cx="6885143" cy="4864100"/>
+          </a:xfrm>
+          <a:prstGeom prst="rect">
+            <a:avLst/>
+          </a:prstGeom>
+        </p:spPr>
+      </p:pic>
+      <p:sp>
+        <p:nvSpPr>
+          <p:cNvPr id="8" name="Textfeld 7">
+            <a:extLst>
+              <a:ext uri="{FF2B5EF4-FFF2-40B4-BE49-F238E27FC236}">
+                <a16:creationId xmlns:a16="http://schemas.microsoft.com/office/drawing/2014/main" id="{AAEC1ECA-72A0-32E6-469A-312E93B59D76}"/>
+              </a:ext>
+            </a:extLst>
+          </p:cNvPr>
+          <p:cNvSpPr txBox="1"/>
+          <p:nvPr/>
+        </p:nvSpPr>
+        <p:spPr>
+          <a:xfrm>
+            <a:off x="279400" y="1628775"/>
+            <a:ext cx="2146300" cy="1200329"/>
+          </a:xfrm>
+          <a:prstGeom prst="rect">
+            <a:avLst/>
+          </a:prstGeom>
+          <a:noFill/>
+        </p:spPr>
+        <p:txBody>
+          <a:bodyPr wrap="square" rtlCol="0">
+            <a:spAutoFit/>
+          </a:bodyPr>
+          <a:lstStyle/>
+          <a:p>
+            <a:pPr marL="285750" indent="-285750">
+              <a:buFont typeface="Arial" panose="020B0604020202020204" pitchFamily="34" charset="0"/>
+              <a:buChar char="•"/>
+            </a:pPr>
+            <a:r>
+              <a:rPr lang="de-DE" dirty="0" err="1"/>
+              <a:t>Often</a:t>
+            </a:r>
+            <a:r>
+              <a:rPr lang="de-DE" dirty="0"/>
+              <a:t> </a:t>
+            </a:r>
+            <a:r>
+              <a:rPr lang="de-DE" dirty="0" err="1"/>
+              <a:t>doesn‘t</a:t>
+            </a:r>
+            <a:r>
+              <a:rPr lang="de-DE" dirty="0"/>
+              <a:t> </a:t>
+            </a:r>
+            <a:r>
+              <a:rPr lang="de-DE" dirty="0" err="1"/>
+              <a:t>get</a:t>
+            </a:r>
+            <a:r>
+              <a:rPr lang="de-DE" dirty="0"/>
+              <a:t> </a:t>
+            </a:r>
+            <a:r>
+              <a:rPr lang="de-DE" dirty="0" err="1"/>
+              <a:t>right</a:t>
+            </a:r>
+            <a:r>
+              <a:rPr lang="de-DE" dirty="0"/>
+              <a:t> </a:t>
+            </a:r>
+            <a:r>
+              <a:rPr lang="de-DE" dirty="0" err="1"/>
+              <a:t>part</a:t>
+            </a:r>
+            <a:r>
+              <a:rPr lang="de-DE" dirty="0"/>
+              <a:t> </a:t>
+            </a:r>
+            <a:r>
+              <a:rPr lang="de-DE" dirty="0" err="1"/>
+              <a:t>because</a:t>
+            </a:r>
+            <a:r>
+              <a:rPr lang="de-DE" dirty="0"/>
+              <a:t> </a:t>
+            </a:r>
+            <a:r>
+              <a:rPr lang="de-DE" dirty="0" err="1"/>
+              <a:t>of</a:t>
+            </a:r>
+            <a:r>
+              <a:rPr lang="de-DE" dirty="0"/>
+              <a:t> </a:t>
+            </a:r>
+            <a:r>
+              <a:rPr lang="de-DE" dirty="0" err="1"/>
+              <a:t>forced</a:t>
+            </a:r>
+            <a:r>
+              <a:rPr lang="de-DE" dirty="0"/>
+              <a:t> </a:t>
+            </a:r>
+            <a:r>
+              <a:rPr lang="de-DE" dirty="0" err="1"/>
+              <a:t>alignment</a:t>
+            </a:r>
+            <a:endParaRPr lang="en-US" dirty="0"/>
+          </a:p>
+        </p:txBody>
+      </p:sp>
+    </p:spTree>
+    <p:extLst>
+      <p:ext uri="{BB962C8B-B14F-4D97-AF65-F5344CB8AC3E}">
+        <p14:creationId xmlns:p14="http://schemas.microsoft.com/office/powerpoint/2010/main" val="3389828515"/>
+      </p:ext>
+    </p:extLst>
+  </p:cSld>
+  <p:clrMapOvr>
+    <a:masterClrMapping/>
+  </p:clrMapOvr>
+</p:sld>
+</file>
+
+<file path=ppt/slides/slide31.xml><?xml version="1.0" encoding="utf-8"?>
+<p:sld xmlns:a="http://schemas.openxmlformats.org/drawingml/2006/main" xmlns:r="http://schemas.openxmlformats.org/officeDocument/2006/relationships" xmlns:p="http://schemas.openxmlformats.org/presentationml/2006/main">
+  <p:cSld>
+    <p:spTree>
+      <p:nvGrpSpPr>
+        <p:cNvPr id="1" name=""/>
+        <p:cNvGrpSpPr/>
+        <p:nvPr/>
+      </p:nvGrpSpPr>
+      <p:grpSpPr>
+        <a:xfrm>
+          <a:off x="0" y="0"/>
+          <a:ext cx="0" cy="0"/>
+          <a:chOff x="0" y="0"/>
+          <a:chExt cx="0" cy="0"/>
+        </a:xfrm>
+      </p:grpSpPr>
+      <p:sp>
+        <p:nvSpPr>
+          <p:cNvPr id="2" name="Titel 1">
+            <a:extLst>
+              <a:ext uri="{FF2B5EF4-FFF2-40B4-BE49-F238E27FC236}">
+                <a16:creationId xmlns:a16="http://schemas.microsoft.com/office/drawing/2014/main" id="{81D457E7-FB6C-166C-4786-D08891B58DF1}"/>
+              </a:ext>
+            </a:extLst>
+          </p:cNvPr>
+          <p:cNvSpPr>
+            <a:spLocks noGrp="1"/>
+          </p:cNvSpPr>
+          <p:nvPr>
+            <p:ph type="title"/>
+          </p:nvPr>
+        </p:nvSpPr>
+        <p:spPr/>
+        <p:txBody>
+          <a:bodyPr/>
+          <a:lstStyle/>
+          <a:p>
+            <a:r>
+              <a:rPr lang="de-DE" dirty="0"/>
+              <a:t>Bimodal </a:t>
+            </a:r>
+            <a:r>
+              <a:rPr lang="de-DE" dirty="0" err="1"/>
+              <a:t>view</a:t>
+            </a:r>
+            <a:endParaRPr lang="en-US" dirty="0"/>
+          </a:p>
+        </p:txBody>
+      </p:sp>
+    </p:spTree>
+    <p:extLst>
+      <p:ext uri="{BB962C8B-B14F-4D97-AF65-F5344CB8AC3E}">
+        <p14:creationId xmlns:p14="http://schemas.microsoft.com/office/powerpoint/2010/main" val="2632012452"/>
+      </p:ext>
+    </p:extLst>
+  </p:cSld>
+  <p:clrMapOvr>
+    <a:masterClrMapping/>
+  </p:clrMapOvr>
+</p:sld>
+</file>
+
+<file path=ppt/slides/slide32.xml><?xml version="1.0" encoding="utf-8"?>
+<p:sld xmlns:a="http://schemas.openxmlformats.org/drawingml/2006/main" xmlns:r="http://schemas.openxmlformats.org/officeDocument/2006/relationships" xmlns:p="http://schemas.openxmlformats.org/presentationml/2006/main">
+  <p:cSld>
+    <p:spTree>
+      <p:nvGrpSpPr>
+        <p:cNvPr id="1" name=""/>
+        <p:cNvGrpSpPr/>
+        <p:nvPr/>
+      </p:nvGrpSpPr>
+      <p:grpSpPr>
+        <a:xfrm>
+          <a:off x="0" y="0"/>
+          <a:ext cx="0" cy="0"/>
+          <a:chOff x="0" y="0"/>
+          <a:chExt cx="0" cy="0"/>
+        </a:xfrm>
+      </p:grpSpPr>
+      <p:sp>
+        <p:nvSpPr>
+          <p:cNvPr id="2" name="Titel 1">
+            <a:extLst>
+              <a:ext uri="{FF2B5EF4-FFF2-40B4-BE49-F238E27FC236}">
+                <a16:creationId xmlns:a16="http://schemas.microsoft.com/office/drawing/2014/main" id="{21F741C4-AB14-0EEA-9BD2-13C5D63840AF}"/>
+              </a:ext>
+            </a:extLst>
+          </p:cNvPr>
+          <p:cNvSpPr>
+            <a:spLocks noGrp="1"/>
+          </p:cNvSpPr>
+          <p:nvPr>
+            <p:ph type="title"/>
+          </p:nvPr>
+        </p:nvSpPr>
+        <p:spPr/>
+        <p:txBody>
+          <a:bodyPr/>
+          <a:lstStyle/>
+          <a:p>
+            <a:r>
+              <a:rPr lang="de-DE" dirty="0"/>
+              <a:t>Training on </a:t>
+            </a:r>
+            <a:r>
+              <a:rPr lang="de-DE" dirty="0" err="1"/>
+              <a:t>heatmap</a:t>
+            </a:r>
+            <a:r>
+              <a:rPr lang="de-DE" dirty="0"/>
+              <a:t>.</a:t>
+            </a:r>
+            <a:endParaRPr lang="en-US" dirty="0"/>
+          </a:p>
+        </p:txBody>
+      </p:sp>
+    </p:spTree>
+    <p:extLst>
+      <p:ext uri="{BB962C8B-B14F-4D97-AF65-F5344CB8AC3E}">
+        <p14:creationId xmlns:p14="http://schemas.microsoft.com/office/powerpoint/2010/main" val="2154113216"/>
       </p:ext>
     </p:extLst>
   </p:cSld>

</xml_diff>

<commit_message>
added a new bimodal plot to train logistic reg and also added a hidden feature extraction and fid calculation to cpp.py
</commit_message>
<xml_diff>
--- a/Interim report 2.pptx
+++ b/Interim report 2.pptx
@@ -5453,7 +5453,7 @@
           <a:p>
             <a:fld id="{7A90B0C3-ED28-445D-8A9D-8679C44E937E}" type="datetimeFigureOut">
               <a:rPr lang="en-US" smtClean="0"/>
-              <a:t>1/20/2025</a:t>
+              <a:t>1/21/2025</a:t>
             </a:fld>
             <a:endParaRPr lang="en-US"/>
           </a:p>
@@ -6937,7 +6937,7 @@
           <a:p>
             <a:fld id="{AC6F5925-0E43-4417-92CA-17A233A7567E}" type="datetimeFigureOut">
               <a:rPr lang="en-US" smtClean="0"/>
-              <a:t>1/20/2025</a:t>
+              <a:t>1/21/2025</a:t>
             </a:fld>
             <a:endParaRPr lang="en-US"/>
           </a:p>
@@ -7137,7 +7137,7 @@
           <a:p>
             <a:fld id="{AC6F5925-0E43-4417-92CA-17A233A7567E}" type="datetimeFigureOut">
               <a:rPr lang="en-US" smtClean="0"/>
-              <a:t>1/20/2025</a:t>
+              <a:t>1/21/2025</a:t>
             </a:fld>
             <a:endParaRPr lang="en-US"/>
           </a:p>
@@ -7347,7 +7347,7 @@
           <a:p>
             <a:fld id="{AC6F5925-0E43-4417-92CA-17A233A7567E}" type="datetimeFigureOut">
               <a:rPr lang="en-US" smtClean="0"/>
-              <a:t>1/20/2025</a:t>
+              <a:t>1/21/2025</a:t>
             </a:fld>
             <a:endParaRPr lang="en-US"/>
           </a:p>
@@ -7547,7 +7547,7 @@
           <a:p>
             <a:fld id="{AC6F5925-0E43-4417-92CA-17A233A7567E}" type="datetimeFigureOut">
               <a:rPr lang="en-US" smtClean="0"/>
-              <a:t>1/20/2025</a:t>
+              <a:t>1/21/2025</a:t>
             </a:fld>
             <a:endParaRPr lang="en-US"/>
           </a:p>
@@ -7823,7 +7823,7 @@
           <a:p>
             <a:fld id="{AC6F5925-0E43-4417-92CA-17A233A7567E}" type="datetimeFigureOut">
               <a:rPr lang="en-US" smtClean="0"/>
-              <a:t>1/20/2025</a:t>
+              <a:t>1/21/2025</a:t>
             </a:fld>
             <a:endParaRPr lang="en-US"/>
           </a:p>
@@ -8091,7 +8091,7 @@
           <a:p>
             <a:fld id="{AC6F5925-0E43-4417-92CA-17A233A7567E}" type="datetimeFigureOut">
               <a:rPr lang="en-US" smtClean="0"/>
-              <a:t>1/20/2025</a:t>
+              <a:t>1/21/2025</a:t>
             </a:fld>
             <a:endParaRPr lang="en-US"/>
           </a:p>
@@ -8506,7 +8506,7 @@
           <a:p>
             <a:fld id="{AC6F5925-0E43-4417-92CA-17A233A7567E}" type="datetimeFigureOut">
               <a:rPr lang="en-US" smtClean="0"/>
-              <a:t>1/20/2025</a:t>
+              <a:t>1/21/2025</a:t>
             </a:fld>
             <a:endParaRPr lang="en-US"/>
           </a:p>
@@ -8648,7 +8648,7 @@
           <a:p>
             <a:fld id="{AC6F5925-0E43-4417-92CA-17A233A7567E}" type="datetimeFigureOut">
               <a:rPr lang="en-US" smtClean="0"/>
-              <a:t>1/20/2025</a:t>
+              <a:t>1/21/2025</a:t>
             </a:fld>
             <a:endParaRPr lang="en-US"/>
           </a:p>
@@ -8761,7 +8761,7 @@
           <a:p>
             <a:fld id="{AC6F5925-0E43-4417-92CA-17A233A7567E}" type="datetimeFigureOut">
               <a:rPr lang="en-US" smtClean="0"/>
-              <a:t>1/20/2025</a:t>
+              <a:t>1/21/2025</a:t>
             </a:fld>
             <a:endParaRPr lang="en-US"/>
           </a:p>
@@ -9074,7 +9074,7 @@
           <a:p>
             <a:fld id="{AC6F5925-0E43-4417-92CA-17A233A7567E}" type="datetimeFigureOut">
               <a:rPr lang="en-US" smtClean="0"/>
-              <a:t>1/20/2025</a:t>
+              <a:t>1/21/2025</a:t>
             </a:fld>
             <a:endParaRPr lang="en-US"/>
           </a:p>
@@ -9363,7 +9363,7 @@
           <a:p>
             <a:fld id="{AC6F5925-0E43-4417-92CA-17A233A7567E}" type="datetimeFigureOut">
               <a:rPr lang="en-US" smtClean="0"/>
-              <a:t>1/20/2025</a:t>
+              <a:t>1/21/2025</a:t>
             </a:fld>
             <a:endParaRPr lang="en-US"/>
           </a:p>
@@ -9606,7 +9606,7 @@
           <a:p>
             <a:fld id="{AC6F5925-0E43-4417-92CA-17A233A7567E}" type="datetimeFigureOut">
               <a:rPr lang="en-US" smtClean="0"/>
-              <a:t>1/20/2025</a:t>
+              <a:t>1/21/2025</a:t>
             </a:fld>
             <a:endParaRPr lang="en-US"/>
           </a:p>
@@ -13885,8 +13885,8 @@
         </p:blipFill>
         <p:spPr>
           <a:xfrm>
-            <a:off x="4616523" y="1536700"/>
-            <a:ext cx="7470394" cy="5191857"/>
+            <a:off x="4607626" y="1536700"/>
+            <a:ext cx="7479291" cy="5198040"/>
           </a:xfrm>
           <a:prstGeom prst="rect">
             <a:avLst/>

</xml_diff>

<commit_message>
added models for training in model.py
</commit_message>
<xml_diff>
--- a/Interim report 2.pptx
+++ b/Interim report 2.pptx
@@ -149,7 +149,7 @@
 <file path=ppt/revisionInfo.xml><?xml version="1.0" encoding="utf-8"?>
 <p1510:revInfo xmlns:a="http://schemas.openxmlformats.org/drawingml/2006/main" xmlns:r="http://schemas.openxmlformats.org/officeDocument/2006/relationships" xmlns:p1510="http://schemas.microsoft.com/office/powerpoint/2015/10/main">
   <p1510:revLst>
-    <p1510:client id="{0CFA2A2E-46D0-42F7-A6D8-B16498946566}" v="25" dt="2025-01-20T09:43:48.774"/>
+    <p1510:client id="{0CFA2A2E-46D0-42F7-A6D8-B16498946566}" v="26" dt="2025-01-20T18:11:44.966"/>
   </p1510:revLst>
 </p1510:revInfo>
 </file>
@@ -159,7 +159,7 @@
   <pc:docChgLst>
     <pc:chgData name="Florian Gritsch" userId="6461bc0e-c9be-4bd0-a028-abdbd39772c1" providerId="ADAL" clId="{0CFA2A2E-46D0-42F7-A6D8-B16498946566}"/>
     <pc:docChg chg="undo custSel addSld delSld modSld sldOrd">
-      <pc:chgData name="Florian Gritsch" userId="6461bc0e-c9be-4bd0-a028-abdbd39772c1" providerId="ADAL" clId="{0CFA2A2E-46D0-42F7-A6D8-B16498946566}" dt="2025-01-20T13:14:33.988" v="2954" actId="20577"/>
+      <pc:chgData name="Florian Gritsch" userId="6461bc0e-c9be-4bd0-a028-abdbd39772c1" providerId="ADAL" clId="{0CFA2A2E-46D0-42F7-A6D8-B16498946566}" dt="2025-01-20T18:12:00.963" v="2974" actId="20577"/>
       <pc:docMkLst>
         <pc:docMk/>
       </pc:docMkLst>
@@ -1056,8 +1056,8 @@
           </ac:picMkLst>
         </pc:picChg>
       </pc:sldChg>
-      <pc:sldChg chg="modSp new mod">
-        <pc:chgData name="Florian Gritsch" userId="6461bc0e-c9be-4bd0-a028-abdbd39772c1" providerId="ADAL" clId="{0CFA2A2E-46D0-42F7-A6D8-B16498946566}" dt="2025-01-20T13:14:23.581" v="2941" actId="20577"/>
+      <pc:sldChg chg="addSp modSp new mod">
+        <pc:chgData name="Florian Gritsch" userId="6461bc0e-c9be-4bd0-a028-abdbd39772c1" providerId="ADAL" clId="{0CFA2A2E-46D0-42F7-A6D8-B16498946566}" dt="2025-01-20T18:12:00.963" v="2974" actId="20577"/>
         <pc:sldMkLst>
           <pc:docMk/>
           <pc:sldMk cId="2154113216" sldId="289"/>
@@ -1068,6 +1068,14 @@
             <pc:docMk/>
             <pc:sldMk cId="2154113216" sldId="289"/>
             <ac:spMk id="2" creationId="{21F741C4-AB14-0EEA-9BD2-13C5D63840AF}"/>
+          </ac:spMkLst>
+        </pc:spChg>
+        <pc:spChg chg="add mod">
+          <ac:chgData name="Florian Gritsch" userId="6461bc0e-c9be-4bd0-a028-abdbd39772c1" providerId="ADAL" clId="{0CFA2A2E-46D0-42F7-A6D8-B16498946566}" dt="2025-01-20T18:12:00.963" v="2974" actId="20577"/>
+          <ac:spMkLst>
+            <pc:docMk/>
+            <pc:sldMk cId="2154113216" sldId="289"/>
+            <ac:spMk id="3" creationId="{1FCF3636-1FF7-F239-8073-83A58CCFE681}"/>
           </ac:spMkLst>
         </pc:spChg>
       </pc:sldChg>
@@ -14709,6 +14717,50 @@
           </a:p>
         </p:txBody>
       </p:sp>
+      <p:sp>
+        <p:nvSpPr>
+          <p:cNvPr id="3" name="Textfeld 2">
+            <a:extLst>
+              <a:ext uri="{FF2B5EF4-FFF2-40B4-BE49-F238E27FC236}">
+                <a16:creationId xmlns:a16="http://schemas.microsoft.com/office/drawing/2014/main" id="{1FCF3636-1FF7-F239-8073-83A58CCFE681}"/>
+              </a:ext>
+            </a:extLst>
+          </p:cNvPr>
+          <p:cNvSpPr txBox="1"/>
+          <p:nvPr/>
+        </p:nvSpPr>
+        <p:spPr>
+          <a:xfrm>
+            <a:off x="1193074" y="2403566"/>
+            <a:ext cx="7080069" cy="369332"/>
+          </a:xfrm>
+          <a:prstGeom prst="rect">
+            <a:avLst/>
+          </a:prstGeom>
+          <a:noFill/>
+        </p:spPr>
+        <p:txBody>
+          <a:bodyPr wrap="square" rtlCol="0">
+            <a:spAutoFit/>
+          </a:bodyPr>
+          <a:lstStyle/>
+          <a:p>
+            <a:r>
+              <a:rPr lang="de-DE" dirty="0"/>
+              <a:t>Mean 0.5595994632236891 </a:t>
+            </a:r>
+            <a:r>
+              <a:rPr lang="de-DE" dirty="0" err="1"/>
+              <a:t>std</a:t>
+            </a:r>
+            <a:r>
+              <a:rPr lang="de-DE"/>
+              <a:t> 0.08789908058262823</a:t>
+            </a:r>
+            <a:endParaRPr lang="en-US" dirty="0"/>
+          </a:p>
+        </p:txBody>
+      </p:sp>
     </p:spTree>
     <p:extLst>
       <p:ext uri="{BB962C8B-B14F-4D97-AF65-F5344CB8AC3E}">

</xml_diff>

<commit_message>
created script for attention maos
</commit_message>
<xml_diff>
--- a/Interim report 2.pptx
+++ b/Interim report 2.pptx
@@ -5,7 +5,7 @@
     <p:sldMasterId id="2147483648" r:id="rId1"/>
   </p:sldMasterIdLst>
   <p:notesMasterIdLst>
-    <p:notesMasterId r:id="rId34"/>
+    <p:notesMasterId r:id="rId33"/>
   </p:notesMasterIdLst>
   <p:sldIdLst>
     <p:sldId id="256" r:id="rId2"/>
@@ -38,8 +38,7 @@
     <p:sldId id="284" r:id="rId29"/>
     <p:sldId id="283" r:id="rId30"/>
     <p:sldId id="287" r:id="rId31"/>
-    <p:sldId id="290" r:id="rId32"/>
-    <p:sldId id="289" r:id="rId33"/>
+    <p:sldId id="289" r:id="rId32"/>
   </p:sldIdLst>
   <p:sldSz cx="12192000" cy="6858000"/>
   <p:notesSz cx="6858000" cy="9144000"/>
@@ -5461,7 +5460,7 @@
           <a:p>
             <a:fld id="{7A90B0C3-ED28-445D-8A9D-8679C44E937E}" type="datetimeFigureOut">
               <a:rPr lang="en-US" smtClean="0"/>
-              <a:t>1/20/2025</a:t>
+              <a:t>1/31/2025</a:t>
             </a:fld>
             <a:endParaRPr lang="en-US"/>
           </a:p>
@@ -6945,7 +6944,7 @@
           <a:p>
             <a:fld id="{AC6F5925-0E43-4417-92CA-17A233A7567E}" type="datetimeFigureOut">
               <a:rPr lang="en-US" smtClean="0"/>
-              <a:t>1/20/2025</a:t>
+              <a:t>1/31/2025</a:t>
             </a:fld>
             <a:endParaRPr lang="en-US"/>
           </a:p>
@@ -7145,7 +7144,7 @@
           <a:p>
             <a:fld id="{AC6F5925-0E43-4417-92CA-17A233A7567E}" type="datetimeFigureOut">
               <a:rPr lang="en-US" smtClean="0"/>
-              <a:t>1/20/2025</a:t>
+              <a:t>1/31/2025</a:t>
             </a:fld>
             <a:endParaRPr lang="en-US"/>
           </a:p>
@@ -7355,7 +7354,7 @@
           <a:p>
             <a:fld id="{AC6F5925-0E43-4417-92CA-17A233A7567E}" type="datetimeFigureOut">
               <a:rPr lang="en-US" smtClean="0"/>
-              <a:t>1/20/2025</a:t>
+              <a:t>1/31/2025</a:t>
             </a:fld>
             <a:endParaRPr lang="en-US"/>
           </a:p>
@@ -7555,7 +7554,7 @@
           <a:p>
             <a:fld id="{AC6F5925-0E43-4417-92CA-17A233A7567E}" type="datetimeFigureOut">
               <a:rPr lang="en-US" smtClean="0"/>
-              <a:t>1/20/2025</a:t>
+              <a:t>1/31/2025</a:t>
             </a:fld>
             <a:endParaRPr lang="en-US"/>
           </a:p>
@@ -7831,7 +7830,7 @@
           <a:p>
             <a:fld id="{AC6F5925-0E43-4417-92CA-17A233A7567E}" type="datetimeFigureOut">
               <a:rPr lang="en-US" smtClean="0"/>
-              <a:t>1/20/2025</a:t>
+              <a:t>1/31/2025</a:t>
             </a:fld>
             <a:endParaRPr lang="en-US"/>
           </a:p>
@@ -8099,7 +8098,7 @@
           <a:p>
             <a:fld id="{AC6F5925-0E43-4417-92CA-17A233A7567E}" type="datetimeFigureOut">
               <a:rPr lang="en-US" smtClean="0"/>
-              <a:t>1/20/2025</a:t>
+              <a:t>1/31/2025</a:t>
             </a:fld>
             <a:endParaRPr lang="en-US"/>
           </a:p>
@@ -8514,7 +8513,7 @@
           <a:p>
             <a:fld id="{AC6F5925-0E43-4417-92CA-17A233A7567E}" type="datetimeFigureOut">
               <a:rPr lang="en-US" smtClean="0"/>
-              <a:t>1/20/2025</a:t>
+              <a:t>1/31/2025</a:t>
             </a:fld>
             <a:endParaRPr lang="en-US"/>
           </a:p>
@@ -8656,7 +8655,7 @@
           <a:p>
             <a:fld id="{AC6F5925-0E43-4417-92CA-17A233A7567E}" type="datetimeFigureOut">
               <a:rPr lang="en-US" smtClean="0"/>
-              <a:t>1/20/2025</a:t>
+              <a:t>1/31/2025</a:t>
             </a:fld>
             <a:endParaRPr lang="en-US"/>
           </a:p>
@@ -8769,7 +8768,7 @@
           <a:p>
             <a:fld id="{AC6F5925-0E43-4417-92CA-17A233A7567E}" type="datetimeFigureOut">
               <a:rPr lang="en-US" smtClean="0"/>
-              <a:t>1/20/2025</a:t>
+              <a:t>1/31/2025</a:t>
             </a:fld>
             <a:endParaRPr lang="en-US"/>
           </a:p>
@@ -9082,7 +9081,7 @@
           <a:p>
             <a:fld id="{AC6F5925-0E43-4417-92CA-17A233A7567E}" type="datetimeFigureOut">
               <a:rPr lang="en-US" smtClean="0"/>
-              <a:t>1/20/2025</a:t>
+              <a:t>1/31/2025</a:t>
             </a:fld>
             <a:endParaRPr lang="en-US"/>
           </a:p>
@@ -9371,7 +9370,7 @@
           <a:p>
             <a:fld id="{AC6F5925-0E43-4417-92CA-17A233A7567E}" type="datetimeFigureOut">
               <a:rPr lang="en-US" smtClean="0"/>
-              <a:t>1/20/2025</a:t>
+              <a:t>1/31/2025</a:t>
             </a:fld>
             <a:endParaRPr lang="en-US"/>
           </a:p>
@@ -9614,7 +9613,7 @@
           <a:p>
             <a:fld id="{AC6F5925-0E43-4417-92CA-17A233A7567E}" type="datetimeFigureOut">
               <a:rPr lang="en-US" smtClean="0"/>
-              <a:t>1/20/2025</a:t>
+              <a:t>1/31/2025</a:t>
             </a:fld>
             <a:endParaRPr lang="en-US"/>
           </a:p>
@@ -14622,7 +14621,7 @@
           <p:cNvPr id="2" name="Titel 1">
             <a:extLst>
               <a:ext uri="{FF2B5EF4-FFF2-40B4-BE49-F238E27FC236}">
-                <a16:creationId xmlns:a16="http://schemas.microsoft.com/office/drawing/2014/main" id="{81D457E7-FB6C-166C-4786-D08891B58DF1}"/>
+                <a16:creationId xmlns:a16="http://schemas.microsoft.com/office/drawing/2014/main" id="{3A18F799-1FBD-4BE5-9F4B-551942568069}"/>
               </a:ext>
             </a:extLst>
           </p:cNvPr>
@@ -14638,133 +14637,14 @@
           <a:bodyPr/>
           <a:lstStyle/>
           <a:p>
-            <a:r>
-              <a:rPr lang="de-DE" dirty="0"/>
-              <a:t>Bimodal </a:t>
-            </a:r>
-            <a:r>
-              <a:rPr lang="de-DE" dirty="0" err="1"/>
-              <a:t>view</a:t>
-            </a:r>
-            <a:endParaRPr lang="en-US" dirty="0"/>
+            <a:endParaRPr lang="de-DE"/>
           </a:p>
         </p:txBody>
       </p:sp>
     </p:spTree>
     <p:extLst>
       <p:ext uri="{BB962C8B-B14F-4D97-AF65-F5344CB8AC3E}">
-        <p14:creationId xmlns:p14="http://schemas.microsoft.com/office/powerpoint/2010/main" val="2632012452"/>
-      </p:ext>
-    </p:extLst>
-  </p:cSld>
-  <p:clrMapOvr>
-    <a:masterClrMapping/>
-  </p:clrMapOvr>
-</p:sld>
-</file>
-
-<file path=ppt/slides/slide32.xml><?xml version="1.0" encoding="utf-8"?>
-<p:sld xmlns:a="http://schemas.openxmlformats.org/drawingml/2006/main" xmlns:r="http://schemas.openxmlformats.org/officeDocument/2006/relationships" xmlns:p="http://schemas.openxmlformats.org/presentationml/2006/main">
-  <p:cSld>
-    <p:spTree>
-      <p:nvGrpSpPr>
-        <p:cNvPr id="1" name=""/>
-        <p:cNvGrpSpPr/>
-        <p:nvPr/>
-      </p:nvGrpSpPr>
-      <p:grpSpPr>
-        <a:xfrm>
-          <a:off x="0" y="0"/>
-          <a:ext cx="0" cy="0"/>
-          <a:chOff x="0" y="0"/>
-          <a:chExt cx="0" cy="0"/>
-        </a:xfrm>
-      </p:grpSpPr>
-      <p:sp>
-        <p:nvSpPr>
-          <p:cNvPr id="2" name="Titel 1">
-            <a:extLst>
-              <a:ext uri="{FF2B5EF4-FFF2-40B4-BE49-F238E27FC236}">
-                <a16:creationId xmlns:a16="http://schemas.microsoft.com/office/drawing/2014/main" id="{21F741C4-AB14-0EEA-9BD2-13C5D63840AF}"/>
-              </a:ext>
-            </a:extLst>
-          </p:cNvPr>
-          <p:cNvSpPr>
-            <a:spLocks noGrp="1"/>
-          </p:cNvSpPr>
-          <p:nvPr>
-            <p:ph type="title"/>
-          </p:nvPr>
-        </p:nvSpPr>
-        <p:spPr/>
-        <p:txBody>
-          <a:bodyPr/>
-          <a:lstStyle/>
-          <a:p>
-            <a:r>
-              <a:rPr lang="de-DE" dirty="0"/>
-              <a:t>Training on </a:t>
-            </a:r>
-            <a:r>
-              <a:rPr lang="de-DE" dirty="0" err="1"/>
-              <a:t>heatmap</a:t>
-            </a:r>
-            <a:r>
-              <a:rPr lang="de-DE" dirty="0"/>
-              <a:t>.</a:t>
-            </a:r>
-            <a:endParaRPr lang="en-US" dirty="0"/>
-          </a:p>
-        </p:txBody>
-      </p:sp>
-      <p:sp>
-        <p:nvSpPr>
-          <p:cNvPr id="3" name="Textfeld 2">
-            <a:extLst>
-              <a:ext uri="{FF2B5EF4-FFF2-40B4-BE49-F238E27FC236}">
-                <a16:creationId xmlns:a16="http://schemas.microsoft.com/office/drawing/2014/main" id="{1FCF3636-1FF7-F239-8073-83A58CCFE681}"/>
-              </a:ext>
-            </a:extLst>
-          </p:cNvPr>
-          <p:cNvSpPr txBox="1"/>
-          <p:nvPr/>
-        </p:nvSpPr>
-        <p:spPr>
-          <a:xfrm>
-            <a:off x="1193074" y="2403566"/>
-            <a:ext cx="7080069" cy="369332"/>
-          </a:xfrm>
-          <a:prstGeom prst="rect">
-            <a:avLst/>
-          </a:prstGeom>
-          <a:noFill/>
-        </p:spPr>
-        <p:txBody>
-          <a:bodyPr wrap="square" rtlCol="0">
-            <a:spAutoFit/>
-          </a:bodyPr>
-          <a:lstStyle/>
-          <a:p>
-            <a:r>
-              <a:rPr lang="de-DE" dirty="0"/>
-              <a:t>Mean 0.5595994632236891 </a:t>
-            </a:r>
-            <a:r>
-              <a:rPr lang="de-DE" dirty="0" err="1"/>
-              <a:t>std</a:t>
-            </a:r>
-            <a:r>
-              <a:rPr lang="de-DE"/>
-              <a:t> 0.08789908058262823</a:t>
-            </a:r>
-            <a:endParaRPr lang="en-US" dirty="0"/>
-          </a:p>
-        </p:txBody>
-      </p:sp>
-    </p:spTree>
-    <p:extLst>
-      <p:ext uri="{BB962C8B-B14F-4D97-AF65-F5344CB8AC3E}">
-        <p14:creationId xmlns:p14="http://schemas.microsoft.com/office/powerpoint/2010/main" val="2154113216"/>
+        <p14:creationId xmlns:p14="http://schemas.microsoft.com/office/powerpoint/2010/main" val="283616486"/>
       </p:ext>
     </p:extLst>
   </p:cSld>

</xml_diff>